<commit_message>
rebuttal を v2 に
</commit_message>
<xml_diff>
--- a/rebuttal.pptx
+++ b/rebuttal.pptx
@@ -10,29 +10,29 @@
   <p:sldIdLst>
     <p:sldId id="440" r:id="rId2"/>
     <p:sldId id="508" r:id="rId3"/>
-    <p:sldId id="509" r:id="rId4"/>
-    <p:sldId id="512" r:id="rId5"/>
-    <p:sldId id="524" r:id="rId6"/>
-    <p:sldId id="521" r:id="rId7"/>
-    <p:sldId id="511" r:id="rId8"/>
-    <p:sldId id="513" r:id="rId9"/>
-    <p:sldId id="514" r:id="rId10"/>
-    <p:sldId id="515" r:id="rId11"/>
-    <p:sldId id="516" r:id="rId12"/>
-    <p:sldId id="522" r:id="rId13"/>
-    <p:sldId id="517" r:id="rId14"/>
-    <p:sldId id="518" r:id="rId15"/>
-    <p:sldId id="519" r:id="rId16"/>
-    <p:sldId id="520" r:id="rId17"/>
-    <p:sldId id="510" r:id="rId18"/>
-    <p:sldId id="523" r:id="rId19"/>
-    <p:sldId id="527" r:id="rId20"/>
-    <p:sldId id="528" r:id="rId21"/>
-    <p:sldId id="529" r:id="rId22"/>
-    <p:sldId id="531" r:id="rId23"/>
-    <p:sldId id="526" r:id="rId24"/>
-    <p:sldId id="530" r:id="rId25"/>
-    <p:sldId id="525" r:id="rId26"/>
+    <p:sldId id="524" r:id="rId4"/>
+    <p:sldId id="523" r:id="rId5"/>
+    <p:sldId id="527" r:id="rId6"/>
+    <p:sldId id="528" r:id="rId7"/>
+    <p:sldId id="529" r:id="rId8"/>
+    <p:sldId id="531" r:id="rId9"/>
+    <p:sldId id="526" r:id="rId10"/>
+    <p:sldId id="530" r:id="rId11"/>
+    <p:sldId id="525" r:id="rId12"/>
+    <p:sldId id="521" r:id="rId13"/>
+    <p:sldId id="509" r:id="rId14"/>
+    <p:sldId id="512" r:id="rId15"/>
+    <p:sldId id="511" r:id="rId16"/>
+    <p:sldId id="513" r:id="rId17"/>
+    <p:sldId id="514" r:id="rId18"/>
+    <p:sldId id="515" r:id="rId19"/>
+    <p:sldId id="516" r:id="rId20"/>
+    <p:sldId id="522" r:id="rId21"/>
+    <p:sldId id="517" r:id="rId22"/>
+    <p:sldId id="518" r:id="rId23"/>
+    <p:sldId id="519" r:id="rId24"/>
+    <p:sldId id="520" r:id="rId25"/>
+    <p:sldId id="510" r:id="rId26"/>
   </p:sldIdLst>
   <p:sldSz cx="9144000" cy="6858000" type="screen4x3"/>
   <p:notesSz cx="6858000" cy="9144000"/>
@@ -138,14 +138,26 @@
           <p14:sldIdLst>
             <p14:sldId id="440"/>
             <p14:sldId id="508"/>
-            <p14:sldId id="509"/>
-            <p14:sldId id="512"/>
             <p14:sldId id="524"/>
+          </p14:sldIdLst>
+        </p14:section>
+        <p14:section name="背景と指針" id="{58D57B74-96F6-4629-83F8-D9440487DDE4}">
+          <p14:sldIdLst>
+            <p14:sldId id="523"/>
+            <p14:sldId id="527"/>
+            <p14:sldId id="528"/>
+            <p14:sldId id="529"/>
+            <p14:sldId id="531"/>
+            <p14:sldId id="526"/>
+            <p14:sldId id="530"/>
+            <p14:sldId id="525"/>
           </p14:sldIdLst>
         </p14:section>
         <p14:section name="振り分け" id="{9A5937C1-DA7A-4089-9891-BCD5EA383FFE}">
           <p14:sldIdLst>
             <p14:sldId id="521"/>
+            <p14:sldId id="509"/>
+            <p14:sldId id="512"/>
             <p14:sldId id="511"/>
             <p14:sldId id="513"/>
             <p14:sldId id="514"/>
@@ -161,18 +173,6 @@
             <p14:sldId id="519"/>
             <p14:sldId id="520"/>
             <p14:sldId id="510"/>
-          </p14:sldIdLst>
-        </p14:section>
-        <p14:section name="反論の指針" id="{901A7D6A-4FD5-438F-A483-9AAA1193737A}">
-          <p14:sldIdLst>
-            <p14:sldId id="523"/>
-            <p14:sldId id="527"/>
-            <p14:sldId id="528"/>
-            <p14:sldId id="529"/>
-            <p14:sldId id="531"/>
-            <p14:sldId id="526"/>
-            <p14:sldId id="530"/>
-            <p14:sldId id="525"/>
           </p14:sldIdLst>
         </p14:section>
       </p14:sectionLst>
@@ -280,7 +280,7 @@
           <a:p>
             <a:fld id="{2ABE53D4-1A7B-4FFE-8A95-4265B045F058}" type="datetimeFigureOut">
               <a:rPr kumimoji="1" lang="ja-JP" altLang="en-US" smtClean="0"/>
-              <a:t>2022/12/10</a:t>
+              <a:t>2023/8/25</a:t>
             </a:fld>
             <a:endParaRPr kumimoji="1" lang="ja-JP" altLang="en-US"/>
           </a:p>
@@ -3074,8 +3074,8 @@
               <a:t>リバッタルの進め方 </a:t>
             </a:r>
             <a:r>
-              <a:rPr lang="en-US" altLang="ja-JP" sz="2800"/>
-              <a:t>v1</a:t>
+              <a:rPr lang="en-US" altLang="ja-JP" sz="2800" dirty="0"/>
+              <a:t>v2</a:t>
             </a:r>
             <a:endParaRPr kumimoji="1" lang="ja-JP" altLang="en-US" sz="2800" dirty="0"/>
           </a:p>
@@ -3381,6 +3381,1539 @@
 </file>
 
 <file path=ppt/slides/slide10.xml><?xml version="1.0" encoding="utf-8"?>
+<p:sld xmlns:a="http://schemas.openxmlformats.org/drawingml/2006/main" xmlns:r="http://schemas.openxmlformats.org/officeDocument/2006/relationships" xmlns:p="http://schemas.openxmlformats.org/presentationml/2006/main">
+  <p:cSld>
+    <p:spTree>
+      <p:nvGrpSpPr>
+        <p:cNvPr id="1" name=""/>
+        <p:cNvGrpSpPr/>
+        <p:nvPr/>
+      </p:nvGrpSpPr>
+      <p:grpSpPr>
+        <a:xfrm>
+          <a:off x="0" y="0"/>
+          <a:ext cx="0" cy="0"/>
+          <a:chOff x="0" y="0"/>
+          <a:chExt cx="0" cy="0"/>
+        </a:xfrm>
+      </p:grpSpPr>
+      <p:sp>
+        <p:nvSpPr>
+          <p:cNvPr id="4" name="タイトル 3">
+            <a:extLst>
+              <a:ext uri="{FF2B5EF4-FFF2-40B4-BE49-F238E27FC236}">
+                <a16:creationId xmlns:a16="http://schemas.microsoft.com/office/drawing/2014/main" id="{F4D90254-02E5-5150-E679-EA950D7ABAFA}"/>
+              </a:ext>
+            </a:extLst>
+          </p:cNvPr>
+          <p:cNvSpPr>
+            <a:spLocks noGrp="1"/>
+          </p:cNvSpPr>
+          <p:nvPr>
+            <p:ph type="title"/>
+          </p:nvPr>
+        </p:nvSpPr>
+        <p:spPr/>
+        <p:txBody>
+          <a:bodyPr/>
+          <a:lstStyle/>
+          <a:p>
+            <a:r>
+              <a:rPr lang="ja-JP" altLang="en-US" dirty="0"/>
+              <a:t>考え方２：加点にならない事は書かない？</a:t>
+            </a:r>
+          </a:p>
+        </p:txBody>
+      </p:sp>
+      <p:sp>
+        <p:nvSpPr>
+          <p:cNvPr id="5" name="テキスト プレースホルダー 4">
+            <a:extLst>
+              <a:ext uri="{FF2B5EF4-FFF2-40B4-BE49-F238E27FC236}">
+                <a16:creationId xmlns:a16="http://schemas.microsoft.com/office/drawing/2014/main" id="{77F9C7DC-8B72-E4A4-A675-C367E5757137}"/>
+              </a:ext>
+            </a:extLst>
+          </p:cNvPr>
+          <p:cNvSpPr>
+            <a:spLocks noGrp="1"/>
+          </p:cNvSpPr>
+          <p:nvPr>
+            <p:ph type="body" sz="quarter" idx="10"/>
+          </p:nvPr>
+        </p:nvSpPr>
+        <p:spPr/>
+        <p:txBody>
+          <a:bodyPr/>
+          <a:lstStyle/>
+          <a:p>
+            <a:r>
+              <a:rPr lang="ja-JP" altLang="en-US" dirty="0"/>
+              <a:t>明らかな弱点の場合，何を書いても無駄なことはある</a:t>
+            </a:r>
+            <a:endParaRPr lang="en-US" altLang="ja-JP" dirty="0"/>
+          </a:p>
+          <a:p>
+            <a:pPr lvl="1"/>
+            <a:r>
+              <a:rPr lang="ja-JP" altLang="en-US" dirty="0"/>
+              <a:t>「～の測定がなされていない」とか言われて，それを測るのは現実的には無理な場合とか</a:t>
+            </a:r>
+            <a:endParaRPr lang="en-US" altLang="ja-JP" dirty="0"/>
+          </a:p>
+          <a:p>
+            <a:pPr lvl="1"/>
+            <a:r>
+              <a:rPr lang="ja-JP" altLang="en-US" dirty="0"/>
+              <a:t>なくても良い理由をくどくど書いても加点されない可能性が高い</a:t>
+            </a:r>
+            <a:endParaRPr lang="en-US" altLang="ja-JP" dirty="0"/>
+          </a:p>
+          <a:p>
+            <a:pPr lvl="2"/>
+            <a:r>
+              <a:rPr lang="ja-JP" altLang="en-US" dirty="0"/>
+              <a:t>特に一般にその「～の測定」が良く行われている時とか</a:t>
+            </a:r>
+            <a:endParaRPr lang="en-US" altLang="ja-JP" dirty="0"/>
+          </a:p>
+          <a:p>
+            <a:r>
+              <a:rPr lang="ja-JP" altLang="en-US" dirty="0"/>
+              <a:t>「加点にならない質問には回答しない」という指針もある</a:t>
+            </a:r>
+            <a:endParaRPr lang="en-US" altLang="ja-JP" dirty="0"/>
+          </a:p>
+          <a:p>
+            <a:pPr lvl="1"/>
+            <a:r>
+              <a:rPr lang="ja-JP" altLang="en-US" dirty="0"/>
+              <a:t>とある先生はこの方針だが，わりと極端な考え方であると思う</a:t>
+            </a:r>
+            <a:endParaRPr lang="en-US" altLang="ja-JP" dirty="0"/>
+          </a:p>
+          <a:p>
+            <a:pPr lvl="1"/>
+            <a:r>
+              <a:rPr lang="ja-JP" altLang="en-US" dirty="0"/>
+              <a:t>不誠実な印象を与える可能性もある</a:t>
+            </a:r>
+            <a:endParaRPr lang="en-US" altLang="ja-JP" dirty="0"/>
+          </a:p>
+          <a:p>
+            <a:r>
+              <a:rPr lang="ja-JP" altLang="en-US" dirty="0">
+                <a:solidFill>
+                  <a:schemeClr val="accent5"/>
+                </a:solidFill>
+              </a:rPr>
+              <a:t>でも「なにを答えれば加点に繋がるか」という視点は重要</a:t>
+            </a:r>
+          </a:p>
+        </p:txBody>
+      </p:sp>
+      <p:sp>
+        <p:nvSpPr>
+          <p:cNvPr id="2" name="スライド番号プレースホルダー 1">
+            <a:extLst>
+              <a:ext uri="{FF2B5EF4-FFF2-40B4-BE49-F238E27FC236}">
+                <a16:creationId xmlns:a16="http://schemas.microsoft.com/office/drawing/2014/main" id="{31ABB5DD-A344-815C-93B3-D0854B35BF15}"/>
+              </a:ext>
+            </a:extLst>
+          </p:cNvPr>
+          <p:cNvSpPr>
+            <a:spLocks noGrp="1"/>
+          </p:cNvSpPr>
+          <p:nvPr>
+            <p:ph type="sldNum" sz="quarter" idx="4294967295"/>
+          </p:nvPr>
+        </p:nvSpPr>
+        <p:spPr>
+          <a:xfrm>
+            <a:off x="8531225" y="6308725"/>
+            <a:ext cx="612775" cy="549275"/>
+          </a:xfrm>
+        </p:spPr>
+        <p:txBody>
+          <a:bodyPr/>
+          <a:lstStyle/>
+          <a:p>
+            <a:fld id="{D2D8002D-B5B0-4BAC-B1F6-782DDCCE6D9C}" type="slidenum">
+              <a:rPr kumimoji="1" lang="ja-JP" altLang="en-US" smtClean="0"/>
+              <a:pPr/>
+              <a:t>10</a:t>
+            </a:fld>
+            <a:endParaRPr kumimoji="1" lang="ja-JP" altLang="en-US"/>
+          </a:p>
+        </p:txBody>
+      </p:sp>
+    </p:spTree>
+    <p:extLst>
+      <p:ext uri="{BB962C8B-B14F-4D97-AF65-F5344CB8AC3E}">
+        <p14:creationId xmlns:p14="http://schemas.microsoft.com/office/powerpoint/2010/main" val="4268246625"/>
+      </p:ext>
+    </p:extLst>
+  </p:cSld>
+  <p:clrMapOvr>
+    <a:masterClrMapping/>
+  </p:clrMapOvr>
+  <mc:AlternateContent xmlns:mc="http://schemas.openxmlformats.org/markup-compatibility/2006" xmlns:p14="http://schemas.microsoft.com/office/powerpoint/2010/main">
+    <mc:Choice Requires="p14">
+      <p:transition p14:dur="10"/>
+    </mc:Choice>
+    <mc:Fallback xmlns="">
+      <p:transition/>
+    </mc:Fallback>
+  </mc:AlternateContent>
+</p:sld>
+</file>
+
+<file path=ppt/slides/slide11.xml><?xml version="1.0" encoding="utf-8"?>
+<p:sld xmlns:a="http://schemas.openxmlformats.org/drawingml/2006/main" xmlns:r="http://schemas.openxmlformats.org/officeDocument/2006/relationships" xmlns:p="http://schemas.openxmlformats.org/presentationml/2006/main">
+  <p:cSld>
+    <p:spTree>
+      <p:nvGrpSpPr>
+        <p:cNvPr id="1" name=""/>
+        <p:cNvGrpSpPr/>
+        <p:nvPr/>
+      </p:nvGrpSpPr>
+      <p:grpSpPr>
+        <a:xfrm>
+          <a:off x="0" y="0"/>
+          <a:ext cx="0" cy="0"/>
+          <a:chOff x="0" y="0"/>
+          <a:chExt cx="0" cy="0"/>
+        </a:xfrm>
+      </p:grpSpPr>
+      <p:sp>
+        <p:nvSpPr>
+          <p:cNvPr id="4" name="タイトル 3">
+            <a:extLst>
+              <a:ext uri="{FF2B5EF4-FFF2-40B4-BE49-F238E27FC236}">
+                <a16:creationId xmlns:a16="http://schemas.microsoft.com/office/drawing/2014/main" id="{D4972FC8-631C-CF56-D504-447CB9BAAD27}"/>
+              </a:ext>
+            </a:extLst>
+          </p:cNvPr>
+          <p:cNvSpPr>
+            <a:spLocks noGrp="1"/>
+          </p:cNvSpPr>
+          <p:nvPr>
+            <p:ph type="title"/>
+          </p:nvPr>
+        </p:nvSpPr>
+        <p:spPr/>
+        <p:txBody>
+          <a:bodyPr/>
+          <a:lstStyle/>
+          <a:p>
+            <a:r>
+              <a:rPr lang="ja-JP" altLang="en-US" dirty="0"/>
+              <a:t>参考</a:t>
+            </a:r>
+          </a:p>
+        </p:txBody>
+      </p:sp>
+      <p:sp>
+        <p:nvSpPr>
+          <p:cNvPr id="5" name="テキスト プレースホルダー 4">
+            <a:extLst>
+              <a:ext uri="{FF2B5EF4-FFF2-40B4-BE49-F238E27FC236}">
+                <a16:creationId xmlns:a16="http://schemas.microsoft.com/office/drawing/2014/main" id="{56501602-0A9E-AC44-1DE7-A9DFF44160F4}"/>
+              </a:ext>
+            </a:extLst>
+          </p:cNvPr>
+          <p:cNvSpPr>
+            <a:spLocks noGrp="1"/>
+          </p:cNvSpPr>
+          <p:nvPr>
+            <p:ph type="body" sz="quarter" idx="10"/>
+          </p:nvPr>
+        </p:nvSpPr>
+        <p:spPr/>
+        <p:txBody>
+          <a:bodyPr/>
+          <a:lstStyle/>
+          <a:p>
+            <a:r>
+              <a:rPr lang="en-US" altLang="ja-JP" sz="1800" dirty="0" err="1"/>
+              <a:t>Sigcomm</a:t>
+            </a:r>
+            <a:r>
+              <a:rPr lang="en-US" altLang="ja-JP" sz="1800" dirty="0"/>
+              <a:t> 2013 author response guidelines</a:t>
+            </a:r>
+            <a:br>
+              <a:rPr lang="en-US" altLang="ja-JP" sz="1800" dirty="0"/>
+            </a:br>
+            <a:r>
+              <a:rPr lang="en-US" altLang="ja-JP" sz="1800" dirty="0">
+                <a:hlinkClick r:id="rId2"/>
+              </a:rPr>
+              <a:t>http://conferences.sigcomm.org/sigcomm/2013/misc/AuthorResponseGuidelines.pdf</a:t>
+            </a:r>
+            <a:br>
+              <a:rPr lang="en-US" altLang="ja-JP" sz="1800" dirty="0"/>
+            </a:br>
+            <a:endParaRPr lang="en-US" altLang="ja-JP" sz="1800" dirty="0"/>
+          </a:p>
+          <a:p>
+            <a:pPr lvl="1"/>
+            <a:r>
+              <a:rPr lang="ja-JP" altLang="en-US" sz="1800" dirty="0"/>
+              <a:t>リバッタルに対する指針や例が簡潔にまとまっていると思う</a:t>
+            </a:r>
+            <a:endParaRPr lang="en-US" altLang="ja-JP" sz="1800" dirty="0"/>
+          </a:p>
+          <a:p>
+            <a:pPr lvl="1"/>
+            <a:r>
+              <a:rPr lang="ja-JP" altLang="en-US" sz="1800" dirty="0"/>
+              <a:t>引用：</a:t>
+            </a:r>
+            <a:endParaRPr lang="en-US" altLang="ja-JP" sz="1800" dirty="0"/>
+          </a:p>
+          <a:p>
+            <a:pPr lvl="2"/>
+            <a:r>
+              <a:rPr lang="ja-JP" altLang="en-US" sz="1800" dirty="0"/>
+              <a:t>著者の回答は、意見ではなく、事実に基づいたポイントに焦点を当てることが最も効果的であると思われることを強調したい。</a:t>
+            </a:r>
+            <a:endParaRPr lang="en-US" altLang="ja-JP" sz="1800" dirty="0"/>
+          </a:p>
+          <a:p>
+            <a:pPr lvl="2"/>
+            <a:r>
+              <a:rPr lang="en-US" altLang="ja-JP" sz="1800" dirty="0"/>
+              <a:t>PC</a:t>
+            </a:r>
+            <a:r>
+              <a:rPr lang="ja-JP" altLang="en-US" sz="1800" dirty="0"/>
+              <a:t>は、著者が主張する新しい結果や改善点を無視することができます。</a:t>
+            </a:r>
+            <a:endParaRPr lang="en-US" altLang="ja-JP" sz="1800" dirty="0"/>
+          </a:p>
+          <a:p>
+            <a:pPr lvl="2"/>
+            <a:r>
+              <a:rPr lang="ja-JP" altLang="en-US" sz="1800" dirty="0"/>
+              <a:t>また、著者の回答が投稿時の誤りを修正するものであったとしても、いくつかの誤りを含む論文を受理するかどうかの最終判断は</a:t>
+            </a:r>
+            <a:r>
+              <a:rPr lang="en-US" altLang="ja-JP" sz="1800" dirty="0"/>
+              <a:t>PC</a:t>
+            </a:r>
+            <a:r>
+              <a:rPr lang="ja-JP" altLang="en-US" sz="1800" dirty="0"/>
+              <a:t>が行います。</a:t>
+            </a:r>
+          </a:p>
+        </p:txBody>
+      </p:sp>
+      <p:sp>
+        <p:nvSpPr>
+          <p:cNvPr id="2" name="スライド番号プレースホルダー 1">
+            <a:extLst>
+              <a:ext uri="{FF2B5EF4-FFF2-40B4-BE49-F238E27FC236}">
+                <a16:creationId xmlns:a16="http://schemas.microsoft.com/office/drawing/2014/main" id="{98EC1791-BDCF-0841-AB7B-70AF81F75FC0}"/>
+              </a:ext>
+            </a:extLst>
+          </p:cNvPr>
+          <p:cNvSpPr>
+            <a:spLocks noGrp="1"/>
+          </p:cNvSpPr>
+          <p:nvPr>
+            <p:ph type="sldNum" sz="quarter" idx="4294967295"/>
+          </p:nvPr>
+        </p:nvSpPr>
+        <p:spPr>
+          <a:xfrm>
+            <a:off x="8531225" y="6308725"/>
+            <a:ext cx="612775" cy="549275"/>
+          </a:xfrm>
+        </p:spPr>
+        <p:txBody>
+          <a:bodyPr/>
+          <a:lstStyle/>
+          <a:p>
+            <a:fld id="{D2D8002D-B5B0-4BAC-B1F6-782DDCCE6D9C}" type="slidenum">
+              <a:rPr kumimoji="1" lang="ja-JP" altLang="en-US" smtClean="0"/>
+              <a:pPr/>
+              <a:t>11</a:t>
+            </a:fld>
+            <a:endParaRPr kumimoji="1" lang="ja-JP" altLang="en-US" dirty="0"/>
+          </a:p>
+        </p:txBody>
+      </p:sp>
+    </p:spTree>
+    <p:extLst>
+      <p:ext uri="{BB962C8B-B14F-4D97-AF65-F5344CB8AC3E}">
+        <p14:creationId xmlns:p14="http://schemas.microsoft.com/office/powerpoint/2010/main" val="1806432219"/>
+      </p:ext>
+    </p:extLst>
+  </p:cSld>
+  <p:clrMapOvr>
+    <a:masterClrMapping/>
+  </p:clrMapOvr>
+  <mc:AlternateContent xmlns:mc="http://schemas.openxmlformats.org/markup-compatibility/2006" xmlns:p14="http://schemas.microsoft.com/office/powerpoint/2010/main">
+    <mc:Choice Requires="p14">
+      <p:transition p14:dur="10"/>
+    </mc:Choice>
+    <mc:Fallback xmlns="">
+      <p:transition/>
+    </mc:Fallback>
+  </mc:AlternateContent>
+</p:sld>
+</file>
+
+<file path=ppt/slides/slide12.xml><?xml version="1.0" encoding="utf-8"?>
+<p:sld xmlns:a="http://schemas.openxmlformats.org/drawingml/2006/main" xmlns:r="http://schemas.openxmlformats.org/officeDocument/2006/relationships" xmlns:p="http://schemas.openxmlformats.org/presentationml/2006/main">
+  <p:cSld>
+    <p:spTree>
+      <p:nvGrpSpPr>
+        <p:cNvPr id="1" name=""/>
+        <p:cNvGrpSpPr/>
+        <p:nvPr/>
+      </p:nvGrpSpPr>
+      <p:grpSpPr>
+        <a:xfrm>
+          <a:off x="0" y="0"/>
+          <a:ext cx="0" cy="0"/>
+          <a:chOff x="0" y="0"/>
+          <a:chExt cx="0" cy="0"/>
+        </a:xfrm>
+      </p:grpSpPr>
+      <p:sp>
+        <p:nvSpPr>
+          <p:cNvPr id="6" name="タイトル 5">
+            <a:extLst>
+              <a:ext uri="{FF2B5EF4-FFF2-40B4-BE49-F238E27FC236}">
+                <a16:creationId xmlns:a16="http://schemas.microsoft.com/office/drawing/2014/main" id="{52EFDF95-98FB-35A4-278A-593504D72D28}"/>
+              </a:ext>
+            </a:extLst>
+          </p:cNvPr>
+          <p:cNvSpPr>
+            <a:spLocks noGrp="1"/>
+          </p:cNvSpPr>
+          <p:nvPr>
+            <p:ph type="title"/>
+          </p:nvPr>
+        </p:nvSpPr>
+        <p:spPr/>
+        <p:txBody>
+          <a:bodyPr/>
+          <a:lstStyle/>
+          <a:p>
+            <a:r>
+              <a:rPr lang="ja-JP" altLang="en-US" b="1" dirty="0"/>
+              <a:t>主張の整理</a:t>
+            </a:r>
+          </a:p>
+        </p:txBody>
+      </p:sp>
+    </p:spTree>
+    <p:extLst>
+      <p:ext uri="{BB962C8B-B14F-4D97-AF65-F5344CB8AC3E}">
+        <p14:creationId xmlns:p14="http://schemas.microsoft.com/office/powerpoint/2010/main" val="2989487295"/>
+      </p:ext>
+    </p:extLst>
+  </p:cSld>
+  <p:clrMapOvr>
+    <a:masterClrMapping/>
+  </p:clrMapOvr>
+</p:sld>
+</file>
+
+<file path=ppt/slides/slide13.xml><?xml version="1.0" encoding="utf-8"?>
+<p:sld xmlns:a="http://schemas.openxmlformats.org/drawingml/2006/main" xmlns:r="http://schemas.openxmlformats.org/officeDocument/2006/relationships" xmlns:p="http://schemas.openxmlformats.org/presentationml/2006/main">
+  <p:cSld>
+    <p:spTree>
+      <p:nvGrpSpPr>
+        <p:cNvPr id="1" name=""/>
+        <p:cNvGrpSpPr/>
+        <p:nvPr/>
+      </p:nvGrpSpPr>
+      <p:grpSpPr>
+        <a:xfrm>
+          <a:off x="0" y="0"/>
+          <a:ext cx="0" cy="0"/>
+          <a:chOff x="0" y="0"/>
+          <a:chExt cx="0" cy="0"/>
+        </a:xfrm>
+      </p:grpSpPr>
+      <p:sp>
+        <p:nvSpPr>
+          <p:cNvPr id="2" name="タイトル 1">
+            <a:extLst>
+              <a:ext uri="{FF2B5EF4-FFF2-40B4-BE49-F238E27FC236}">
+                <a16:creationId xmlns:a16="http://schemas.microsoft.com/office/drawing/2014/main" id="{083FED06-7585-A7FA-DFA7-A108FAF25664}"/>
+              </a:ext>
+            </a:extLst>
+          </p:cNvPr>
+          <p:cNvSpPr>
+            <a:spLocks noGrp="1"/>
+          </p:cNvSpPr>
+          <p:nvPr>
+            <p:ph type="title"/>
+          </p:nvPr>
+        </p:nvSpPr>
+        <p:spPr/>
+        <p:txBody>
+          <a:bodyPr/>
+          <a:lstStyle/>
+          <a:p>
+            <a:r>
+              <a:rPr kumimoji="1" lang="ja-JP" altLang="en-US" dirty="0"/>
+              <a:t>おおまかな流れ</a:t>
+            </a:r>
+          </a:p>
+        </p:txBody>
+      </p:sp>
+      <p:sp>
+        <p:nvSpPr>
+          <p:cNvPr id="3" name="テキスト プレースホルダー 2">
+            <a:extLst>
+              <a:ext uri="{FF2B5EF4-FFF2-40B4-BE49-F238E27FC236}">
+                <a16:creationId xmlns:a16="http://schemas.microsoft.com/office/drawing/2014/main" id="{36F820D4-33B2-0DAF-F972-7BF59B02F015}"/>
+              </a:ext>
+            </a:extLst>
+          </p:cNvPr>
+          <p:cNvSpPr>
+            <a:spLocks noGrp="1"/>
+          </p:cNvSpPr>
+          <p:nvPr>
+            <p:ph type="body" sz="quarter" idx="10"/>
+          </p:nvPr>
+        </p:nvSpPr>
+        <p:spPr/>
+        <p:txBody>
+          <a:bodyPr/>
+          <a:lstStyle/>
+          <a:p>
+            <a:pPr marL="457200" indent="-457200">
+              <a:buFont typeface="+mj-lt"/>
+              <a:buAutoNum type="arabicPeriod"/>
+            </a:pPr>
+            <a:r>
+              <a:rPr kumimoji="1" lang="ja-JP" altLang="en-US" dirty="0"/>
+              <a:t>査読コメントの振り分け</a:t>
+            </a:r>
+            <a:endParaRPr kumimoji="1" lang="en-US" altLang="ja-JP" dirty="0"/>
+          </a:p>
+          <a:p>
+            <a:pPr marL="817200" lvl="1" indent="-457200">
+              <a:buFont typeface="+mj-lt"/>
+              <a:buAutoNum type="arabicPeriod"/>
+            </a:pPr>
+            <a:r>
+              <a:rPr kumimoji="1" lang="ja-JP" altLang="en-US" dirty="0"/>
+              <a:t>査読コメント内の主張ごとに </a:t>
+            </a:r>
+            <a:r>
+              <a:rPr kumimoji="1" lang="en-US" altLang="ja-JP" dirty="0"/>
+              <a:t>ID </a:t>
+            </a:r>
+            <a:r>
+              <a:rPr kumimoji="1" lang="ja-JP" altLang="en-US" dirty="0"/>
+              <a:t>をふる</a:t>
+            </a:r>
+            <a:endParaRPr kumimoji="1" lang="en-US" altLang="ja-JP" dirty="0"/>
+          </a:p>
+          <a:p>
+            <a:pPr marL="817200" lvl="1" indent="-457200">
+              <a:buFont typeface="+mj-lt"/>
+              <a:buAutoNum type="arabicPeriod"/>
+            </a:pPr>
+            <a:r>
+              <a:rPr kumimoji="1" lang="ja-JP" altLang="en-US" dirty="0"/>
+              <a:t>同様の主張のグルーピング</a:t>
+            </a:r>
+            <a:endParaRPr kumimoji="1" lang="en-US" altLang="ja-JP" dirty="0"/>
+          </a:p>
+          <a:p>
+            <a:pPr marL="457200" indent="-457200">
+              <a:buFont typeface="+mj-lt"/>
+              <a:buAutoNum type="arabicPeriod"/>
+            </a:pPr>
+            <a:r>
+              <a:rPr kumimoji="1" lang="ja-JP" altLang="en-US" dirty="0"/>
+              <a:t>主張の整理</a:t>
+            </a:r>
+            <a:endParaRPr kumimoji="1" lang="en-US" altLang="ja-JP" dirty="0"/>
+          </a:p>
+          <a:p>
+            <a:pPr marL="817200" lvl="1" indent="-457200">
+              <a:buFont typeface="+mj-lt"/>
+              <a:buAutoNum type="arabicPeriod"/>
+            </a:pPr>
+            <a:r>
+              <a:rPr kumimoji="1" lang="ja-JP" altLang="en-US" dirty="0"/>
+              <a:t>言われている主張の要点を自分たちでまとめなおす</a:t>
+            </a:r>
+          </a:p>
+        </p:txBody>
+      </p:sp>
+    </p:spTree>
+    <p:extLst>
+      <p:ext uri="{BB962C8B-B14F-4D97-AF65-F5344CB8AC3E}">
+        <p14:creationId xmlns:p14="http://schemas.microsoft.com/office/powerpoint/2010/main" val="546458259"/>
+      </p:ext>
+    </p:extLst>
+  </p:cSld>
+  <p:clrMapOvr>
+    <a:masterClrMapping/>
+  </p:clrMapOvr>
+  <mc:AlternateContent xmlns:mc="http://schemas.openxmlformats.org/markup-compatibility/2006" xmlns:p14="http://schemas.microsoft.com/office/powerpoint/2010/main">
+    <mc:Choice Requires="p14">
+      <p:transition p14:dur="10"/>
+    </mc:Choice>
+    <mc:Fallback xmlns="">
+      <p:transition/>
+    </mc:Fallback>
+  </mc:AlternateContent>
+</p:sld>
+</file>
+
+<file path=ppt/slides/slide14.xml><?xml version="1.0" encoding="utf-8"?>
+<p:sld xmlns:a="http://schemas.openxmlformats.org/drawingml/2006/main" xmlns:r="http://schemas.openxmlformats.org/officeDocument/2006/relationships" xmlns:p="http://schemas.openxmlformats.org/presentationml/2006/main">
+  <p:cSld>
+    <p:spTree>
+      <p:nvGrpSpPr>
+        <p:cNvPr id="1" name=""/>
+        <p:cNvGrpSpPr/>
+        <p:nvPr/>
+      </p:nvGrpSpPr>
+      <p:grpSpPr>
+        <a:xfrm>
+          <a:off x="0" y="0"/>
+          <a:ext cx="0" cy="0"/>
+          <a:chOff x="0" y="0"/>
+          <a:chExt cx="0" cy="0"/>
+        </a:xfrm>
+      </p:grpSpPr>
+      <p:sp>
+        <p:nvSpPr>
+          <p:cNvPr id="2" name="タイトル 1">
+            <a:extLst>
+              <a:ext uri="{FF2B5EF4-FFF2-40B4-BE49-F238E27FC236}">
+                <a16:creationId xmlns:a16="http://schemas.microsoft.com/office/drawing/2014/main" id="{BDB72A97-6BFD-581B-230B-BBBDBCEA34D9}"/>
+              </a:ext>
+            </a:extLst>
+          </p:cNvPr>
+          <p:cNvSpPr>
+            <a:spLocks noGrp="1"/>
+          </p:cNvSpPr>
+          <p:nvPr>
+            <p:ph type="title"/>
+          </p:nvPr>
+        </p:nvSpPr>
+        <p:spPr/>
+        <p:txBody>
+          <a:bodyPr/>
+          <a:lstStyle/>
+          <a:p>
+            <a:r>
+              <a:rPr kumimoji="1" lang="ja-JP" altLang="en-US" dirty="0"/>
+              <a:t>作業の進め方</a:t>
+            </a:r>
+          </a:p>
+        </p:txBody>
+      </p:sp>
+      <p:sp>
+        <p:nvSpPr>
+          <p:cNvPr id="3" name="テキスト プレースホルダー 2">
+            <a:extLst>
+              <a:ext uri="{FF2B5EF4-FFF2-40B4-BE49-F238E27FC236}">
+                <a16:creationId xmlns:a16="http://schemas.microsoft.com/office/drawing/2014/main" id="{B54A5567-BE4E-F223-8C55-F35B87FD7AA0}"/>
+              </a:ext>
+            </a:extLst>
+          </p:cNvPr>
+          <p:cNvSpPr>
+            <a:spLocks noGrp="1"/>
+          </p:cNvSpPr>
+          <p:nvPr>
+            <p:ph type="body" sz="quarter" idx="10"/>
+          </p:nvPr>
+        </p:nvSpPr>
+        <p:spPr/>
+        <p:txBody>
+          <a:bodyPr/>
+          <a:lstStyle/>
+          <a:p>
+            <a:r>
+              <a:rPr kumimoji="1" lang="ja-JP" altLang="en-US" sz="1800" dirty="0"/>
+              <a:t>共同編集可能な </a:t>
+            </a:r>
+            <a:r>
+              <a:rPr kumimoji="1" lang="en-US" altLang="ja-JP" sz="1800" dirty="0"/>
+              <a:t>markdown </a:t>
+            </a:r>
+            <a:r>
+              <a:rPr kumimoji="1" lang="ja-JP" altLang="en-US" sz="1800" dirty="0"/>
+              <a:t>上で進めるのがおすすめ</a:t>
+            </a:r>
+            <a:endParaRPr kumimoji="1" lang="en-US" altLang="ja-JP" sz="1800" dirty="0"/>
+          </a:p>
+          <a:p>
+            <a:pPr lvl="1"/>
+            <a:r>
+              <a:rPr kumimoji="1" lang="ja-JP" altLang="en-US" sz="1800" dirty="0"/>
+              <a:t>ここでは </a:t>
+            </a:r>
+            <a:r>
+              <a:rPr kumimoji="1" lang="en-US" altLang="ja-JP" sz="1800" dirty="0"/>
+              <a:t>overleaf </a:t>
+            </a:r>
+            <a:r>
+              <a:rPr kumimoji="1" lang="ja-JP" altLang="en-US" sz="1800" dirty="0"/>
+              <a:t>の上に </a:t>
+            </a:r>
+            <a:r>
+              <a:rPr kumimoji="1" lang="en-US" altLang="ja-JP" sz="1800" dirty="0"/>
+              <a:t>.md </a:t>
+            </a:r>
+            <a:r>
+              <a:rPr kumimoji="1" lang="ja-JP" altLang="en-US" sz="1800" dirty="0"/>
+              <a:t>ファイルを置くことを想定</a:t>
+            </a:r>
+            <a:endParaRPr kumimoji="1" lang="en-US" altLang="ja-JP" sz="1800" dirty="0"/>
+          </a:p>
+          <a:p>
+            <a:pPr lvl="2"/>
+            <a:r>
+              <a:rPr lang="en-US" altLang="ja-JP" sz="1800" dirty="0"/>
+              <a:t>overleaf </a:t>
+            </a:r>
+            <a:r>
+              <a:rPr lang="ja-JP" altLang="en-US" sz="1800" dirty="0"/>
+              <a:t>は </a:t>
+            </a:r>
+            <a:r>
+              <a:rPr lang="en-US" altLang="ja-JP" sz="1800" dirty="0"/>
+              <a:t>.md </a:t>
+            </a:r>
+            <a:r>
+              <a:rPr lang="ja-JP" altLang="en-US" sz="1800" dirty="0"/>
+              <a:t>を認識してシンタックス・ハイライトできる</a:t>
+            </a:r>
+            <a:endParaRPr kumimoji="1" lang="en-US" altLang="ja-JP" sz="1800" dirty="0"/>
+          </a:p>
+          <a:p>
+            <a:pPr lvl="1"/>
+            <a:r>
+              <a:rPr kumimoji="1" lang="ja-JP" altLang="en-US" sz="1800" dirty="0"/>
+              <a:t>他のサービスでも別によい</a:t>
+            </a:r>
+            <a:endParaRPr kumimoji="1" lang="en-US" altLang="ja-JP" sz="1800" dirty="0"/>
+          </a:p>
+          <a:p>
+            <a:pPr lvl="2"/>
+            <a:r>
+              <a:rPr kumimoji="1" lang="en-US" altLang="ja-JP" sz="1800" dirty="0"/>
+              <a:t>Google document </a:t>
+            </a:r>
+            <a:r>
+              <a:rPr kumimoji="1" lang="ja-JP" altLang="en-US" sz="1800" dirty="0"/>
+              <a:t>とか</a:t>
+            </a:r>
+            <a:endParaRPr kumimoji="1" lang="en-US" altLang="ja-JP" sz="1800" dirty="0"/>
+          </a:p>
+          <a:p>
+            <a:pPr lvl="2"/>
+            <a:r>
+              <a:rPr kumimoji="1" lang="ja-JP" altLang="en-US" sz="1800" dirty="0"/>
+              <a:t>１人で進めるならローカルの </a:t>
+            </a:r>
+            <a:r>
+              <a:rPr kumimoji="1" lang="en-US" altLang="ja-JP" sz="1800" dirty="0"/>
+              <a:t>.md </a:t>
+            </a:r>
+            <a:r>
+              <a:rPr kumimoji="1" lang="ja-JP" altLang="en-US" sz="1800" dirty="0"/>
+              <a:t>ファイルでも</a:t>
+            </a:r>
+            <a:endParaRPr kumimoji="1" lang="en-US" altLang="ja-JP" sz="1800" dirty="0"/>
+          </a:p>
+          <a:p>
+            <a:r>
+              <a:rPr lang="ja-JP" altLang="en-US" sz="1800" dirty="0"/>
+              <a:t>この作業に </a:t>
+            </a:r>
+            <a:r>
+              <a:rPr lang="en-US" altLang="ja-JP" sz="1800" dirty="0"/>
+              <a:t>git </a:t>
+            </a:r>
+            <a:r>
+              <a:rPr lang="ja-JP" altLang="en-US" sz="1800" dirty="0"/>
+              <a:t>やチケット管理システムはあまり向かない（と思う）</a:t>
+            </a:r>
+            <a:endParaRPr lang="en-US" altLang="ja-JP" sz="1800" dirty="0"/>
+          </a:p>
+          <a:p>
+            <a:pPr lvl="1"/>
+            <a:r>
+              <a:rPr kumimoji="1" lang="ja-JP" altLang="en-US" sz="1800" dirty="0"/>
+              <a:t>後のタスク・スケジューリングの項で理由を説明</a:t>
+            </a:r>
+          </a:p>
+        </p:txBody>
+      </p:sp>
+    </p:spTree>
+    <p:extLst>
+      <p:ext uri="{BB962C8B-B14F-4D97-AF65-F5344CB8AC3E}">
+        <p14:creationId xmlns:p14="http://schemas.microsoft.com/office/powerpoint/2010/main" val="145859783"/>
+      </p:ext>
+    </p:extLst>
+  </p:cSld>
+  <p:clrMapOvr>
+    <a:masterClrMapping/>
+  </p:clrMapOvr>
+  <mc:AlternateContent xmlns:mc="http://schemas.openxmlformats.org/markup-compatibility/2006" xmlns:p14="http://schemas.microsoft.com/office/powerpoint/2010/main">
+    <mc:Choice Requires="p14">
+      <p:transition p14:dur="10"/>
+    </mc:Choice>
+    <mc:Fallback xmlns="">
+      <p:transition/>
+    </mc:Fallback>
+  </mc:AlternateContent>
+</p:sld>
+</file>
+
+<file path=ppt/slides/slide15.xml><?xml version="1.0" encoding="utf-8"?>
+<p:sld xmlns:a="http://schemas.openxmlformats.org/drawingml/2006/main" xmlns:r="http://schemas.openxmlformats.org/officeDocument/2006/relationships" xmlns:p="http://schemas.openxmlformats.org/presentationml/2006/main">
+  <p:cSld>
+    <p:spTree>
+      <p:nvGrpSpPr>
+        <p:cNvPr id="1" name=""/>
+        <p:cNvGrpSpPr/>
+        <p:nvPr/>
+      </p:nvGrpSpPr>
+      <p:grpSpPr>
+        <a:xfrm>
+          <a:off x="0" y="0"/>
+          <a:ext cx="0" cy="0"/>
+          <a:chOff x="0" y="0"/>
+          <a:chExt cx="0" cy="0"/>
+        </a:xfrm>
+      </p:grpSpPr>
+      <p:sp>
+        <p:nvSpPr>
+          <p:cNvPr id="2" name="タイトル 1">
+            <a:extLst>
+              <a:ext uri="{FF2B5EF4-FFF2-40B4-BE49-F238E27FC236}">
+                <a16:creationId xmlns:a16="http://schemas.microsoft.com/office/drawing/2014/main" id="{1F13FE07-0C9B-DDF0-4577-0A7732F2FE30}"/>
+              </a:ext>
+            </a:extLst>
+          </p:cNvPr>
+          <p:cNvSpPr>
+            <a:spLocks noGrp="1"/>
+          </p:cNvSpPr>
+          <p:nvPr>
+            <p:ph type="title"/>
+          </p:nvPr>
+        </p:nvSpPr>
+        <p:spPr/>
+        <p:txBody>
+          <a:bodyPr/>
+          <a:lstStyle/>
+          <a:p>
+            <a:r>
+              <a:rPr kumimoji="1" lang="ja-JP" altLang="en-US" dirty="0"/>
+              <a:t>査読コメントの振り分け</a:t>
+            </a:r>
+          </a:p>
+        </p:txBody>
+      </p:sp>
+      <p:sp>
+        <p:nvSpPr>
+          <p:cNvPr id="3" name="テキスト プレースホルダー 2">
+            <a:extLst>
+              <a:ext uri="{FF2B5EF4-FFF2-40B4-BE49-F238E27FC236}">
+                <a16:creationId xmlns:a16="http://schemas.microsoft.com/office/drawing/2014/main" id="{78697263-CAD3-DD1C-B675-FB0A77D4B226}"/>
+              </a:ext>
+            </a:extLst>
+          </p:cNvPr>
+          <p:cNvSpPr>
+            <a:spLocks noGrp="1"/>
+          </p:cNvSpPr>
+          <p:nvPr>
+            <p:ph type="body" sz="quarter" idx="10"/>
+          </p:nvPr>
+        </p:nvSpPr>
+        <p:spPr/>
+        <p:txBody>
+          <a:bodyPr/>
+          <a:lstStyle/>
+          <a:p>
+            <a:r>
+              <a:rPr kumimoji="1" lang="ja-JP" altLang="en-US" sz="1800" dirty="0">
+                <a:solidFill>
+                  <a:schemeClr val="accent5"/>
+                </a:solidFill>
+              </a:rPr>
+              <a:t>まず，コメントで言われている内容ごとに </a:t>
+            </a:r>
+            <a:r>
+              <a:rPr kumimoji="1" lang="en-US" altLang="ja-JP" sz="1800" dirty="0">
+                <a:solidFill>
+                  <a:schemeClr val="accent5"/>
+                </a:solidFill>
+              </a:rPr>
+              <a:t>ID </a:t>
+            </a:r>
+            <a:r>
+              <a:rPr kumimoji="1" lang="ja-JP" altLang="en-US" sz="1800" dirty="0">
+                <a:solidFill>
+                  <a:schemeClr val="accent5"/>
+                </a:solidFill>
+              </a:rPr>
+              <a:t>を振る</a:t>
+            </a:r>
+            <a:endParaRPr kumimoji="1" lang="en-US" altLang="ja-JP" sz="1800" dirty="0">
+              <a:solidFill>
+                <a:schemeClr val="accent5"/>
+              </a:solidFill>
+            </a:endParaRPr>
+          </a:p>
+          <a:p>
+            <a:r>
+              <a:rPr lang="en-US" altLang="ja-JP" sz="1800" dirty="0"/>
+              <a:t>ID </a:t>
+            </a:r>
+            <a:r>
+              <a:rPr lang="ja-JP" altLang="en-US" sz="1800" dirty="0"/>
+              <a:t>のフォーマット： </a:t>
+            </a:r>
+            <a:r>
+              <a:rPr kumimoji="1" lang="en-US" altLang="ja-JP" sz="1800" dirty="0"/>
+              <a:t>$&lt;</a:t>
+            </a:r>
+            <a:r>
+              <a:rPr kumimoji="1" lang="ja-JP" altLang="en-US" sz="1800" dirty="0"/>
+              <a:t>査読者</a:t>
+            </a:r>
+            <a:r>
+              <a:rPr kumimoji="1" lang="en-US" altLang="ja-JP" sz="1800" dirty="0"/>
+              <a:t>&gt;&lt;</a:t>
+            </a:r>
+            <a:r>
+              <a:rPr kumimoji="1" lang="ja-JP" altLang="en-US" sz="1800" dirty="0"/>
+              <a:t>シリアル</a:t>
+            </a:r>
+            <a:r>
+              <a:rPr kumimoji="1" lang="en-US" altLang="ja-JP" sz="1800" dirty="0"/>
+              <a:t>&gt;-&lt;</a:t>
+            </a:r>
+            <a:r>
+              <a:rPr kumimoji="1" lang="ja-JP" altLang="en-US" sz="1800" dirty="0"/>
+              <a:t>タイプ</a:t>
+            </a:r>
+            <a:r>
+              <a:rPr kumimoji="1" lang="en-US" altLang="ja-JP" sz="1800" dirty="0"/>
+              <a:t>&gt;</a:t>
+            </a:r>
+          </a:p>
+          <a:p>
+            <a:pPr lvl="1"/>
+            <a:r>
+              <a:rPr lang="ja-JP" altLang="en-US" sz="1800" dirty="0"/>
+              <a:t>先頭に </a:t>
+            </a:r>
+            <a:r>
+              <a:rPr lang="en-US" altLang="ja-JP" sz="1800" dirty="0"/>
+              <a:t>$ </a:t>
+            </a:r>
+            <a:r>
+              <a:rPr lang="ja-JP" altLang="en-US" sz="1800" dirty="0"/>
+              <a:t>をつける</a:t>
+            </a:r>
+            <a:endParaRPr lang="en-US" altLang="ja-JP" sz="1800" dirty="0"/>
+          </a:p>
+          <a:p>
+            <a:pPr lvl="1"/>
+            <a:r>
+              <a:rPr lang="en-US" altLang="ja-JP" sz="1800" dirty="0"/>
+              <a:t>&lt;</a:t>
+            </a:r>
+            <a:r>
+              <a:rPr lang="ja-JP" altLang="en-US" sz="1800" dirty="0"/>
+              <a:t>査読者</a:t>
+            </a:r>
+            <a:r>
+              <a:rPr lang="en-US" altLang="ja-JP" sz="1800" dirty="0"/>
+              <a:t>&gt; </a:t>
+            </a:r>
+            <a:r>
+              <a:rPr lang="ja-JP" altLang="en-US" sz="1800" dirty="0"/>
+              <a:t>は査読者 </a:t>
+            </a:r>
+            <a:r>
+              <a:rPr lang="en-US" altLang="ja-JP" sz="1800" dirty="0"/>
+              <a:t>A </a:t>
+            </a:r>
+            <a:r>
+              <a:rPr lang="ja-JP" altLang="en-US" sz="1800" dirty="0"/>
+              <a:t>や </a:t>
+            </a:r>
+            <a:r>
+              <a:rPr lang="en-US" altLang="ja-JP" sz="1800" dirty="0"/>
+              <a:t>B </a:t>
+            </a:r>
+            <a:r>
+              <a:rPr lang="ja-JP" altLang="en-US" sz="1800" dirty="0"/>
+              <a:t>などのアルファベット</a:t>
+            </a:r>
+            <a:endParaRPr lang="en-US" altLang="ja-JP" sz="1800" dirty="0"/>
+          </a:p>
+          <a:p>
+            <a:pPr lvl="1"/>
+            <a:r>
+              <a:rPr kumimoji="1" lang="en-US" altLang="ja-JP" sz="1800" dirty="0"/>
+              <a:t>&lt;</a:t>
+            </a:r>
+            <a:r>
+              <a:rPr kumimoji="1" lang="ja-JP" altLang="en-US" sz="1800" dirty="0"/>
+              <a:t>シリアル</a:t>
+            </a:r>
+            <a:r>
+              <a:rPr kumimoji="1" lang="en-US" altLang="ja-JP" sz="1800" dirty="0"/>
+              <a:t>&gt; </a:t>
+            </a:r>
+            <a:r>
+              <a:rPr kumimoji="1" lang="ja-JP" altLang="en-US" sz="1800" dirty="0"/>
+              <a:t>は一意な識別番号</a:t>
+            </a:r>
+            <a:endParaRPr kumimoji="1" lang="en-US" altLang="ja-JP" sz="1800" dirty="0"/>
+          </a:p>
+          <a:p>
+            <a:pPr lvl="2"/>
+            <a:r>
+              <a:rPr kumimoji="1" lang="ja-JP" altLang="en-US" sz="1800" dirty="0"/>
+              <a:t>査読者ごとには番号は被っても良い</a:t>
+            </a:r>
+            <a:endParaRPr kumimoji="1" lang="en-US" altLang="ja-JP" sz="1800" dirty="0"/>
+          </a:p>
+          <a:p>
+            <a:pPr lvl="3"/>
+            <a:r>
+              <a:rPr lang="en-US" altLang="ja-JP" sz="1800" dirty="0"/>
+              <a:t>A1 </a:t>
+            </a:r>
+            <a:r>
+              <a:rPr lang="ja-JP" altLang="en-US" sz="1800" dirty="0"/>
+              <a:t>と </a:t>
+            </a:r>
+            <a:r>
+              <a:rPr lang="en-US" altLang="ja-JP" sz="1800" dirty="0"/>
+              <a:t>B1 </a:t>
+            </a:r>
+            <a:r>
+              <a:rPr lang="ja-JP" altLang="en-US" sz="1800" dirty="0"/>
+              <a:t>があってもよい</a:t>
+            </a:r>
+            <a:endParaRPr kumimoji="1" lang="en-US" altLang="ja-JP" sz="1800" dirty="0"/>
+          </a:p>
+          <a:p>
+            <a:pPr lvl="2"/>
+            <a:r>
+              <a:rPr kumimoji="1" lang="ja-JP" altLang="en-US" sz="1800" dirty="0"/>
+              <a:t>査読者が同じでもタイプが異なる場合は被ってはいけない</a:t>
+            </a:r>
+            <a:endParaRPr kumimoji="1" lang="en-US" altLang="ja-JP" sz="1800" dirty="0"/>
+          </a:p>
+          <a:p>
+            <a:pPr lvl="3"/>
+            <a:r>
+              <a:rPr lang="en-US" altLang="ja-JP" sz="1800" dirty="0"/>
+              <a:t>A1-w </a:t>
+            </a:r>
+            <a:r>
+              <a:rPr lang="ja-JP" altLang="en-US" sz="1800" dirty="0"/>
+              <a:t>と </a:t>
+            </a:r>
+            <a:r>
+              <a:rPr lang="en-US" altLang="ja-JP" sz="1800" dirty="0"/>
+              <a:t>A1-c </a:t>
+            </a:r>
+            <a:r>
+              <a:rPr lang="ja-JP" altLang="en-US" sz="1800" dirty="0"/>
+              <a:t>が同時にあってはいけない</a:t>
+            </a:r>
+            <a:endParaRPr lang="en-US" altLang="ja-JP" sz="1800" dirty="0"/>
+          </a:p>
+          <a:p>
+            <a:pPr lvl="1"/>
+            <a:r>
+              <a:rPr kumimoji="1" lang="en-US" altLang="ja-JP" sz="1800" dirty="0"/>
+              <a:t>&lt;</a:t>
+            </a:r>
+            <a:r>
+              <a:rPr kumimoji="1" lang="ja-JP" altLang="en-US" sz="1800" dirty="0"/>
+              <a:t>タイプ</a:t>
+            </a:r>
+            <a:r>
+              <a:rPr lang="en-US" altLang="ja-JP" sz="1800" dirty="0"/>
+              <a:t>&gt; </a:t>
+            </a:r>
+            <a:r>
+              <a:rPr lang="ja-JP" altLang="en-US" sz="1800" dirty="0"/>
+              <a:t>は </a:t>
+            </a:r>
+            <a:r>
+              <a:rPr lang="en-US" altLang="ja-JP" sz="1800" dirty="0"/>
+              <a:t>week point </a:t>
+            </a:r>
+            <a:r>
+              <a:rPr lang="ja-JP" altLang="en-US" sz="1800" dirty="0"/>
+              <a:t>なら </a:t>
+            </a:r>
+            <a:r>
+              <a:rPr lang="en-US" altLang="ja-JP" sz="1800" dirty="0"/>
+              <a:t>w</a:t>
+            </a:r>
+            <a:r>
+              <a:rPr lang="ja-JP" altLang="en-US" sz="1800" dirty="0"/>
+              <a:t>，質問なら </a:t>
+            </a:r>
+            <a:r>
+              <a:rPr lang="en-US" altLang="ja-JP" sz="1800" dirty="0"/>
+              <a:t>q</a:t>
+            </a:r>
+            <a:r>
+              <a:rPr lang="ja-JP" altLang="en-US" sz="1800" dirty="0"/>
+              <a:t>，コメントなら </a:t>
+            </a:r>
+            <a:r>
+              <a:rPr lang="en-US" altLang="ja-JP" sz="1800" dirty="0"/>
+              <a:t>c</a:t>
+            </a:r>
+          </a:p>
+          <a:p>
+            <a:r>
+              <a:rPr lang="ja-JP" altLang="en-US" sz="1800" dirty="0"/>
+              <a:t>例：</a:t>
+            </a:r>
+            <a:endParaRPr lang="en-US" altLang="ja-JP" sz="1800" dirty="0"/>
+          </a:p>
+          <a:p>
+            <a:pPr lvl="1"/>
+            <a:r>
+              <a:rPr lang="en-US" altLang="ja-JP" sz="1800" dirty="0"/>
+              <a:t>$A1-c, $B3-w, $E7-q </a:t>
+            </a:r>
+            <a:r>
+              <a:rPr lang="ja-JP" altLang="en-US" sz="1800" dirty="0"/>
+              <a:t>など</a:t>
+            </a:r>
+            <a:endParaRPr lang="en-US" altLang="ja-JP" sz="1800" dirty="0"/>
+          </a:p>
+        </p:txBody>
+      </p:sp>
+    </p:spTree>
+    <p:extLst>
+      <p:ext uri="{BB962C8B-B14F-4D97-AF65-F5344CB8AC3E}">
+        <p14:creationId xmlns:p14="http://schemas.microsoft.com/office/powerpoint/2010/main" val="1324197351"/>
+      </p:ext>
+    </p:extLst>
+  </p:cSld>
+  <p:clrMapOvr>
+    <a:masterClrMapping/>
+  </p:clrMapOvr>
+  <mc:AlternateContent xmlns:mc="http://schemas.openxmlformats.org/markup-compatibility/2006" xmlns:p14="http://schemas.microsoft.com/office/powerpoint/2010/main">
+    <mc:Choice Requires="p14">
+      <p:transition p14:dur="10"/>
+    </mc:Choice>
+    <mc:Fallback xmlns="">
+      <p:transition/>
+    </mc:Fallback>
+  </mc:AlternateContent>
+</p:sld>
+</file>
+
+<file path=ppt/slides/slide16.xml><?xml version="1.0" encoding="utf-8"?>
+<p:sld xmlns:a="http://schemas.openxmlformats.org/drawingml/2006/main" xmlns:r="http://schemas.openxmlformats.org/officeDocument/2006/relationships" xmlns:p="http://schemas.openxmlformats.org/presentationml/2006/main">
+  <p:cSld>
+    <p:spTree>
+      <p:nvGrpSpPr>
+        <p:cNvPr id="1" name=""/>
+        <p:cNvGrpSpPr/>
+        <p:nvPr/>
+      </p:nvGrpSpPr>
+      <p:grpSpPr>
+        <a:xfrm>
+          <a:off x="0" y="0"/>
+          <a:ext cx="0" cy="0"/>
+          <a:chOff x="0" y="0"/>
+          <a:chExt cx="0" cy="0"/>
+        </a:xfrm>
+      </p:grpSpPr>
+      <p:sp>
+        <p:nvSpPr>
+          <p:cNvPr id="2" name="タイトル 1">
+            <a:extLst>
+              <a:ext uri="{FF2B5EF4-FFF2-40B4-BE49-F238E27FC236}">
+                <a16:creationId xmlns:a16="http://schemas.microsoft.com/office/drawing/2014/main" id="{3552FC58-F8EA-E936-CC7C-FBD585AE3EB1}"/>
+              </a:ext>
+            </a:extLst>
+          </p:cNvPr>
+          <p:cNvSpPr>
+            <a:spLocks noGrp="1"/>
+          </p:cNvSpPr>
+          <p:nvPr>
+            <p:ph type="title"/>
+          </p:nvPr>
+        </p:nvSpPr>
+        <p:spPr/>
+        <p:txBody>
+          <a:bodyPr/>
+          <a:lstStyle/>
+          <a:p>
+            <a:r>
+              <a:rPr kumimoji="1" lang="en-US" altLang="ja-JP" dirty="0"/>
+              <a:t>ID </a:t>
+            </a:r>
+            <a:r>
+              <a:rPr kumimoji="1" lang="ja-JP" altLang="en-US" dirty="0"/>
+              <a:t>フォーマットがこうなってる理由</a:t>
+            </a:r>
+          </a:p>
+        </p:txBody>
+      </p:sp>
+      <p:sp>
+        <p:nvSpPr>
+          <p:cNvPr id="3" name="テキスト プレースホルダー 2">
+            <a:extLst>
+              <a:ext uri="{FF2B5EF4-FFF2-40B4-BE49-F238E27FC236}">
+                <a16:creationId xmlns:a16="http://schemas.microsoft.com/office/drawing/2014/main" id="{399195B9-8ED2-6EA8-314C-DDF2412E7F4E}"/>
+              </a:ext>
+            </a:extLst>
+          </p:cNvPr>
+          <p:cNvSpPr>
+            <a:spLocks noGrp="1"/>
+          </p:cNvSpPr>
+          <p:nvPr>
+            <p:ph type="body" sz="quarter" idx="10"/>
+          </p:nvPr>
+        </p:nvSpPr>
+        <p:spPr/>
+        <p:txBody>
+          <a:bodyPr/>
+          <a:lstStyle/>
+          <a:p>
+            <a:r>
+              <a:rPr kumimoji="1" lang="ja-JP" altLang="en-US" sz="1800" dirty="0"/>
+              <a:t>主に識別を容易にするため：</a:t>
+            </a:r>
+            <a:endParaRPr kumimoji="1" lang="en-US" altLang="ja-JP" sz="1800" dirty="0"/>
+          </a:p>
+          <a:p>
+            <a:pPr lvl="1"/>
+            <a:r>
+              <a:rPr kumimoji="1" lang="ja-JP" altLang="en-US" sz="1800" dirty="0"/>
+              <a:t>議論するとき「査読者 </a:t>
+            </a:r>
+            <a:r>
+              <a:rPr kumimoji="1" lang="en-US" altLang="ja-JP" sz="1800" dirty="0"/>
+              <a:t>A </a:t>
+            </a:r>
+            <a:r>
+              <a:rPr kumimoji="1" lang="ja-JP" altLang="en-US" sz="1800" dirty="0"/>
+              <a:t>が言ってた～に関する説明がないというやつなんだけど」よりも 「コメント </a:t>
+            </a:r>
+            <a:r>
+              <a:rPr kumimoji="1" lang="en-US" altLang="ja-JP" sz="1800" dirty="0"/>
+              <a:t>A4 </a:t>
+            </a:r>
+            <a:r>
+              <a:rPr kumimoji="1" lang="ja-JP" altLang="en-US" sz="1800" dirty="0"/>
+              <a:t>なんだけど」の方が早い</a:t>
+            </a:r>
+            <a:endParaRPr kumimoji="1" lang="en-US" altLang="ja-JP" sz="1800" dirty="0"/>
+          </a:p>
+          <a:p>
+            <a:r>
+              <a:rPr kumimoji="1" lang="ja-JP" altLang="en-US" sz="1800" dirty="0"/>
+              <a:t>タイプ部分（</a:t>
+            </a:r>
+            <a:r>
+              <a:rPr kumimoji="1" lang="en-US" altLang="ja-JP" sz="1800" dirty="0"/>
+              <a:t>$A4-w </a:t>
+            </a:r>
+            <a:r>
+              <a:rPr kumimoji="1" lang="ja-JP" altLang="en-US" sz="1800" dirty="0"/>
+              <a:t>の </a:t>
+            </a:r>
+            <a:r>
+              <a:rPr kumimoji="1" lang="en-US" altLang="ja-JP" sz="1800" dirty="0"/>
+              <a:t>–w </a:t>
+            </a:r>
+            <a:r>
+              <a:rPr kumimoji="1" lang="ja-JP" altLang="en-US" sz="1800" dirty="0"/>
+              <a:t>の部分）は無視しても識別可能な方がよい</a:t>
+            </a:r>
+            <a:endParaRPr kumimoji="1" lang="en-US" altLang="ja-JP" sz="1800" dirty="0"/>
+          </a:p>
+          <a:p>
+            <a:pPr lvl="1"/>
+            <a:r>
+              <a:rPr kumimoji="1" lang="ja-JP" altLang="en-US" sz="1800" dirty="0"/>
+              <a:t>査読者ごとに一意な番号をふる</a:t>
+            </a:r>
+            <a:endParaRPr kumimoji="1" lang="en-US" altLang="ja-JP" sz="1800" dirty="0"/>
+          </a:p>
+          <a:p>
+            <a:pPr lvl="1"/>
+            <a:r>
+              <a:rPr kumimoji="1" lang="en-US" altLang="ja-JP" sz="1800" dirty="0"/>
+              <a:t>A1-w </a:t>
+            </a:r>
+            <a:r>
+              <a:rPr kumimoji="1" lang="ja-JP" altLang="en-US" sz="1800" dirty="0"/>
+              <a:t>と </a:t>
+            </a:r>
+            <a:r>
+              <a:rPr kumimoji="1" lang="en-US" altLang="ja-JP" sz="1800" dirty="0"/>
+              <a:t>A1-q </a:t>
+            </a:r>
+            <a:r>
+              <a:rPr kumimoji="1" lang="ja-JP" altLang="en-US" sz="1800" dirty="0"/>
+              <a:t>が並列に存在すると，どっちかわからなくなる</a:t>
+            </a:r>
+            <a:endParaRPr kumimoji="1" lang="en-US" altLang="ja-JP" sz="1800" dirty="0"/>
+          </a:p>
+          <a:p>
+            <a:r>
+              <a:rPr lang="ja-JP" altLang="en-US" sz="1800" dirty="0"/>
+              <a:t>タイプ部分は対応を考える際の重要度を簡易に表す</a:t>
+            </a:r>
+            <a:endParaRPr lang="en-US" altLang="ja-JP" sz="1800" dirty="0"/>
+          </a:p>
+          <a:p>
+            <a:pPr lvl="1"/>
+            <a:r>
+              <a:rPr lang="ja-JP" altLang="en-US" sz="1800" dirty="0"/>
+              <a:t>ただのコメント（</a:t>
+            </a:r>
+            <a:r>
+              <a:rPr lang="en-US" altLang="ja-JP" sz="1800" dirty="0"/>
+              <a:t>c</a:t>
+            </a:r>
+            <a:r>
+              <a:rPr lang="ja-JP" altLang="en-US" sz="1800" dirty="0"/>
+              <a:t>）と，弱点としてあげられている点（</a:t>
+            </a:r>
+            <a:r>
+              <a:rPr lang="en-US" altLang="ja-JP" sz="1800" dirty="0"/>
+              <a:t>w</a:t>
+            </a:r>
+            <a:r>
+              <a:rPr lang="ja-JP" altLang="en-US" sz="1800" dirty="0"/>
+              <a:t>）では異なる</a:t>
+            </a:r>
+            <a:endParaRPr lang="en-US" altLang="ja-JP" sz="1800" dirty="0"/>
+          </a:p>
+          <a:p>
+            <a:r>
+              <a:rPr lang="en-US" altLang="ja-JP" sz="1800" dirty="0"/>
+              <a:t>$ </a:t>
+            </a:r>
+            <a:r>
+              <a:rPr lang="ja-JP" altLang="en-US" sz="1800" dirty="0"/>
+              <a:t>はファイル内の検索性を上げるためにある</a:t>
+            </a:r>
+            <a:endParaRPr lang="en-US" altLang="ja-JP" sz="1800" dirty="0"/>
+          </a:p>
+          <a:p>
+            <a:pPr lvl="1"/>
+            <a:r>
+              <a:rPr kumimoji="1" lang="en-US" altLang="ja-JP" sz="1800" dirty="0"/>
+              <a:t>A1 </a:t>
+            </a:r>
+            <a:r>
+              <a:rPr kumimoji="1" lang="ja-JP" altLang="en-US" sz="1800" dirty="0"/>
+              <a:t>等だと，検索した際に査読コメント内の地の文でもヒットする可能性が結構高い</a:t>
+            </a:r>
+            <a:endParaRPr kumimoji="1" lang="en-US" altLang="ja-JP" sz="1800" dirty="0"/>
+          </a:p>
+        </p:txBody>
+      </p:sp>
+    </p:spTree>
+    <p:extLst>
+      <p:ext uri="{BB962C8B-B14F-4D97-AF65-F5344CB8AC3E}">
+        <p14:creationId xmlns:p14="http://schemas.microsoft.com/office/powerpoint/2010/main" val="1618595750"/>
+      </p:ext>
+    </p:extLst>
+  </p:cSld>
+  <p:clrMapOvr>
+    <a:masterClrMapping/>
+  </p:clrMapOvr>
+  <mc:AlternateContent xmlns:mc="http://schemas.openxmlformats.org/markup-compatibility/2006" xmlns:p14="http://schemas.microsoft.com/office/powerpoint/2010/main">
+    <mc:Choice Requires="p14">
+      <p:transition p14:dur="10"/>
+    </mc:Choice>
+    <mc:Fallback xmlns="">
+      <p:transition/>
+    </mc:Fallback>
+  </mc:AlternateContent>
+</p:sld>
+</file>
+
+<file path=ppt/slides/slide17.xml><?xml version="1.0" encoding="utf-8"?>
+<p:sld xmlns:a="http://schemas.openxmlformats.org/drawingml/2006/main" xmlns:r="http://schemas.openxmlformats.org/officeDocument/2006/relationships" xmlns:p="http://schemas.openxmlformats.org/presentationml/2006/main">
+  <p:cSld>
+    <p:spTree>
+      <p:nvGrpSpPr>
+        <p:cNvPr id="1" name=""/>
+        <p:cNvGrpSpPr/>
+        <p:nvPr/>
+      </p:nvGrpSpPr>
+      <p:grpSpPr>
+        <a:xfrm>
+          <a:off x="0" y="0"/>
+          <a:ext cx="0" cy="0"/>
+          <a:chOff x="0" y="0"/>
+          <a:chExt cx="0" cy="0"/>
+        </a:xfrm>
+      </p:grpSpPr>
+      <p:sp>
+        <p:nvSpPr>
+          <p:cNvPr id="2" name="タイトル 1">
+            <a:extLst>
+              <a:ext uri="{FF2B5EF4-FFF2-40B4-BE49-F238E27FC236}">
+                <a16:creationId xmlns:a16="http://schemas.microsoft.com/office/drawing/2014/main" id="{B96AD0FA-E9D6-EE5C-BA81-39B202C37D09}"/>
+              </a:ext>
+            </a:extLst>
+          </p:cNvPr>
+          <p:cNvSpPr>
+            <a:spLocks noGrp="1"/>
+          </p:cNvSpPr>
+          <p:nvPr>
+            <p:ph type="title"/>
+          </p:nvPr>
+        </p:nvSpPr>
+        <p:spPr/>
+        <p:txBody>
+          <a:bodyPr/>
+          <a:lstStyle/>
+          <a:p>
+            <a:r>
+              <a:rPr kumimoji="1" lang="en-US" altLang="ja-JP" dirty="0"/>
+              <a:t>ID </a:t>
+            </a:r>
+            <a:r>
+              <a:rPr kumimoji="1" lang="ja-JP" altLang="en-US" dirty="0"/>
+              <a:t>を振った主張にタイトルをつける</a:t>
+            </a:r>
+          </a:p>
+        </p:txBody>
+      </p:sp>
+      <p:sp>
+        <p:nvSpPr>
+          <p:cNvPr id="3" name="テキスト プレースホルダー 2">
+            <a:extLst>
+              <a:ext uri="{FF2B5EF4-FFF2-40B4-BE49-F238E27FC236}">
+                <a16:creationId xmlns:a16="http://schemas.microsoft.com/office/drawing/2014/main" id="{C331662F-15DA-EE17-1D0F-2812348D1152}"/>
+              </a:ext>
+            </a:extLst>
+          </p:cNvPr>
+          <p:cNvSpPr>
+            <a:spLocks noGrp="1"/>
+          </p:cNvSpPr>
+          <p:nvPr>
+            <p:ph type="body" sz="quarter" idx="10"/>
+          </p:nvPr>
+        </p:nvSpPr>
+        <p:spPr/>
+        <p:txBody>
+          <a:bodyPr/>
+          <a:lstStyle/>
+          <a:p>
+            <a:r>
+              <a:rPr kumimoji="1" lang="ja-JP" altLang="en-US" sz="1800" dirty="0"/>
+              <a:t>主張ごとにタイトルをつけ，先頭に括弧とともに </a:t>
+            </a:r>
+            <a:r>
+              <a:rPr kumimoji="1" lang="en-US" altLang="ja-JP" sz="1800" dirty="0"/>
+              <a:t>ID </a:t>
+            </a:r>
+            <a:r>
+              <a:rPr kumimoji="1" lang="ja-JP" altLang="en-US" sz="1800" dirty="0"/>
+              <a:t>をつける</a:t>
+            </a:r>
+            <a:endParaRPr kumimoji="1" lang="en-US" altLang="ja-JP" sz="1800" dirty="0"/>
+          </a:p>
+          <a:p>
+            <a:r>
+              <a:rPr kumimoji="1" lang="ja-JP" altLang="en-US" sz="1800" dirty="0"/>
+              <a:t>例：</a:t>
+            </a:r>
+            <a:endParaRPr kumimoji="1" lang="en-US" altLang="ja-JP" sz="1800" dirty="0"/>
+          </a:p>
+          <a:p>
+            <a:pPr lvl="1"/>
+            <a:r>
+              <a:rPr kumimoji="1" lang="en-US" altLang="ja-JP" sz="1800" dirty="0"/>
+              <a:t>($A1-q) </a:t>
+            </a:r>
+            <a:r>
+              <a:rPr kumimoji="1" lang="ja-JP" altLang="en-US" sz="1800" dirty="0"/>
+              <a:t>関数がループで繰り返される場合はうまく学習できるのか？</a:t>
+            </a:r>
+            <a:endParaRPr kumimoji="1" lang="en-US" altLang="ja-JP" sz="1800" dirty="0"/>
+          </a:p>
+          <a:p>
+            <a:pPr lvl="1"/>
+            <a:r>
+              <a:rPr kumimoji="1" lang="en-US" altLang="ja-JP" sz="1800" dirty="0"/>
+              <a:t>($A2-q) Figure 17 </a:t>
+            </a:r>
+            <a:r>
+              <a:rPr kumimoji="1" lang="ja-JP" altLang="en-US" sz="1800" dirty="0"/>
+              <a:t>の </a:t>
+            </a:r>
+            <a:r>
+              <a:rPr kumimoji="1" lang="en-US" altLang="ja-JP" sz="1800" dirty="0"/>
+              <a:t>Distance </a:t>
+            </a:r>
+            <a:r>
+              <a:rPr kumimoji="1" lang="ja-JP" altLang="en-US" sz="1800" dirty="0"/>
+              <a:t>はどのように定義したのか？</a:t>
+            </a:r>
+            <a:endParaRPr kumimoji="1" lang="en-US" altLang="ja-JP" sz="1800" dirty="0"/>
+          </a:p>
+          <a:p>
+            <a:pPr lvl="1"/>
+            <a:r>
+              <a:rPr kumimoji="1" lang="en-US" altLang="ja-JP" sz="1800" dirty="0"/>
+              <a:t>($B11-c) Distance </a:t>
+            </a:r>
+            <a:r>
+              <a:rPr kumimoji="1" lang="ja-JP" altLang="en-US" sz="1800" dirty="0"/>
+              <a:t>の動的な変更をしたほうが良いか</a:t>
+            </a:r>
+          </a:p>
+        </p:txBody>
+      </p:sp>
+    </p:spTree>
+    <p:extLst>
+      <p:ext uri="{BB962C8B-B14F-4D97-AF65-F5344CB8AC3E}">
+        <p14:creationId xmlns:p14="http://schemas.microsoft.com/office/powerpoint/2010/main" val="3986084711"/>
+      </p:ext>
+    </p:extLst>
+  </p:cSld>
+  <p:clrMapOvr>
+    <a:masterClrMapping/>
+  </p:clrMapOvr>
+  <mc:AlternateContent xmlns:mc="http://schemas.openxmlformats.org/markup-compatibility/2006" xmlns:p14="http://schemas.microsoft.com/office/powerpoint/2010/main">
+    <mc:Choice Requires="p14">
+      <p:transition p14:dur="10"/>
+    </mc:Choice>
+    <mc:Fallback xmlns="">
+      <p:transition/>
+    </mc:Fallback>
+  </mc:AlternateContent>
+</p:sld>
+</file>
+
+<file path=ppt/slides/slide18.xml><?xml version="1.0" encoding="utf-8"?>
 <p:sld xmlns:a="http://schemas.openxmlformats.org/drawingml/2006/main" xmlns:r="http://schemas.openxmlformats.org/officeDocument/2006/relationships" xmlns:p="http://schemas.openxmlformats.org/presentationml/2006/main">
   <p:cSld>
     <p:spTree>
@@ -3879,7 +5412,7 @@
 </p:sld>
 </file>
 
-<file path=ppt/slides/slide11.xml><?xml version="1.0" encoding="utf-8"?>
+<file path=ppt/slides/slide19.xml><?xml version="1.0" encoding="utf-8"?>
 <p:sld xmlns:a="http://schemas.openxmlformats.org/drawingml/2006/main" xmlns:r="http://schemas.openxmlformats.org/officeDocument/2006/relationships" xmlns:p="http://schemas.openxmlformats.org/presentationml/2006/main">
   <p:cSld>
     <p:spTree>
@@ -3960,7 +5493,15 @@
             <a:pPr lvl="1"/>
             <a:r>
               <a:rPr kumimoji="1" lang="ja-JP" altLang="en-US" sz="1800" dirty="0"/>
-              <a:t>（日本語訳．機械翻訳でも良いが，そのときは必ず原文も載せる）</a:t>
+              <a:t>対応する査読コメント全文</a:t>
+            </a:r>
+            <a:endParaRPr kumimoji="1" lang="en-US" altLang="ja-JP" sz="1800" dirty="0"/>
+          </a:p>
+          <a:p>
+            <a:pPr lvl="2"/>
+            <a:r>
+              <a:rPr kumimoji="1" lang="ja-JP" altLang="en-US" sz="1800" dirty="0"/>
+              <a:t>日本語にする時は必ず原文も載せる</a:t>
             </a:r>
             <a:endParaRPr kumimoji="1" lang="en-US" altLang="ja-JP" sz="1800" dirty="0"/>
           </a:p>
@@ -4505,7 +6046,156 @@
 </p:sld>
 </file>
 
-<file path=ppt/slides/slide12.xml><?xml version="1.0" encoding="utf-8"?>
+<file path=ppt/slides/slide2.xml><?xml version="1.0" encoding="utf-8"?>
+<p:sld xmlns:a="http://schemas.openxmlformats.org/drawingml/2006/main" xmlns:r="http://schemas.openxmlformats.org/officeDocument/2006/relationships" xmlns:p="http://schemas.openxmlformats.org/presentationml/2006/main">
+  <p:cSld>
+    <p:spTree>
+      <p:nvGrpSpPr>
+        <p:cNvPr id="1" name=""/>
+        <p:cNvGrpSpPr/>
+        <p:nvPr/>
+      </p:nvGrpSpPr>
+      <p:grpSpPr>
+        <a:xfrm>
+          <a:off x="0" y="0"/>
+          <a:ext cx="0" cy="0"/>
+          <a:chOff x="0" y="0"/>
+          <a:chExt cx="0" cy="0"/>
+        </a:xfrm>
+      </p:grpSpPr>
+      <p:sp>
+        <p:nvSpPr>
+          <p:cNvPr id="2" name="タイトル 1">
+            <a:extLst>
+              <a:ext uri="{FF2B5EF4-FFF2-40B4-BE49-F238E27FC236}">
+                <a16:creationId xmlns:a16="http://schemas.microsoft.com/office/drawing/2014/main" id="{9D61C188-5860-DCBE-4F54-3F8C103E2DAC}"/>
+              </a:ext>
+            </a:extLst>
+          </p:cNvPr>
+          <p:cNvSpPr>
+            <a:spLocks noGrp="1"/>
+          </p:cNvSpPr>
+          <p:nvPr>
+            <p:ph type="title"/>
+          </p:nvPr>
+        </p:nvSpPr>
+        <p:spPr/>
+        <p:txBody>
+          <a:bodyPr/>
+          <a:lstStyle/>
+          <a:p>
+            <a:r>
+              <a:rPr kumimoji="1" lang="ja-JP" altLang="en-US" dirty="0"/>
+              <a:t>はじめに</a:t>
+            </a:r>
+          </a:p>
+        </p:txBody>
+      </p:sp>
+      <p:sp>
+        <p:nvSpPr>
+          <p:cNvPr id="3" name="テキスト プレースホルダー 2">
+            <a:extLst>
+              <a:ext uri="{FF2B5EF4-FFF2-40B4-BE49-F238E27FC236}">
+                <a16:creationId xmlns:a16="http://schemas.microsoft.com/office/drawing/2014/main" id="{16406EAA-6DD5-1103-E09E-A8675115D0B4}"/>
+              </a:ext>
+            </a:extLst>
+          </p:cNvPr>
+          <p:cNvSpPr>
+            <a:spLocks noGrp="1"/>
+          </p:cNvSpPr>
+          <p:nvPr>
+            <p:ph type="body" sz="quarter" idx="10"/>
+          </p:nvPr>
+        </p:nvSpPr>
+        <p:spPr/>
+        <p:txBody>
+          <a:bodyPr/>
+          <a:lstStyle/>
+          <a:p>
+            <a:r>
+              <a:rPr lang="ja-JP" altLang="en-US" dirty="0"/>
+              <a:t>この文章では，査読に対する返答の進め方を解説する</a:t>
+            </a:r>
+            <a:endParaRPr lang="en-US" altLang="ja-JP" dirty="0"/>
+          </a:p>
+          <a:p>
+            <a:pPr lvl="1"/>
+            <a:r>
+              <a:rPr kumimoji="1" lang="ja-JP" altLang="en-US" dirty="0"/>
+              <a:t>「</a:t>
+            </a:r>
+            <a:r>
+              <a:rPr kumimoji="1" lang="en-US" altLang="ja-JP" dirty="0"/>
+              <a:t>rebuttal</a:t>
+            </a:r>
+            <a:r>
+              <a:rPr kumimoji="1" lang="ja-JP" altLang="en-US" dirty="0"/>
+              <a:t>」「</a:t>
+            </a:r>
+            <a:r>
+              <a:rPr kumimoji="1" lang="en-US" altLang="ja-JP" dirty="0"/>
+              <a:t>author response</a:t>
+            </a:r>
+            <a:r>
+              <a:rPr kumimoji="1" lang="ja-JP" altLang="en-US" dirty="0"/>
+              <a:t>」と言われるもの</a:t>
+            </a:r>
+            <a:endParaRPr kumimoji="1" lang="en-US" altLang="ja-JP" dirty="0"/>
+          </a:p>
+          <a:p>
+            <a:pPr lvl="1"/>
+            <a:r>
+              <a:rPr kumimoji="1" lang="ja-JP" altLang="en-US" dirty="0"/>
+              <a:t>論文誌の条件付き採録でも，基本的に同様のやり方で良いと思う</a:t>
+            </a:r>
+            <a:endParaRPr kumimoji="1" lang="en-US" altLang="ja-JP" dirty="0"/>
+          </a:p>
+          <a:p>
+            <a:r>
+              <a:rPr kumimoji="1" lang="ja-JP" altLang="en-US" dirty="0"/>
+              <a:t>備考：</a:t>
+            </a:r>
+            <a:endParaRPr kumimoji="1" lang="en-US" altLang="ja-JP" dirty="0"/>
+          </a:p>
+          <a:p>
+            <a:pPr lvl="1"/>
+            <a:r>
+              <a:rPr kumimoji="1" lang="ja-JP" altLang="en-US" dirty="0"/>
+              <a:t>この解説はコンピュータ・システム系分野の事情にかなり依存している可能性はある</a:t>
+            </a:r>
+            <a:endParaRPr kumimoji="1" lang="en-US" altLang="ja-JP" dirty="0"/>
+          </a:p>
+          <a:p>
+            <a:r>
+              <a:rPr kumimoji="1" lang="ja-JP" altLang="en-US" dirty="0"/>
+              <a:t>まず背景と指針について説明した後，作業の仕方を説明</a:t>
+            </a:r>
+            <a:endParaRPr kumimoji="1" lang="en-US" altLang="ja-JP" dirty="0"/>
+          </a:p>
+        </p:txBody>
+      </p:sp>
+    </p:spTree>
+    <p:extLst>
+      <p:ext uri="{BB962C8B-B14F-4D97-AF65-F5344CB8AC3E}">
+        <p14:creationId xmlns:p14="http://schemas.microsoft.com/office/powerpoint/2010/main" val="3860254781"/>
+      </p:ext>
+    </p:extLst>
+  </p:cSld>
+  <p:clrMapOvr>
+    <a:masterClrMapping/>
+  </p:clrMapOvr>
+  <mc:AlternateContent xmlns:mc="http://schemas.openxmlformats.org/markup-compatibility/2006" xmlns:p14="http://schemas.microsoft.com/office/powerpoint/2010/main">
+    <mc:Choice Requires="p14">
+      <p:transition p14:dur="10"/>
+    </mc:Choice>
+    <mc:Fallback xmlns="">
+      <p:transition/>
+    </mc:Fallback>
+  </mc:AlternateContent>
+</p:sld>
+</file>
+
+<file path=ppt/slides/slide20.xml><?xml version="1.0" encoding="utf-8"?>
 <p:sld xmlns:a="http://schemas.openxmlformats.org/drawingml/2006/main" xmlns:r="http://schemas.openxmlformats.org/officeDocument/2006/relationships" xmlns:p="http://schemas.openxmlformats.org/presentationml/2006/main">
   <p:cSld>
     <p:spTree>
@@ -4563,7 +6253,7 @@
 </p:sld>
 </file>
 
-<file path=ppt/slides/slide13.xml><?xml version="1.0" encoding="utf-8"?>
+<file path=ppt/slides/slide21.xml><?xml version="1.0" encoding="utf-8"?>
 <p:sld xmlns:a="http://schemas.openxmlformats.org/drawingml/2006/main" xmlns:r="http://schemas.openxmlformats.org/officeDocument/2006/relationships" xmlns:p="http://schemas.openxmlformats.org/presentationml/2006/main">
   <p:cSld>
     <p:spTree>
@@ -4681,7 +6371,7 @@
 </p:sld>
 </file>
 
-<file path=ppt/slides/slide14.xml><?xml version="1.0" encoding="utf-8"?>
+<file path=ppt/slides/slide22.xml><?xml version="1.0" encoding="utf-8"?>
 <p:sld xmlns:a="http://schemas.openxmlformats.org/drawingml/2006/main" xmlns:r="http://schemas.openxmlformats.org/officeDocument/2006/relationships" xmlns:p="http://schemas.openxmlformats.org/presentationml/2006/main">
   <p:cSld>
     <p:spTree>
@@ -4878,7 +6568,7 @@
 </p:sld>
 </file>
 
-<file path=ppt/slides/slide15.xml><?xml version="1.0" encoding="utf-8"?>
+<file path=ppt/slides/slide23.xml><?xml version="1.0" encoding="utf-8"?>
 <p:sld xmlns:a="http://schemas.openxmlformats.org/drawingml/2006/main" xmlns:r="http://schemas.openxmlformats.org/officeDocument/2006/relationships" xmlns:p="http://schemas.openxmlformats.org/presentationml/2006/main">
   <p:cSld>
     <p:spTree>
@@ -5599,7 +7289,7 @@
 </p:sld>
 </file>
 
-<file path=ppt/slides/slide16.xml><?xml version="1.0" encoding="utf-8"?>
+<file path=ppt/slides/slide24.xml><?xml version="1.0" encoding="utf-8"?>
 <p:sld xmlns:a="http://schemas.openxmlformats.org/drawingml/2006/main" xmlns:r="http://schemas.openxmlformats.org/officeDocument/2006/relationships" xmlns:p="http://schemas.openxmlformats.org/presentationml/2006/main">
   <p:cSld>
     <p:spTree>
@@ -6358,7 +8048,7 @@
 </p:sld>
 </file>
 
-<file path=ppt/slides/slide17.xml><?xml version="1.0" encoding="utf-8"?>
+<file path=ppt/slides/slide25.xml><?xml version="1.0" encoding="utf-8"?>
 <p:sld xmlns:a="http://schemas.openxmlformats.org/drawingml/2006/main" xmlns:r="http://schemas.openxmlformats.org/officeDocument/2006/relationships" xmlns:p="http://schemas.openxmlformats.org/presentationml/2006/main">
   <p:cSld>
     <p:spTree>
@@ -7529,7 +9219,127 @@
 </p:sld>
 </file>
 
-<file path=ppt/slides/slide18.xml><?xml version="1.0" encoding="utf-8"?>
+<file path=ppt/slides/slide3.xml><?xml version="1.0" encoding="utf-8"?>
+<p:sld xmlns:a="http://schemas.openxmlformats.org/drawingml/2006/main" xmlns:r="http://schemas.openxmlformats.org/officeDocument/2006/relationships" xmlns:p="http://schemas.openxmlformats.org/presentationml/2006/main">
+  <p:cSld>
+    <p:spTree>
+      <p:nvGrpSpPr>
+        <p:cNvPr id="1" name=""/>
+        <p:cNvGrpSpPr/>
+        <p:nvPr/>
+      </p:nvGrpSpPr>
+      <p:grpSpPr>
+        <a:xfrm>
+          <a:off x="0" y="0"/>
+          <a:ext cx="0" cy="0"/>
+          <a:chOff x="0" y="0"/>
+          <a:chExt cx="0" cy="0"/>
+        </a:xfrm>
+      </p:grpSpPr>
+      <p:sp>
+        <p:nvSpPr>
+          <p:cNvPr id="2" name="タイトル 1">
+            <a:extLst>
+              <a:ext uri="{FF2B5EF4-FFF2-40B4-BE49-F238E27FC236}">
+                <a16:creationId xmlns:a16="http://schemas.microsoft.com/office/drawing/2014/main" id="{FC3C4FDA-557C-1FCC-BC76-4EE02F5DA3B1}"/>
+              </a:ext>
+            </a:extLst>
+          </p:cNvPr>
+          <p:cNvSpPr>
+            <a:spLocks noGrp="1"/>
+          </p:cNvSpPr>
+          <p:nvPr>
+            <p:ph type="title"/>
+          </p:nvPr>
+        </p:nvSpPr>
+        <p:spPr/>
+        <p:txBody>
+          <a:bodyPr/>
+          <a:lstStyle/>
+          <a:p>
+            <a:r>
+              <a:rPr kumimoji="1" lang="ja-JP" altLang="en-US" dirty="0"/>
+              <a:t>もくじ</a:t>
+            </a:r>
+          </a:p>
+        </p:txBody>
+      </p:sp>
+      <p:sp>
+        <p:nvSpPr>
+          <p:cNvPr id="3" name="テキスト プレースホルダー 2">
+            <a:extLst>
+              <a:ext uri="{FF2B5EF4-FFF2-40B4-BE49-F238E27FC236}">
+                <a16:creationId xmlns:a16="http://schemas.microsoft.com/office/drawing/2014/main" id="{18B956B2-DEB9-3B69-F99C-B191AF9563E2}"/>
+              </a:ext>
+            </a:extLst>
+          </p:cNvPr>
+          <p:cNvSpPr>
+            <a:spLocks noGrp="1"/>
+          </p:cNvSpPr>
+          <p:nvPr>
+            <p:ph type="body" sz="quarter" idx="10"/>
+          </p:nvPr>
+        </p:nvSpPr>
+        <p:spPr/>
+        <p:txBody>
+          <a:bodyPr/>
+          <a:lstStyle/>
+          <a:p>
+            <a:pPr marL="457200" indent="-457200">
+              <a:buFont typeface="+mj-lt"/>
+              <a:buAutoNum type="arabicPeriod"/>
+            </a:pPr>
+            <a:r>
+              <a:rPr kumimoji="1" lang="ja-JP" altLang="en-US" dirty="0"/>
+              <a:t>背景と指針</a:t>
+            </a:r>
+          </a:p>
+          <a:p>
+            <a:pPr marL="457200" indent="-457200">
+              <a:buFont typeface="+mj-lt"/>
+              <a:buAutoNum type="arabicPeriod"/>
+            </a:pPr>
+            <a:r>
+              <a:rPr kumimoji="1" lang="ja-JP" altLang="en-US" dirty="0"/>
+              <a:t>主張の整理</a:t>
+            </a:r>
+            <a:endParaRPr kumimoji="1" lang="en-US" altLang="ja-JP" dirty="0"/>
+          </a:p>
+          <a:p>
+            <a:pPr marL="457200" indent="-457200">
+              <a:buFont typeface="+mj-lt"/>
+              <a:buAutoNum type="arabicPeriod"/>
+            </a:pPr>
+            <a:r>
+              <a:rPr kumimoji="1" lang="ja-JP" altLang="en-US" dirty="0"/>
+              <a:t>タスク管理</a:t>
+            </a:r>
+            <a:endParaRPr kumimoji="1" lang="en-US" altLang="ja-JP" dirty="0"/>
+          </a:p>
+        </p:txBody>
+      </p:sp>
+    </p:spTree>
+    <p:extLst>
+      <p:ext uri="{BB962C8B-B14F-4D97-AF65-F5344CB8AC3E}">
+        <p14:creationId xmlns:p14="http://schemas.microsoft.com/office/powerpoint/2010/main" val="3232007004"/>
+      </p:ext>
+    </p:extLst>
+  </p:cSld>
+  <p:clrMapOvr>
+    <a:masterClrMapping/>
+  </p:clrMapOvr>
+  <mc:AlternateContent xmlns:mc="http://schemas.openxmlformats.org/markup-compatibility/2006" xmlns:p14="http://schemas.microsoft.com/office/powerpoint/2010/main">
+    <mc:Choice Requires="p14">
+      <p:transition p14:dur="10"/>
+    </mc:Choice>
+    <mc:Fallback xmlns="">
+      <p:transition/>
+    </mc:Fallback>
+  </mc:AlternateContent>
+</p:sld>
+</file>
+
+<file path=ppt/slides/slide4.xml><?xml version="1.0" encoding="utf-8"?>
 <p:sld xmlns:a="http://schemas.openxmlformats.org/drawingml/2006/main" xmlns:r="http://schemas.openxmlformats.org/officeDocument/2006/relationships" xmlns:p="http://schemas.openxmlformats.org/presentationml/2006/main">
   <p:cSld>
     <p:spTree>
@@ -7569,7 +9379,7 @@
           <a:p>
             <a:r>
               <a:rPr lang="ja-JP" altLang="en-US" b="1" dirty="0"/>
-              <a:t>反論の指針</a:t>
+              <a:t>背景と指針</a:t>
             </a:r>
           </a:p>
         </p:txBody>
@@ -7577,7 +9387,7 @@
     </p:spTree>
     <p:extLst>
       <p:ext uri="{BB962C8B-B14F-4D97-AF65-F5344CB8AC3E}">
-        <p14:creationId xmlns:p14="http://schemas.microsoft.com/office/powerpoint/2010/main" val="191294928"/>
+        <p14:creationId xmlns:p14="http://schemas.microsoft.com/office/powerpoint/2010/main" val="1978054224"/>
       </p:ext>
     </p:extLst>
   </p:cSld>
@@ -7587,7 +9397,7 @@
 </p:sld>
 </file>
 
-<file path=ppt/slides/slide19.xml><?xml version="1.0" encoding="utf-8"?>
+<file path=ppt/slides/slide5.xml><?xml version="1.0" encoding="utf-8"?>
 <p:sld xmlns:a="http://schemas.openxmlformats.org/drawingml/2006/main" xmlns:r="http://schemas.openxmlformats.org/officeDocument/2006/relationships" xmlns:p="http://schemas.openxmlformats.org/presentationml/2006/main">
   <p:cSld>
     <p:spTree>
@@ -7654,54 +9464,54 @@
           <a:lstStyle/>
           <a:p>
             <a:r>
-              <a:rPr lang="ja-JP" altLang="en-US" dirty="0"/>
-              <a:t>査読者は３～６人程度</a:t>
-            </a:r>
-            <a:endParaRPr lang="en-US" altLang="ja-JP" dirty="0"/>
+              <a:rPr lang="ja-JP" altLang="en-US" sz="1800" dirty="0"/>
+              <a:t>コンピュータ・システム系の場合，査読者は３～６人程度</a:t>
+            </a:r>
+            <a:endParaRPr lang="en-US" altLang="ja-JP" sz="1800" dirty="0"/>
           </a:p>
           <a:p>
             <a:pPr lvl="1"/>
             <a:r>
-              <a:rPr lang="ja-JP" altLang="en-US" dirty="0"/>
+              <a:rPr lang="ja-JP" altLang="en-US" sz="1800" dirty="0"/>
               <a:t>レベルが高い会議ほど一般には多い</a:t>
             </a:r>
-            <a:endParaRPr lang="en-US" altLang="ja-JP" dirty="0"/>
-          </a:p>
-          <a:p>
-            <a:r>
-              <a:rPr lang="ja-JP" altLang="en-US" dirty="0"/>
+            <a:endParaRPr lang="en-US" altLang="ja-JP" sz="1800" dirty="0"/>
+          </a:p>
+          <a:p>
+            <a:r>
+              <a:rPr lang="ja-JP" altLang="en-US" sz="1800" dirty="0"/>
               <a:t>典型的には，リバッタルがついた後に査読者同士で議論が行われる</a:t>
             </a:r>
-            <a:endParaRPr lang="en-US" altLang="ja-JP" dirty="0"/>
+            <a:endParaRPr lang="en-US" altLang="ja-JP" sz="1800" dirty="0"/>
           </a:p>
           <a:p>
             <a:pPr lvl="1"/>
             <a:r>
-              <a:rPr lang="ja-JP" altLang="en-US" dirty="0"/>
+              <a:rPr lang="ja-JP" altLang="en-US" sz="1800" dirty="0"/>
               <a:t>リードと呼ばれる担当者が決められ，各人の意見を聞いて回る</a:t>
             </a:r>
-            <a:endParaRPr lang="en-US" altLang="ja-JP" dirty="0"/>
+            <a:endParaRPr lang="en-US" altLang="ja-JP" sz="1800" dirty="0"/>
           </a:p>
           <a:p>
             <a:pPr lvl="1"/>
             <a:r>
-              <a:rPr lang="ja-JP" altLang="en-US" dirty="0"/>
-              <a:t>特にポジティブな人がリード担当になることが多い</a:t>
-            </a:r>
-            <a:endParaRPr lang="en-US" altLang="ja-JP" dirty="0"/>
+              <a:rPr lang="ja-JP" altLang="en-US" sz="1800" dirty="0"/>
+              <a:t>ポジティブな人がリード担当になることが多いが，ランダムな場合も</a:t>
+            </a:r>
+            <a:endParaRPr lang="en-US" altLang="ja-JP" sz="1800" dirty="0"/>
           </a:p>
           <a:p>
             <a:pPr lvl="1"/>
             <a:r>
-              <a:rPr lang="ja-JP" altLang="en-US" dirty="0"/>
+              <a:rPr lang="ja-JP" altLang="en-US" sz="1800" dirty="0"/>
               <a:t>特に強くポジティブ</a:t>
             </a:r>
             <a:r>
-              <a:rPr lang="en-US" altLang="ja-JP" dirty="0"/>
+              <a:rPr lang="en-US" altLang="ja-JP" sz="1800" dirty="0"/>
               <a:t> or </a:t>
             </a:r>
             <a:r>
-              <a:rPr lang="ja-JP" altLang="en-US" dirty="0"/>
+              <a:rPr lang="ja-JP" altLang="en-US" sz="1800" dirty="0"/>
               <a:t>ネガティブな意見を持つ人は，詳細な意見を求められる事が多い</a:t>
             </a:r>
           </a:p>
@@ -7736,7 +9546,7 @@
             <a:fld id="{D2D8002D-B5B0-4BAC-B1F6-782DDCCE6D9C}" type="slidenum">
               <a:rPr kumimoji="1" lang="ja-JP" altLang="en-US" smtClean="0"/>
               <a:pPr/>
-              <a:t>19</a:t>
+              <a:t>5</a:t>
             </a:fld>
             <a:endParaRPr kumimoji="1" lang="ja-JP" altLang="en-US"/>
           </a:p>
@@ -7745,7 +9555,7 @@
     </p:spTree>
     <p:extLst>
       <p:ext uri="{BB962C8B-B14F-4D97-AF65-F5344CB8AC3E}">
-        <p14:creationId xmlns:p14="http://schemas.microsoft.com/office/powerpoint/2010/main" val="3966746569"/>
+        <p14:creationId xmlns:p14="http://schemas.microsoft.com/office/powerpoint/2010/main" val="1834643933"/>
       </p:ext>
     </p:extLst>
   </p:cSld>
@@ -7763,149 +9573,7 @@
 </p:sld>
 </file>
 
-<file path=ppt/slides/slide2.xml><?xml version="1.0" encoding="utf-8"?>
-<p:sld xmlns:a="http://schemas.openxmlformats.org/drawingml/2006/main" xmlns:r="http://schemas.openxmlformats.org/officeDocument/2006/relationships" xmlns:p="http://schemas.openxmlformats.org/presentationml/2006/main">
-  <p:cSld>
-    <p:spTree>
-      <p:nvGrpSpPr>
-        <p:cNvPr id="1" name=""/>
-        <p:cNvGrpSpPr/>
-        <p:nvPr/>
-      </p:nvGrpSpPr>
-      <p:grpSpPr>
-        <a:xfrm>
-          <a:off x="0" y="0"/>
-          <a:ext cx="0" cy="0"/>
-          <a:chOff x="0" y="0"/>
-          <a:chExt cx="0" cy="0"/>
-        </a:xfrm>
-      </p:grpSpPr>
-      <p:sp>
-        <p:nvSpPr>
-          <p:cNvPr id="2" name="タイトル 1">
-            <a:extLst>
-              <a:ext uri="{FF2B5EF4-FFF2-40B4-BE49-F238E27FC236}">
-                <a16:creationId xmlns:a16="http://schemas.microsoft.com/office/drawing/2014/main" id="{9D61C188-5860-DCBE-4F54-3F8C103E2DAC}"/>
-              </a:ext>
-            </a:extLst>
-          </p:cNvPr>
-          <p:cNvSpPr>
-            <a:spLocks noGrp="1"/>
-          </p:cNvSpPr>
-          <p:nvPr>
-            <p:ph type="title"/>
-          </p:nvPr>
-        </p:nvSpPr>
-        <p:spPr/>
-        <p:txBody>
-          <a:bodyPr/>
-          <a:lstStyle/>
-          <a:p>
-            <a:r>
-              <a:rPr kumimoji="1" lang="ja-JP" altLang="en-US" dirty="0"/>
-              <a:t>はじめに</a:t>
-            </a:r>
-          </a:p>
-        </p:txBody>
-      </p:sp>
-      <p:sp>
-        <p:nvSpPr>
-          <p:cNvPr id="3" name="テキスト プレースホルダー 2">
-            <a:extLst>
-              <a:ext uri="{FF2B5EF4-FFF2-40B4-BE49-F238E27FC236}">
-                <a16:creationId xmlns:a16="http://schemas.microsoft.com/office/drawing/2014/main" id="{16406EAA-6DD5-1103-E09E-A8675115D0B4}"/>
-              </a:ext>
-            </a:extLst>
-          </p:cNvPr>
-          <p:cNvSpPr>
-            <a:spLocks noGrp="1"/>
-          </p:cNvSpPr>
-          <p:nvPr>
-            <p:ph type="body" sz="quarter" idx="10"/>
-          </p:nvPr>
-        </p:nvSpPr>
-        <p:spPr/>
-        <p:txBody>
-          <a:bodyPr/>
-          <a:lstStyle/>
-          <a:p>
-            <a:r>
-              <a:rPr lang="ja-JP" altLang="en-US" dirty="0"/>
-              <a:t>この文章では，査読に対する返答の進め方を解説する</a:t>
-            </a:r>
-            <a:endParaRPr lang="en-US" altLang="ja-JP" dirty="0"/>
-          </a:p>
-          <a:p>
-            <a:pPr lvl="1"/>
-            <a:r>
-              <a:rPr kumimoji="1" lang="ja-JP" altLang="en-US" dirty="0"/>
-              <a:t>「</a:t>
-            </a:r>
-            <a:r>
-              <a:rPr kumimoji="1" lang="en-US" altLang="ja-JP" dirty="0"/>
-              <a:t>rebuttal</a:t>
-            </a:r>
-            <a:r>
-              <a:rPr kumimoji="1" lang="ja-JP" altLang="en-US" dirty="0"/>
-              <a:t>」「</a:t>
-            </a:r>
-            <a:r>
-              <a:rPr kumimoji="1" lang="en-US" altLang="ja-JP" dirty="0"/>
-              <a:t>author response</a:t>
-            </a:r>
-            <a:r>
-              <a:rPr kumimoji="1" lang="ja-JP" altLang="en-US" dirty="0"/>
-              <a:t>」と言われるもの</a:t>
-            </a:r>
-            <a:endParaRPr kumimoji="1" lang="en-US" altLang="ja-JP" dirty="0"/>
-          </a:p>
-          <a:p>
-            <a:pPr lvl="1"/>
-            <a:r>
-              <a:rPr kumimoji="1" lang="ja-JP" altLang="en-US" dirty="0"/>
-              <a:t>論文誌の条件付き採録でもあまり変わらないと思う</a:t>
-            </a:r>
-            <a:endParaRPr kumimoji="1" lang="en-US" altLang="ja-JP" dirty="0"/>
-          </a:p>
-          <a:p>
-            <a:pPr lvl="1"/>
-            <a:r>
-              <a:rPr kumimoji="1" lang="ja-JP" altLang="en-US" dirty="0"/>
-              <a:t>この解説は，コンピュータ・システム系分野の事情にかなり依存している可能性はある</a:t>
-            </a:r>
-            <a:endParaRPr kumimoji="1" lang="en-US" altLang="ja-JP" dirty="0"/>
-          </a:p>
-          <a:p>
-            <a:r>
-              <a:rPr kumimoji="1" lang="ja-JP" altLang="en-US" dirty="0"/>
-              <a:t>まず作業の仕方を説明した後に，反論の指針について説明</a:t>
-            </a:r>
-            <a:endParaRPr kumimoji="1" lang="en-US" altLang="ja-JP" dirty="0"/>
-          </a:p>
-        </p:txBody>
-      </p:sp>
-    </p:spTree>
-    <p:extLst>
-      <p:ext uri="{BB962C8B-B14F-4D97-AF65-F5344CB8AC3E}">
-        <p14:creationId xmlns:p14="http://schemas.microsoft.com/office/powerpoint/2010/main" val="3860254781"/>
-      </p:ext>
-    </p:extLst>
-  </p:cSld>
-  <p:clrMapOvr>
-    <a:masterClrMapping/>
-  </p:clrMapOvr>
-  <mc:AlternateContent xmlns:mc="http://schemas.openxmlformats.org/markup-compatibility/2006" xmlns:p14="http://schemas.microsoft.com/office/powerpoint/2010/main">
-    <mc:Choice Requires="p14">
-      <p:transition p14:dur="10"/>
-    </mc:Choice>
-    <mc:Fallback xmlns="">
-      <p:transition/>
-    </mc:Fallback>
-  </mc:AlternateContent>
-</p:sld>
-</file>
-
-<file path=ppt/slides/slide20.xml><?xml version="1.0" encoding="utf-8"?>
+<file path=ppt/slides/slide6.xml><?xml version="1.0" encoding="utf-8"?>
 <p:sld xmlns:a="http://schemas.openxmlformats.org/drawingml/2006/main" xmlns:r="http://schemas.openxmlformats.org/officeDocument/2006/relationships" xmlns:p="http://schemas.openxmlformats.org/presentationml/2006/main">
   <p:cSld>
     <p:spTree>
@@ -7999,7 +9667,7 @@
             <a:pPr lvl="1"/>
             <a:r>
               <a:rPr kumimoji="1" lang="ja-JP" altLang="en-US" sz="1600" dirty="0"/>
-              <a:t>基本的に格が高い会議で使われることが多い</a:t>
+              <a:t>基本的に格が高い会議で使われることが多いように見える</a:t>
             </a:r>
             <a:endParaRPr kumimoji="1" lang="en-US" altLang="ja-JP" sz="1600" dirty="0"/>
           </a:p>
@@ -8101,7 +9769,7 @@
     </p:spTree>
     <p:extLst>
       <p:ext uri="{BB962C8B-B14F-4D97-AF65-F5344CB8AC3E}">
-        <p14:creationId xmlns:p14="http://schemas.microsoft.com/office/powerpoint/2010/main" val="560440964"/>
+        <p14:creationId xmlns:p14="http://schemas.microsoft.com/office/powerpoint/2010/main" val="1296502976"/>
       </p:ext>
     </p:extLst>
   </p:cSld>
@@ -8119,7 +9787,7 @@
 </p:sld>
 </file>
 
-<file path=ppt/slides/slide21.xml><?xml version="1.0" encoding="utf-8"?>
+<file path=ppt/slides/slide7.xml><?xml version="1.0" encoding="utf-8"?>
 <p:sld xmlns:a="http://schemas.openxmlformats.org/drawingml/2006/main" xmlns:r="http://schemas.openxmlformats.org/officeDocument/2006/relationships" xmlns:p="http://schemas.openxmlformats.org/presentationml/2006/main">
   <p:cSld>
     <p:spTree>
@@ -8185,6 +9853,10 @@
           <a:bodyPr/>
           <a:lstStyle/>
           <a:p>
+            <a:pPr marL="457200" indent="-457200">
+              <a:buFont typeface="+mj-lt"/>
+              <a:buAutoNum type="arabicPeriod"/>
+            </a:pPr>
             <a:r>
               <a:rPr lang="ja-JP" altLang="en-US" dirty="0"/>
               <a:t>まず定性的な意見よりも，事実で反論する</a:t>
@@ -8214,6 +9886,10 @@
             </a:r>
           </a:p>
           <a:p>
+            <a:pPr marL="457200" indent="-457200">
+              <a:buFont typeface="+mj-lt"/>
+              <a:buAutoNum type="arabicPeriod"/>
+            </a:pPr>
             <a:r>
               <a:rPr lang="ja-JP" altLang="en-US" dirty="0"/>
               <a:t>基本的には，質問で聞かれている事を答える</a:t>
@@ -8221,6 +9897,10 @@
             <a:endParaRPr lang="en-US" altLang="ja-JP" dirty="0"/>
           </a:p>
           <a:p>
+            <a:pPr marL="457200" indent="-457200">
+              <a:buFont typeface="+mj-lt"/>
+              <a:buAutoNum type="arabicPeriod"/>
+            </a:pPr>
             <a:r>
               <a:rPr lang="ja-JP" altLang="en-US" dirty="0"/>
               <a:t>それ以外に，聞かれていない事でもこちらから説明をするのもあり</a:t>
@@ -8240,1557 +9920,7 @@
     </p:spTree>
     <p:extLst>
       <p:ext uri="{BB962C8B-B14F-4D97-AF65-F5344CB8AC3E}">
-        <p14:creationId xmlns:p14="http://schemas.microsoft.com/office/powerpoint/2010/main" val="427613426"/>
-      </p:ext>
-    </p:extLst>
-  </p:cSld>
-  <p:clrMapOvr>
-    <a:masterClrMapping/>
-  </p:clrMapOvr>
-  <mc:AlternateContent xmlns:mc="http://schemas.openxmlformats.org/markup-compatibility/2006" xmlns:p14="http://schemas.microsoft.com/office/powerpoint/2010/main">
-    <mc:Choice Requires="p14">
-      <p:transition p14:dur="10"/>
-    </mc:Choice>
-    <mc:Fallback xmlns="">
-      <p:transition/>
-    </mc:Fallback>
-  </mc:AlternateContent>
-</p:sld>
-</file>
-
-<file path=ppt/slides/slide22.xml><?xml version="1.0" encoding="utf-8"?>
-<p:sld xmlns:a="http://schemas.openxmlformats.org/drawingml/2006/main" xmlns:r="http://schemas.openxmlformats.org/officeDocument/2006/relationships" xmlns:p="http://schemas.openxmlformats.org/presentationml/2006/main">
-  <p:cSld>
-    <p:spTree>
-      <p:nvGrpSpPr>
-        <p:cNvPr id="1" name=""/>
-        <p:cNvGrpSpPr/>
-        <p:nvPr/>
-      </p:nvGrpSpPr>
-      <p:grpSpPr>
-        <a:xfrm>
-          <a:off x="0" y="0"/>
-          <a:ext cx="0" cy="0"/>
-          <a:chOff x="0" y="0"/>
-          <a:chExt cx="0" cy="0"/>
-        </a:xfrm>
-      </p:grpSpPr>
-      <p:sp>
-        <p:nvSpPr>
-          <p:cNvPr id="2" name="タイトル 1">
-            <a:extLst>
-              <a:ext uri="{FF2B5EF4-FFF2-40B4-BE49-F238E27FC236}">
-                <a16:creationId xmlns:a16="http://schemas.microsoft.com/office/drawing/2014/main" id="{32D0AF51-BF33-1A8C-FCC7-1A6AF974B7EA}"/>
-              </a:ext>
-            </a:extLst>
-          </p:cNvPr>
-          <p:cNvSpPr>
-            <a:spLocks noGrp="1"/>
-          </p:cNvSpPr>
-          <p:nvPr>
-            <p:ph type="title"/>
-          </p:nvPr>
-        </p:nvSpPr>
-        <p:spPr/>
-        <p:txBody>
-          <a:bodyPr/>
-          <a:lstStyle/>
-          <a:p>
-            <a:r>
-              <a:rPr kumimoji="1" lang="ja-JP" altLang="en-US" dirty="0"/>
-              <a:t>取捨選択</a:t>
-            </a:r>
-          </a:p>
-        </p:txBody>
-      </p:sp>
-      <p:sp>
-        <p:nvSpPr>
-          <p:cNvPr id="3" name="テキスト プレースホルダー 2">
-            <a:extLst>
-              <a:ext uri="{FF2B5EF4-FFF2-40B4-BE49-F238E27FC236}">
-                <a16:creationId xmlns:a16="http://schemas.microsoft.com/office/drawing/2014/main" id="{0A176352-ED46-261E-2C8F-EAC9C29E45C0}"/>
-              </a:ext>
-            </a:extLst>
-          </p:cNvPr>
-          <p:cNvSpPr>
-            <a:spLocks noGrp="1"/>
-          </p:cNvSpPr>
-          <p:nvPr>
-            <p:ph type="body" sz="quarter" idx="10"/>
-          </p:nvPr>
-        </p:nvSpPr>
-        <p:spPr/>
-        <p:txBody>
-          <a:bodyPr/>
-          <a:lstStyle/>
-          <a:p>
-            <a:r>
-              <a:rPr lang="ja-JP" altLang="en-US" dirty="0"/>
-              <a:t>大抵字数が大きく限られている事が多い</a:t>
-            </a:r>
-            <a:endParaRPr lang="en-US" altLang="ja-JP" dirty="0"/>
-          </a:p>
-          <a:p>
-            <a:pPr lvl="1"/>
-            <a:r>
-              <a:rPr lang="ja-JP" altLang="en-US" dirty="0"/>
-              <a:t>全部の質問にはまともの答えられない</a:t>
-            </a:r>
-            <a:endParaRPr lang="en-US" altLang="ja-JP" dirty="0"/>
-          </a:p>
-          <a:p>
-            <a:pPr lvl="1"/>
-            <a:r>
-              <a:rPr lang="ja-JP" altLang="en-US" dirty="0"/>
-              <a:t>なんらかの基準でしぼらないといけない</a:t>
-            </a:r>
-            <a:endParaRPr kumimoji="1" lang="ja-JP" altLang="en-US" dirty="0"/>
-          </a:p>
-        </p:txBody>
-      </p:sp>
-    </p:spTree>
-    <p:extLst>
-      <p:ext uri="{BB962C8B-B14F-4D97-AF65-F5344CB8AC3E}">
-        <p14:creationId xmlns:p14="http://schemas.microsoft.com/office/powerpoint/2010/main" val="930780755"/>
-      </p:ext>
-    </p:extLst>
-  </p:cSld>
-  <p:clrMapOvr>
-    <a:masterClrMapping/>
-  </p:clrMapOvr>
-  <mc:AlternateContent xmlns:mc="http://schemas.openxmlformats.org/markup-compatibility/2006" xmlns:p14="http://schemas.microsoft.com/office/powerpoint/2010/main">
-    <mc:Choice Requires="p14">
-      <p:transition p14:dur="10"/>
-    </mc:Choice>
-    <mc:Fallback xmlns="">
-      <p:transition/>
-    </mc:Fallback>
-  </mc:AlternateContent>
-</p:sld>
-</file>
-
-<file path=ppt/slides/slide23.xml><?xml version="1.0" encoding="utf-8"?>
-<p:sld xmlns:a="http://schemas.openxmlformats.org/drawingml/2006/main" xmlns:r="http://schemas.openxmlformats.org/officeDocument/2006/relationships" xmlns:p="http://schemas.openxmlformats.org/presentationml/2006/main">
-  <p:cSld>
-    <p:spTree>
-      <p:nvGrpSpPr>
-        <p:cNvPr id="1" name=""/>
-        <p:cNvGrpSpPr/>
-        <p:nvPr/>
-      </p:nvGrpSpPr>
-      <p:grpSpPr>
-        <a:xfrm>
-          <a:off x="0" y="0"/>
-          <a:ext cx="0" cy="0"/>
-          <a:chOff x="0" y="0"/>
-          <a:chExt cx="0" cy="0"/>
-        </a:xfrm>
-      </p:grpSpPr>
-      <p:sp>
-        <p:nvSpPr>
-          <p:cNvPr id="4" name="タイトル 3">
-            <a:extLst>
-              <a:ext uri="{FF2B5EF4-FFF2-40B4-BE49-F238E27FC236}">
-                <a16:creationId xmlns:a16="http://schemas.microsoft.com/office/drawing/2014/main" id="{F4D90254-02E5-5150-E679-EA950D7ABAFA}"/>
-              </a:ext>
-            </a:extLst>
-          </p:cNvPr>
-          <p:cNvSpPr>
-            <a:spLocks noGrp="1"/>
-          </p:cNvSpPr>
-          <p:nvPr>
-            <p:ph type="title"/>
-          </p:nvPr>
-        </p:nvSpPr>
-        <p:spPr/>
-        <p:txBody>
-          <a:bodyPr/>
-          <a:lstStyle/>
-          <a:p>
-            <a:r>
-              <a:rPr lang="ja-JP" altLang="en-US" dirty="0"/>
-              <a:t>考え方１：ポジティブな人に引っ張って貰う場合</a:t>
-            </a:r>
-          </a:p>
-        </p:txBody>
-      </p:sp>
-      <p:sp>
-        <p:nvSpPr>
-          <p:cNvPr id="5" name="テキスト プレースホルダー 4">
-            <a:extLst>
-              <a:ext uri="{FF2B5EF4-FFF2-40B4-BE49-F238E27FC236}">
-                <a16:creationId xmlns:a16="http://schemas.microsoft.com/office/drawing/2014/main" id="{77F9C7DC-8B72-E4A4-A675-C367E5757137}"/>
-              </a:ext>
-            </a:extLst>
-          </p:cNvPr>
-          <p:cNvSpPr>
-            <a:spLocks noGrp="1"/>
-          </p:cNvSpPr>
-          <p:nvPr>
-            <p:ph type="body" sz="quarter" idx="10"/>
-          </p:nvPr>
-        </p:nvSpPr>
-        <p:spPr/>
-        <p:txBody>
-          <a:bodyPr/>
-          <a:lstStyle/>
-          <a:p>
-            <a:r>
-              <a:rPr lang="ja-JP" altLang="en-US" dirty="0"/>
-              <a:t>たとえば </a:t>
-            </a:r>
-            <a:r>
-              <a:rPr lang="en-US" altLang="ja-JP" dirty="0"/>
-              <a:t>Accept 1</a:t>
-            </a:r>
-            <a:r>
-              <a:rPr lang="ja-JP" altLang="en-US" dirty="0"/>
-              <a:t>人で凄くポジティブ </a:t>
-            </a:r>
-            <a:r>
-              <a:rPr lang="en-US" altLang="ja-JP" dirty="0"/>
-              <a:t>+ </a:t>
-            </a:r>
-            <a:r>
-              <a:rPr lang="ja-JP" altLang="en-US" dirty="0"/>
-              <a:t>残り全員 </a:t>
-            </a:r>
-            <a:r>
-              <a:rPr lang="en-US" altLang="ja-JP" dirty="0"/>
-              <a:t>weak reject </a:t>
-            </a:r>
-            <a:r>
-              <a:rPr lang="ja-JP" altLang="en-US" dirty="0"/>
-              <a:t>の場合を想定</a:t>
-            </a:r>
-            <a:endParaRPr lang="en-US" altLang="ja-JP" dirty="0"/>
-          </a:p>
-          <a:p>
-            <a:r>
-              <a:rPr lang="ja-JP" altLang="en-US" dirty="0"/>
-              <a:t>ポジティブな人に引っ張ってもらう</a:t>
-            </a:r>
-            <a:endParaRPr lang="en-US" altLang="ja-JP" dirty="0"/>
-          </a:p>
-          <a:p>
-            <a:pPr lvl="1"/>
-            <a:r>
-              <a:rPr lang="ja-JP" altLang="en-US" dirty="0"/>
-              <a:t>ポジティブな査読者が残り査読者を説得して，引っ張り上げてくれることがある</a:t>
-            </a:r>
-            <a:endParaRPr lang="en-US" altLang="ja-JP" dirty="0"/>
-          </a:p>
-          <a:p>
-            <a:pPr lvl="1"/>
-            <a:r>
-              <a:rPr lang="ja-JP" altLang="en-US" dirty="0"/>
-              <a:t>この好意的な査読者をアシストしたい</a:t>
-            </a:r>
-            <a:endParaRPr lang="en-US" altLang="ja-JP" dirty="0"/>
-          </a:p>
-          <a:p>
-            <a:pPr lvl="2"/>
-            <a:r>
-              <a:rPr lang="ja-JP" altLang="en-US" dirty="0"/>
-              <a:t>ネガティブな人を納得させるための説得の材料を提供する</a:t>
-            </a:r>
-          </a:p>
-        </p:txBody>
-      </p:sp>
-      <p:sp>
-        <p:nvSpPr>
-          <p:cNvPr id="2" name="スライド番号プレースホルダー 1">
-            <a:extLst>
-              <a:ext uri="{FF2B5EF4-FFF2-40B4-BE49-F238E27FC236}">
-                <a16:creationId xmlns:a16="http://schemas.microsoft.com/office/drawing/2014/main" id="{31ABB5DD-A344-815C-93B3-D0854B35BF15}"/>
-              </a:ext>
-            </a:extLst>
-          </p:cNvPr>
-          <p:cNvSpPr>
-            <a:spLocks noGrp="1"/>
-          </p:cNvSpPr>
-          <p:nvPr>
-            <p:ph type="sldNum" sz="quarter" idx="4294967295"/>
-          </p:nvPr>
-        </p:nvSpPr>
-        <p:spPr>
-          <a:xfrm>
-            <a:off x="8531225" y="6308725"/>
-            <a:ext cx="612775" cy="549275"/>
-          </a:xfrm>
-        </p:spPr>
-        <p:txBody>
-          <a:bodyPr/>
-          <a:lstStyle/>
-          <a:p>
-            <a:fld id="{D2D8002D-B5B0-4BAC-B1F6-782DDCCE6D9C}" type="slidenum">
-              <a:rPr kumimoji="1" lang="ja-JP" altLang="en-US" smtClean="0"/>
-              <a:pPr/>
-              <a:t>23</a:t>
-            </a:fld>
-            <a:endParaRPr kumimoji="1" lang="ja-JP" altLang="en-US"/>
-          </a:p>
-        </p:txBody>
-      </p:sp>
-    </p:spTree>
-    <p:extLst>
-      <p:ext uri="{BB962C8B-B14F-4D97-AF65-F5344CB8AC3E}">
-        <p14:creationId xmlns:p14="http://schemas.microsoft.com/office/powerpoint/2010/main" val="2177101692"/>
-      </p:ext>
-    </p:extLst>
-  </p:cSld>
-  <p:clrMapOvr>
-    <a:masterClrMapping/>
-  </p:clrMapOvr>
-  <mc:AlternateContent xmlns:mc="http://schemas.openxmlformats.org/markup-compatibility/2006" xmlns:p14="http://schemas.microsoft.com/office/powerpoint/2010/main">
-    <mc:Choice Requires="p14">
-      <p:transition p14:dur="10"/>
-    </mc:Choice>
-    <mc:Fallback xmlns="">
-      <p:transition/>
-    </mc:Fallback>
-  </mc:AlternateContent>
-</p:sld>
-</file>
-
-<file path=ppt/slides/slide24.xml><?xml version="1.0" encoding="utf-8"?>
-<p:sld xmlns:a="http://schemas.openxmlformats.org/drawingml/2006/main" xmlns:r="http://schemas.openxmlformats.org/officeDocument/2006/relationships" xmlns:p="http://schemas.openxmlformats.org/presentationml/2006/main">
-  <p:cSld>
-    <p:spTree>
-      <p:nvGrpSpPr>
-        <p:cNvPr id="1" name=""/>
-        <p:cNvGrpSpPr/>
-        <p:nvPr/>
-      </p:nvGrpSpPr>
-      <p:grpSpPr>
-        <a:xfrm>
-          <a:off x="0" y="0"/>
-          <a:ext cx="0" cy="0"/>
-          <a:chOff x="0" y="0"/>
-          <a:chExt cx="0" cy="0"/>
-        </a:xfrm>
-      </p:grpSpPr>
-      <p:sp>
-        <p:nvSpPr>
-          <p:cNvPr id="4" name="タイトル 3">
-            <a:extLst>
-              <a:ext uri="{FF2B5EF4-FFF2-40B4-BE49-F238E27FC236}">
-                <a16:creationId xmlns:a16="http://schemas.microsoft.com/office/drawing/2014/main" id="{F4D90254-02E5-5150-E679-EA950D7ABAFA}"/>
-              </a:ext>
-            </a:extLst>
-          </p:cNvPr>
-          <p:cNvSpPr>
-            <a:spLocks noGrp="1"/>
-          </p:cNvSpPr>
-          <p:nvPr>
-            <p:ph type="title"/>
-          </p:nvPr>
-        </p:nvSpPr>
-        <p:spPr/>
-        <p:txBody>
-          <a:bodyPr/>
-          <a:lstStyle/>
-          <a:p>
-            <a:r>
-              <a:rPr lang="ja-JP" altLang="en-US" dirty="0"/>
-              <a:t>考え方２：加点にならない事は書かない？</a:t>
-            </a:r>
-          </a:p>
-        </p:txBody>
-      </p:sp>
-      <p:sp>
-        <p:nvSpPr>
-          <p:cNvPr id="5" name="テキスト プレースホルダー 4">
-            <a:extLst>
-              <a:ext uri="{FF2B5EF4-FFF2-40B4-BE49-F238E27FC236}">
-                <a16:creationId xmlns:a16="http://schemas.microsoft.com/office/drawing/2014/main" id="{77F9C7DC-8B72-E4A4-A675-C367E5757137}"/>
-              </a:ext>
-            </a:extLst>
-          </p:cNvPr>
-          <p:cNvSpPr>
-            <a:spLocks noGrp="1"/>
-          </p:cNvSpPr>
-          <p:nvPr>
-            <p:ph type="body" sz="quarter" idx="10"/>
-          </p:nvPr>
-        </p:nvSpPr>
-        <p:spPr/>
-        <p:txBody>
-          <a:bodyPr/>
-          <a:lstStyle/>
-          <a:p>
-            <a:r>
-              <a:rPr lang="ja-JP" altLang="en-US" dirty="0"/>
-              <a:t>明らかな弱点の場合，何を書いても無駄なことがある</a:t>
-            </a:r>
-            <a:endParaRPr lang="en-US" altLang="ja-JP" dirty="0"/>
-          </a:p>
-          <a:p>
-            <a:pPr lvl="1"/>
-            <a:r>
-              <a:rPr lang="ja-JP" altLang="en-US" dirty="0"/>
-              <a:t>「～の測定がなされていない」とか</a:t>
-            </a:r>
-            <a:endParaRPr lang="en-US" altLang="ja-JP" dirty="0"/>
-          </a:p>
-          <a:p>
-            <a:pPr lvl="1"/>
-            <a:r>
-              <a:rPr lang="ja-JP" altLang="en-US" dirty="0"/>
-              <a:t>一般にそれが評価されている事が多い場合，なくても良い理由をくどくど書いても加点されない可能性が高い</a:t>
-            </a:r>
-            <a:endParaRPr lang="en-US" altLang="ja-JP" dirty="0"/>
-          </a:p>
-          <a:p>
-            <a:r>
-              <a:rPr lang="ja-JP" altLang="en-US" dirty="0"/>
-              <a:t>「加点にならない質問には回答しない」という指針もある</a:t>
-            </a:r>
-            <a:endParaRPr lang="en-US" altLang="ja-JP" dirty="0"/>
-          </a:p>
-          <a:p>
-            <a:pPr lvl="1"/>
-            <a:r>
-              <a:rPr lang="ja-JP" altLang="en-US" dirty="0"/>
-              <a:t>とある先生はこの方針だが，わりと極端な考え方であると思う</a:t>
-            </a:r>
-            <a:endParaRPr lang="en-US" altLang="ja-JP" dirty="0"/>
-          </a:p>
-          <a:p>
-            <a:pPr lvl="1"/>
-            <a:r>
-              <a:rPr lang="ja-JP" altLang="en-US" dirty="0"/>
-              <a:t>不誠実な印象を与える可能性もある</a:t>
-            </a:r>
-            <a:endParaRPr lang="en-US" altLang="ja-JP" dirty="0"/>
-          </a:p>
-          <a:p>
-            <a:r>
-              <a:rPr lang="ja-JP" altLang="en-US" dirty="0">
-                <a:solidFill>
-                  <a:schemeClr val="accent5"/>
-                </a:solidFill>
-              </a:rPr>
-              <a:t>でも「なにを答えれば加点に繋がるか」という視点は重要</a:t>
-            </a:r>
-          </a:p>
-        </p:txBody>
-      </p:sp>
-      <p:sp>
-        <p:nvSpPr>
-          <p:cNvPr id="2" name="スライド番号プレースホルダー 1">
-            <a:extLst>
-              <a:ext uri="{FF2B5EF4-FFF2-40B4-BE49-F238E27FC236}">
-                <a16:creationId xmlns:a16="http://schemas.microsoft.com/office/drawing/2014/main" id="{31ABB5DD-A344-815C-93B3-D0854B35BF15}"/>
-              </a:ext>
-            </a:extLst>
-          </p:cNvPr>
-          <p:cNvSpPr>
-            <a:spLocks noGrp="1"/>
-          </p:cNvSpPr>
-          <p:nvPr>
-            <p:ph type="sldNum" sz="quarter" idx="4294967295"/>
-          </p:nvPr>
-        </p:nvSpPr>
-        <p:spPr>
-          <a:xfrm>
-            <a:off x="8531225" y="6308725"/>
-            <a:ext cx="612775" cy="549275"/>
-          </a:xfrm>
-        </p:spPr>
-        <p:txBody>
-          <a:bodyPr/>
-          <a:lstStyle/>
-          <a:p>
-            <a:fld id="{D2D8002D-B5B0-4BAC-B1F6-782DDCCE6D9C}" type="slidenum">
-              <a:rPr kumimoji="1" lang="ja-JP" altLang="en-US" smtClean="0"/>
-              <a:pPr/>
-              <a:t>24</a:t>
-            </a:fld>
-            <a:endParaRPr kumimoji="1" lang="ja-JP" altLang="en-US"/>
-          </a:p>
-        </p:txBody>
-      </p:sp>
-    </p:spTree>
-    <p:extLst>
-      <p:ext uri="{BB962C8B-B14F-4D97-AF65-F5344CB8AC3E}">
-        <p14:creationId xmlns:p14="http://schemas.microsoft.com/office/powerpoint/2010/main" val="3188052139"/>
-      </p:ext>
-    </p:extLst>
-  </p:cSld>
-  <p:clrMapOvr>
-    <a:masterClrMapping/>
-  </p:clrMapOvr>
-  <mc:AlternateContent xmlns:mc="http://schemas.openxmlformats.org/markup-compatibility/2006" xmlns:p14="http://schemas.microsoft.com/office/powerpoint/2010/main">
-    <mc:Choice Requires="p14">
-      <p:transition p14:dur="10"/>
-    </mc:Choice>
-    <mc:Fallback xmlns="">
-      <p:transition/>
-    </mc:Fallback>
-  </mc:AlternateContent>
-</p:sld>
-</file>
-
-<file path=ppt/slides/slide25.xml><?xml version="1.0" encoding="utf-8"?>
-<p:sld xmlns:a="http://schemas.openxmlformats.org/drawingml/2006/main" xmlns:r="http://schemas.openxmlformats.org/officeDocument/2006/relationships" xmlns:p="http://schemas.openxmlformats.org/presentationml/2006/main">
-  <p:cSld>
-    <p:spTree>
-      <p:nvGrpSpPr>
-        <p:cNvPr id="1" name=""/>
-        <p:cNvGrpSpPr/>
-        <p:nvPr/>
-      </p:nvGrpSpPr>
-      <p:grpSpPr>
-        <a:xfrm>
-          <a:off x="0" y="0"/>
-          <a:ext cx="0" cy="0"/>
-          <a:chOff x="0" y="0"/>
-          <a:chExt cx="0" cy="0"/>
-        </a:xfrm>
-      </p:grpSpPr>
-      <p:sp>
-        <p:nvSpPr>
-          <p:cNvPr id="4" name="タイトル 3">
-            <a:extLst>
-              <a:ext uri="{FF2B5EF4-FFF2-40B4-BE49-F238E27FC236}">
-                <a16:creationId xmlns:a16="http://schemas.microsoft.com/office/drawing/2014/main" id="{D4972FC8-631C-CF56-D504-447CB9BAAD27}"/>
-              </a:ext>
-            </a:extLst>
-          </p:cNvPr>
-          <p:cNvSpPr>
-            <a:spLocks noGrp="1"/>
-          </p:cNvSpPr>
-          <p:nvPr>
-            <p:ph type="title"/>
-          </p:nvPr>
-        </p:nvSpPr>
-        <p:spPr/>
-        <p:txBody>
-          <a:bodyPr/>
-          <a:lstStyle/>
-          <a:p>
-            <a:r>
-              <a:rPr lang="ja-JP" altLang="en-US" dirty="0"/>
-              <a:t>参考</a:t>
-            </a:r>
-          </a:p>
-        </p:txBody>
-      </p:sp>
-      <p:sp>
-        <p:nvSpPr>
-          <p:cNvPr id="5" name="テキスト プレースホルダー 4">
-            <a:extLst>
-              <a:ext uri="{FF2B5EF4-FFF2-40B4-BE49-F238E27FC236}">
-                <a16:creationId xmlns:a16="http://schemas.microsoft.com/office/drawing/2014/main" id="{56501602-0A9E-AC44-1DE7-A9DFF44160F4}"/>
-              </a:ext>
-            </a:extLst>
-          </p:cNvPr>
-          <p:cNvSpPr>
-            <a:spLocks noGrp="1"/>
-          </p:cNvSpPr>
-          <p:nvPr>
-            <p:ph type="body" sz="quarter" idx="10"/>
-          </p:nvPr>
-        </p:nvSpPr>
-        <p:spPr/>
-        <p:txBody>
-          <a:bodyPr/>
-          <a:lstStyle/>
-          <a:p>
-            <a:r>
-              <a:rPr lang="en-US" altLang="ja-JP" dirty="0" err="1"/>
-              <a:t>Sigcomm</a:t>
-            </a:r>
-            <a:r>
-              <a:rPr lang="en-US" altLang="ja-JP" dirty="0"/>
-              <a:t> 2013 author response guidelines</a:t>
-            </a:r>
-            <a:br>
-              <a:rPr lang="en-US" altLang="ja-JP" dirty="0"/>
-            </a:br>
-            <a:r>
-              <a:rPr lang="en-US" altLang="ja-JP" dirty="0">
-                <a:hlinkClick r:id="rId2"/>
-              </a:rPr>
-              <a:t>http://conferences.sigcomm.org/sigcomm/2013/misc/AuthorResponseGuidelines.pdf</a:t>
-            </a:r>
-            <a:br>
-              <a:rPr lang="en-US" altLang="ja-JP" dirty="0"/>
-            </a:br>
-            <a:endParaRPr lang="en-US" altLang="ja-JP" dirty="0"/>
-          </a:p>
-          <a:p>
-            <a:pPr lvl="1"/>
-            <a:r>
-              <a:rPr lang="ja-JP" altLang="en-US" dirty="0"/>
-              <a:t>リバッタルに対する指針や例が簡潔にまとまっていると思う</a:t>
-            </a:r>
-            <a:endParaRPr lang="en-US" altLang="ja-JP" dirty="0"/>
-          </a:p>
-          <a:p>
-            <a:pPr lvl="1"/>
-            <a:r>
-              <a:rPr lang="ja-JP" altLang="en-US" dirty="0"/>
-              <a:t>引用：</a:t>
-            </a:r>
-            <a:endParaRPr lang="en-US" altLang="ja-JP" dirty="0"/>
-          </a:p>
-          <a:p>
-            <a:pPr lvl="2"/>
-            <a:r>
-              <a:rPr lang="ja-JP" altLang="en-US" dirty="0"/>
-              <a:t>著者の回答は、意見ではなく、事実に基づいたポイントに焦点を当てることが最も効果的であると思われることを強調したい。</a:t>
-            </a:r>
-            <a:endParaRPr lang="en-US" altLang="ja-JP" dirty="0"/>
-          </a:p>
-          <a:p>
-            <a:pPr lvl="2"/>
-            <a:r>
-              <a:rPr lang="en-US" altLang="ja-JP" dirty="0"/>
-              <a:t>PC</a:t>
-            </a:r>
-            <a:r>
-              <a:rPr lang="ja-JP" altLang="en-US" dirty="0"/>
-              <a:t>は、著者が主張する新しい結果や改善点を無視することができます。</a:t>
-            </a:r>
-            <a:endParaRPr lang="en-US" altLang="ja-JP" dirty="0"/>
-          </a:p>
-          <a:p>
-            <a:pPr lvl="2"/>
-            <a:r>
-              <a:rPr lang="ja-JP" altLang="en-US" dirty="0"/>
-              <a:t>また、著者の回答が投稿時の誤りを修正するものであったとしても、いくつかの誤りを含む論文を受理するかどうかの最終判断は</a:t>
-            </a:r>
-            <a:r>
-              <a:rPr lang="en-US" altLang="ja-JP" dirty="0"/>
-              <a:t>PC</a:t>
-            </a:r>
-            <a:r>
-              <a:rPr lang="ja-JP" altLang="en-US" dirty="0"/>
-              <a:t>が行います。</a:t>
-            </a:r>
-          </a:p>
-        </p:txBody>
-      </p:sp>
-      <p:sp>
-        <p:nvSpPr>
-          <p:cNvPr id="2" name="スライド番号プレースホルダー 1">
-            <a:extLst>
-              <a:ext uri="{FF2B5EF4-FFF2-40B4-BE49-F238E27FC236}">
-                <a16:creationId xmlns:a16="http://schemas.microsoft.com/office/drawing/2014/main" id="{98EC1791-BDCF-0841-AB7B-70AF81F75FC0}"/>
-              </a:ext>
-            </a:extLst>
-          </p:cNvPr>
-          <p:cNvSpPr>
-            <a:spLocks noGrp="1"/>
-          </p:cNvSpPr>
-          <p:nvPr>
-            <p:ph type="sldNum" sz="quarter" idx="4294967295"/>
-          </p:nvPr>
-        </p:nvSpPr>
-        <p:spPr>
-          <a:xfrm>
-            <a:off x="8531225" y="6308725"/>
-            <a:ext cx="612775" cy="549275"/>
-          </a:xfrm>
-        </p:spPr>
-        <p:txBody>
-          <a:bodyPr/>
-          <a:lstStyle/>
-          <a:p>
-            <a:fld id="{D2D8002D-B5B0-4BAC-B1F6-782DDCCE6D9C}" type="slidenum">
-              <a:rPr kumimoji="1" lang="ja-JP" altLang="en-US" smtClean="0"/>
-              <a:pPr/>
-              <a:t>25</a:t>
-            </a:fld>
-            <a:endParaRPr kumimoji="1" lang="ja-JP" altLang="en-US" dirty="0"/>
-          </a:p>
-        </p:txBody>
-      </p:sp>
-    </p:spTree>
-    <p:extLst>
-      <p:ext uri="{BB962C8B-B14F-4D97-AF65-F5344CB8AC3E}">
-        <p14:creationId xmlns:p14="http://schemas.microsoft.com/office/powerpoint/2010/main" val="2277209211"/>
-      </p:ext>
-    </p:extLst>
-  </p:cSld>
-  <p:clrMapOvr>
-    <a:masterClrMapping/>
-  </p:clrMapOvr>
-  <mc:AlternateContent xmlns:mc="http://schemas.openxmlformats.org/markup-compatibility/2006" xmlns:p14="http://schemas.microsoft.com/office/powerpoint/2010/main">
-    <mc:Choice Requires="p14">
-      <p:transition p14:dur="10"/>
-    </mc:Choice>
-    <mc:Fallback xmlns="">
-      <p:transition/>
-    </mc:Fallback>
-  </mc:AlternateContent>
-</p:sld>
-</file>
-
-<file path=ppt/slides/slide3.xml><?xml version="1.0" encoding="utf-8"?>
-<p:sld xmlns:a="http://schemas.openxmlformats.org/drawingml/2006/main" xmlns:r="http://schemas.openxmlformats.org/officeDocument/2006/relationships" xmlns:p="http://schemas.openxmlformats.org/presentationml/2006/main">
-  <p:cSld>
-    <p:spTree>
-      <p:nvGrpSpPr>
-        <p:cNvPr id="1" name=""/>
-        <p:cNvGrpSpPr/>
-        <p:nvPr/>
-      </p:nvGrpSpPr>
-      <p:grpSpPr>
-        <a:xfrm>
-          <a:off x="0" y="0"/>
-          <a:ext cx="0" cy="0"/>
-          <a:chOff x="0" y="0"/>
-          <a:chExt cx="0" cy="0"/>
-        </a:xfrm>
-      </p:grpSpPr>
-      <p:sp>
-        <p:nvSpPr>
-          <p:cNvPr id="2" name="タイトル 1">
-            <a:extLst>
-              <a:ext uri="{FF2B5EF4-FFF2-40B4-BE49-F238E27FC236}">
-                <a16:creationId xmlns:a16="http://schemas.microsoft.com/office/drawing/2014/main" id="{083FED06-7585-A7FA-DFA7-A108FAF25664}"/>
-              </a:ext>
-            </a:extLst>
-          </p:cNvPr>
-          <p:cNvSpPr>
-            <a:spLocks noGrp="1"/>
-          </p:cNvSpPr>
-          <p:nvPr>
-            <p:ph type="title"/>
-          </p:nvPr>
-        </p:nvSpPr>
-        <p:spPr/>
-        <p:txBody>
-          <a:bodyPr/>
-          <a:lstStyle/>
-          <a:p>
-            <a:r>
-              <a:rPr kumimoji="1" lang="ja-JP" altLang="en-US" dirty="0"/>
-              <a:t>おおまかな流れ</a:t>
-            </a:r>
-          </a:p>
-        </p:txBody>
-      </p:sp>
-      <p:sp>
-        <p:nvSpPr>
-          <p:cNvPr id="3" name="テキスト プレースホルダー 2">
-            <a:extLst>
-              <a:ext uri="{FF2B5EF4-FFF2-40B4-BE49-F238E27FC236}">
-                <a16:creationId xmlns:a16="http://schemas.microsoft.com/office/drawing/2014/main" id="{36F820D4-33B2-0DAF-F972-7BF59B02F015}"/>
-              </a:ext>
-            </a:extLst>
-          </p:cNvPr>
-          <p:cNvSpPr>
-            <a:spLocks noGrp="1"/>
-          </p:cNvSpPr>
-          <p:nvPr>
-            <p:ph type="body" sz="quarter" idx="10"/>
-          </p:nvPr>
-        </p:nvSpPr>
-        <p:spPr/>
-        <p:txBody>
-          <a:bodyPr/>
-          <a:lstStyle/>
-          <a:p>
-            <a:pPr marL="457200" indent="-457200">
-              <a:buFont typeface="+mj-lt"/>
-              <a:buAutoNum type="arabicPeriod"/>
-            </a:pPr>
-            <a:r>
-              <a:rPr kumimoji="1" lang="ja-JP" altLang="en-US" dirty="0"/>
-              <a:t>査読コメントの振り分け</a:t>
-            </a:r>
-            <a:endParaRPr kumimoji="1" lang="en-US" altLang="ja-JP" dirty="0"/>
-          </a:p>
-          <a:p>
-            <a:pPr marL="817200" lvl="1" indent="-457200">
-              <a:buFont typeface="+mj-lt"/>
-              <a:buAutoNum type="arabicPeriod"/>
-            </a:pPr>
-            <a:r>
-              <a:rPr kumimoji="1" lang="ja-JP" altLang="en-US" dirty="0"/>
-              <a:t>査読コメント内の主張ごとに </a:t>
-            </a:r>
-            <a:r>
-              <a:rPr kumimoji="1" lang="en-US" altLang="ja-JP" dirty="0"/>
-              <a:t>ID </a:t>
-            </a:r>
-            <a:r>
-              <a:rPr kumimoji="1" lang="ja-JP" altLang="en-US" dirty="0"/>
-              <a:t>をふる</a:t>
-            </a:r>
-            <a:endParaRPr kumimoji="1" lang="en-US" altLang="ja-JP" dirty="0"/>
-          </a:p>
-          <a:p>
-            <a:pPr marL="817200" lvl="1" indent="-457200">
-              <a:buFont typeface="+mj-lt"/>
-              <a:buAutoNum type="arabicPeriod"/>
-            </a:pPr>
-            <a:r>
-              <a:rPr kumimoji="1" lang="ja-JP" altLang="en-US" dirty="0"/>
-              <a:t>同様の主張のグルーピング</a:t>
-            </a:r>
-            <a:endParaRPr kumimoji="1" lang="en-US" altLang="ja-JP" dirty="0"/>
-          </a:p>
-          <a:p>
-            <a:pPr marL="457200" indent="-457200">
-              <a:buFont typeface="+mj-lt"/>
-              <a:buAutoNum type="arabicPeriod"/>
-            </a:pPr>
-            <a:r>
-              <a:rPr kumimoji="1" lang="ja-JP" altLang="en-US" dirty="0"/>
-              <a:t>主張の整理</a:t>
-            </a:r>
-            <a:endParaRPr kumimoji="1" lang="en-US" altLang="ja-JP" dirty="0"/>
-          </a:p>
-          <a:p>
-            <a:pPr marL="817200" lvl="1" indent="-457200">
-              <a:buFont typeface="+mj-lt"/>
-              <a:buAutoNum type="arabicPeriod"/>
-            </a:pPr>
-            <a:r>
-              <a:rPr kumimoji="1" lang="ja-JP" altLang="en-US" dirty="0"/>
-              <a:t>言われている主張の要点を自分たちでまとめなおす</a:t>
-            </a:r>
-            <a:endParaRPr kumimoji="1" lang="en-US" altLang="ja-JP" dirty="0"/>
-          </a:p>
-          <a:p>
-            <a:pPr marL="457200" indent="-457200">
-              <a:buFont typeface="+mj-lt"/>
-              <a:buAutoNum type="arabicPeriod"/>
-            </a:pPr>
-            <a:r>
-              <a:rPr kumimoji="1" lang="ja-JP" altLang="en-US" dirty="0"/>
-              <a:t>コメントごとのタスク・スケジューリング</a:t>
-            </a:r>
-          </a:p>
-        </p:txBody>
-      </p:sp>
-    </p:spTree>
-    <p:extLst>
-      <p:ext uri="{BB962C8B-B14F-4D97-AF65-F5344CB8AC3E}">
-        <p14:creationId xmlns:p14="http://schemas.microsoft.com/office/powerpoint/2010/main" val="1023287153"/>
-      </p:ext>
-    </p:extLst>
-  </p:cSld>
-  <p:clrMapOvr>
-    <a:masterClrMapping/>
-  </p:clrMapOvr>
-  <mc:AlternateContent xmlns:mc="http://schemas.openxmlformats.org/markup-compatibility/2006" xmlns:p14="http://schemas.microsoft.com/office/powerpoint/2010/main">
-    <mc:Choice Requires="p14">
-      <p:transition p14:dur="10"/>
-    </mc:Choice>
-    <mc:Fallback xmlns="">
-      <p:transition/>
-    </mc:Fallback>
-  </mc:AlternateContent>
-</p:sld>
-</file>
-
-<file path=ppt/slides/slide4.xml><?xml version="1.0" encoding="utf-8"?>
-<p:sld xmlns:a="http://schemas.openxmlformats.org/drawingml/2006/main" xmlns:r="http://schemas.openxmlformats.org/officeDocument/2006/relationships" xmlns:p="http://schemas.openxmlformats.org/presentationml/2006/main">
-  <p:cSld>
-    <p:spTree>
-      <p:nvGrpSpPr>
-        <p:cNvPr id="1" name=""/>
-        <p:cNvGrpSpPr/>
-        <p:nvPr/>
-      </p:nvGrpSpPr>
-      <p:grpSpPr>
-        <a:xfrm>
-          <a:off x="0" y="0"/>
-          <a:ext cx="0" cy="0"/>
-          <a:chOff x="0" y="0"/>
-          <a:chExt cx="0" cy="0"/>
-        </a:xfrm>
-      </p:grpSpPr>
-      <p:sp>
-        <p:nvSpPr>
-          <p:cNvPr id="2" name="タイトル 1">
-            <a:extLst>
-              <a:ext uri="{FF2B5EF4-FFF2-40B4-BE49-F238E27FC236}">
-                <a16:creationId xmlns:a16="http://schemas.microsoft.com/office/drawing/2014/main" id="{BDB72A97-6BFD-581B-230B-BBBDBCEA34D9}"/>
-              </a:ext>
-            </a:extLst>
-          </p:cNvPr>
-          <p:cNvSpPr>
-            <a:spLocks noGrp="1"/>
-          </p:cNvSpPr>
-          <p:nvPr>
-            <p:ph type="title"/>
-          </p:nvPr>
-        </p:nvSpPr>
-        <p:spPr/>
-        <p:txBody>
-          <a:bodyPr/>
-          <a:lstStyle/>
-          <a:p>
-            <a:r>
-              <a:rPr kumimoji="1" lang="ja-JP" altLang="en-US" dirty="0"/>
-              <a:t>作業の進め方</a:t>
-            </a:r>
-          </a:p>
-        </p:txBody>
-      </p:sp>
-      <p:sp>
-        <p:nvSpPr>
-          <p:cNvPr id="3" name="テキスト プレースホルダー 2">
-            <a:extLst>
-              <a:ext uri="{FF2B5EF4-FFF2-40B4-BE49-F238E27FC236}">
-                <a16:creationId xmlns:a16="http://schemas.microsoft.com/office/drawing/2014/main" id="{B54A5567-BE4E-F223-8C55-F35B87FD7AA0}"/>
-              </a:ext>
-            </a:extLst>
-          </p:cNvPr>
-          <p:cNvSpPr>
-            <a:spLocks noGrp="1"/>
-          </p:cNvSpPr>
-          <p:nvPr>
-            <p:ph type="body" sz="quarter" idx="10"/>
-          </p:nvPr>
-        </p:nvSpPr>
-        <p:spPr/>
-        <p:txBody>
-          <a:bodyPr/>
-          <a:lstStyle/>
-          <a:p>
-            <a:r>
-              <a:rPr kumimoji="1" lang="ja-JP" altLang="en-US" sz="1800" dirty="0"/>
-              <a:t>共同編集可能な </a:t>
-            </a:r>
-            <a:r>
-              <a:rPr kumimoji="1" lang="en-US" altLang="ja-JP" sz="1800" dirty="0"/>
-              <a:t>markdown </a:t>
-            </a:r>
-            <a:r>
-              <a:rPr kumimoji="1" lang="ja-JP" altLang="en-US" sz="1800" dirty="0"/>
-              <a:t>上で進めるのがおすすめ</a:t>
-            </a:r>
-            <a:endParaRPr kumimoji="1" lang="en-US" altLang="ja-JP" sz="1800" dirty="0"/>
-          </a:p>
-          <a:p>
-            <a:pPr lvl="1"/>
-            <a:r>
-              <a:rPr kumimoji="1" lang="ja-JP" altLang="en-US" sz="1800" dirty="0"/>
-              <a:t>ここでは </a:t>
-            </a:r>
-            <a:r>
-              <a:rPr kumimoji="1" lang="en-US" altLang="ja-JP" sz="1800" dirty="0"/>
-              <a:t>overleaf </a:t>
-            </a:r>
-            <a:r>
-              <a:rPr kumimoji="1" lang="ja-JP" altLang="en-US" sz="1800" dirty="0"/>
-              <a:t>の上に </a:t>
-            </a:r>
-            <a:r>
-              <a:rPr kumimoji="1" lang="en-US" altLang="ja-JP" sz="1800" dirty="0"/>
-              <a:t>.md </a:t>
-            </a:r>
-            <a:r>
-              <a:rPr kumimoji="1" lang="ja-JP" altLang="en-US" sz="1800" dirty="0"/>
-              <a:t>ファイルを置くことを想定</a:t>
-            </a:r>
-            <a:endParaRPr kumimoji="1" lang="en-US" altLang="ja-JP" sz="1800" dirty="0"/>
-          </a:p>
-          <a:p>
-            <a:pPr lvl="2"/>
-            <a:r>
-              <a:rPr lang="en-US" altLang="ja-JP" sz="1800" dirty="0"/>
-              <a:t>overleaf </a:t>
-            </a:r>
-            <a:r>
-              <a:rPr lang="ja-JP" altLang="en-US" sz="1800" dirty="0"/>
-              <a:t>は </a:t>
-            </a:r>
-            <a:r>
-              <a:rPr lang="en-US" altLang="ja-JP" sz="1800" dirty="0"/>
-              <a:t>.md </a:t>
-            </a:r>
-            <a:r>
-              <a:rPr lang="ja-JP" altLang="en-US" sz="1800" dirty="0"/>
-              <a:t>を認識してシンタックス・ハイライトできる</a:t>
-            </a:r>
-            <a:endParaRPr kumimoji="1" lang="en-US" altLang="ja-JP" sz="1800" dirty="0"/>
-          </a:p>
-          <a:p>
-            <a:pPr lvl="1"/>
-            <a:r>
-              <a:rPr kumimoji="1" lang="ja-JP" altLang="en-US" sz="1800" dirty="0"/>
-              <a:t>他のサービスでも別によい</a:t>
-            </a:r>
-            <a:endParaRPr kumimoji="1" lang="en-US" altLang="ja-JP" sz="1800" dirty="0"/>
-          </a:p>
-          <a:p>
-            <a:pPr lvl="2"/>
-            <a:r>
-              <a:rPr kumimoji="1" lang="en-US" altLang="ja-JP" sz="1800" dirty="0"/>
-              <a:t>Google document </a:t>
-            </a:r>
-            <a:r>
-              <a:rPr kumimoji="1" lang="ja-JP" altLang="en-US" sz="1800" dirty="0"/>
-              <a:t>とか</a:t>
-            </a:r>
-            <a:endParaRPr kumimoji="1" lang="en-US" altLang="ja-JP" sz="1800" dirty="0"/>
-          </a:p>
-          <a:p>
-            <a:pPr lvl="2"/>
-            <a:r>
-              <a:rPr kumimoji="1" lang="ja-JP" altLang="en-US" sz="1800" dirty="0"/>
-              <a:t>１人で進めるならローカルの </a:t>
-            </a:r>
-            <a:r>
-              <a:rPr kumimoji="1" lang="en-US" altLang="ja-JP" sz="1800" dirty="0"/>
-              <a:t>.md </a:t>
-            </a:r>
-            <a:r>
-              <a:rPr kumimoji="1" lang="ja-JP" altLang="en-US" sz="1800" dirty="0"/>
-              <a:t>ファイルでも</a:t>
-            </a:r>
-            <a:endParaRPr kumimoji="1" lang="en-US" altLang="ja-JP" sz="1800" dirty="0"/>
-          </a:p>
-          <a:p>
-            <a:r>
-              <a:rPr lang="ja-JP" altLang="en-US" sz="1800" dirty="0"/>
-              <a:t>この作業に </a:t>
-            </a:r>
-            <a:r>
-              <a:rPr lang="en-US" altLang="ja-JP" sz="1800" dirty="0"/>
-              <a:t>git </a:t>
-            </a:r>
-            <a:r>
-              <a:rPr lang="ja-JP" altLang="en-US" sz="1800" dirty="0"/>
-              <a:t>やチケット管理システムはあまり向かない（と思う）</a:t>
-            </a:r>
-            <a:endParaRPr lang="en-US" altLang="ja-JP" sz="1800" dirty="0"/>
-          </a:p>
-          <a:p>
-            <a:pPr lvl="1"/>
-            <a:r>
-              <a:rPr kumimoji="1" lang="ja-JP" altLang="en-US" sz="1800" dirty="0"/>
-              <a:t>後のタスク・スケジューリングの項で理由を説明</a:t>
-            </a:r>
-          </a:p>
-        </p:txBody>
-      </p:sp>
-    </p:spTree>
-    <p:extLst>
-      <p:ext uri="{BB962C8B-B14F-4D97-AF65-F5344CB8AC3E}">
-        <p14:creationId xmlns:p14="http://schemas.microsoft.com/office/powerpoint/2010/main" val="783470123"/>
-      </p:ext>
-    </p:extLst>
-  </p:cSld>
-  <p:clrMapOvr>
-    <a:masterClrMapping/>
-  </p:clrMapOvr>
-  <mc:AlternateContent xmlns:mc="http://schemas.openxmlformats.org/markup-compatibility/2006" xmlns:p14="http://schemas.microsoft.com/office/powerpoint/2010/main">
-    <mc:Choice Requires="p14">
-      <p:transition p14:dur="10"/>
-    </mc:Choice>
-    <mc:Fallback xmlns="">
-      <p:transition/>
-    </mc:Fallback>
-  </mc:AlternateContent>
-</p:sld>
-</file>
-
-<file path=ppt/slides/slide5.xml><?xml version="1.0" encoding="utf-8"?>
-<p:sld xmlns:a="http://schemas.openxmlformats.org/drawingml/2006/main" xmlns:r="http://schemas.openxmlformats.org/officeDocument/2006/relationships" xmlns:p="http://schemas.openxmlformats.org/presentationml/2006/main">
-  <p:cSld>
-    <p:spTree>
-      <p:nvGrpSpPr>
-        <p:cNvPr id="1" name=""/>
-        <p:cNvGrpSpPr/>
-        <p:nvPr/>
-      </p:nvGrpSpPr>
-      <p:grpSpPr>
-        <a:xfrm>
-          <a:off x="0" y="0"/>
-          <a:ext cx="0" cy="0"/>
-          <a:chOff x="0" y="0"/>
-          <a:chExt cx="0" cy="0"/>
-        </a:xfrm>
-      </p:grpSpPr>
-      <p:sp>
-        <p:nvSpPr>
-          <p:cNvPr id="2" name="タイトル 1">
-            <a:extLst>
-              <a:ext uri="{FF2B5EF4-FFF2-40B4-BE49-F238E27FC236}">
-                <a16:creationId xmlns:a16="http://schemas.microsoft.com/office/drawing/2014/main" id="{FC3C4FDA-557C-1FCC-BC76-4EE02F5DA3B1}"/>
-              </a:ext>
-            </a:extLst>
-          </p:cNvPr>
-          <p:cNvSpPr>
-            <a:spLocks noGrp="1"/>
-          </p:cNvSpPr>
-          <p:nvPr>
-            <p:ph type="title"/>
-          </p:nvPr>
-        </p:nvSpPr>
-        <p:spPr/>
-        <p:txBody>
-          <a:bodyPr/>
-          <a:lstStyle/>
-          <a:p>
-            <a:r>
-              <a:rPr kumimoji="1" lang="ja-JP" altLang="en-US" dirty="0"/>
-              <a:t>もくじ</a:t>
-            </a:r>
-          </a:p>
-        </p:txBody>
-      </p:sp>
-      <p:sp>
-        <p:nvSpPr>
-          <p:cNvPr id="3" name="テキスト プレースホルダー 2">
-            <a:extLst>
-              <a:ext uri="{FF2B5EF4-FFF2-40B4-BE49-F238E27FC236}">
-                <a16:creationId xmlns:a16="http://schemas.microsoft.com/office/drawing/2014/main" id="{18B956B2-DEB9-3B69-F99C-B191AF9563E2}"/>
-              </a:ext>
-            </a:extLst>
-          </p:cNvPr>
-          <p:cNvSpPr>
-            <a:spLocks noGrp="1"/>
-          </p:cNvSpPr>
-          <p:nvPr>
-            <p:ph type="body" sz="quarter" idx="10"/>
-          </p:nvPr>
-        </p:nvSpPr>
-        <p:spPr/>
-        <p:txBody>
-          <a:bodyPr/>
-          <a:lstStyle/>
-          <a:p>
-            <a:pPr marL="457200" indent="-457200">
-              <a:buFont typeface="+mj-lt"/>
-              <a:buAutoNum type="arabicPeriod"/>
-            </a:pPr>
-            <a:r>
-              <a:rPr kumimoji="1" lang="ja-JP" altLang="en-US" dirty="0"/>
-              <a:t>主張の整理</a:t>
-            </a:r>
-            <a:endParaRPr kumimoji="1" lang="en-US" altLang="ja-JP" dirty="0"/>
-          </a:p>
-          <a:p>
-            <a:pPr marL="457200" indent="-457200">
-              <a:buFont typeface="+mj-lt"/>
-              <a:buAutoNum type="arabicPeriod"/>
-            </a:pPr>
-            <a:r>
-              <a:rPr kumimoji="1" lang="ja-JP" altLang="en-US" dirty="0"/>
-              <a:t>タスク管理</a:t>
-            </a:r>
-            <a:endParaRPr kumimoji="1" lang="en-US" altLang="ja-JP" dirty="0"/>
-          </a:p>
-          <a:p>
-            <a:pPr marL="457200" indent="-457200">
-              <a:buFont typeface="+mj-lt"/>
-              <a:buAutoNum type="arabicPeriod"/>
-            </a:pPr>
-            <a:r>
-              <a:rPr kumimoji="1" lang="ja-JP" altLang="en-US" dirty="0"/>
-              <a:t>反論の指針</a:t>
-            </a:r>
-          </a:p>
-        </p:txBody>
-      </p:sp>
-    </p:spTree>
-    <p:extLst>
-      <p:ext uri="{BB962C8B-B14F-4D97-AF65-F5344CB8AC3E}">
-        <p14:creationId xmlns:p14="http://schemas.microsoft.com/office/powerpoint/2010/main" val="3232007004"/>
-      </p:ext>
-    </p:extLst>
-  </p:cSld>
-  <p:clrMapOvr>
-    <a:masterClrMapping/>
-  </p:clrMapOvr>
-  <mc:AlternateContent xmlns:mc="http://schemas.openxmlformats.org/markup-compatibility/2006" xmlns:p14="http://schemas.microsoft.com/office/powerpoint/2010/main">
-    <mc:Choice Requires="p14">
-      <p:transition p14:dur="10"/>
-    </mc:Choice>
-    <mc:Fallback xmlns="">
-      <p:transition/>
-    </mc:Fallback>
-  </mc:AlternateContent>
-</p:sld>
-</file>
-
-<file path=ppt/slides/slide6.xml><?xml version="1.0" encoding="utf-8"?>
-<p:sld xmlns:a="http://schemas.openxmlformats.org/drawingml/2006/main" xmlns:r="http://schemas.openxmlformats.org/officeDocument/2006/relationships" xmlns:p="http://schemas.openxmlformats.org/presentationml/2006/main">
-  <p:cSld>
-    <p:spTree>
-      <p:nvGrpSpPr>
-        <p:cNvPr id="1" name=""/>
-        <p:cNvGrpSpPr/>
-        <p:nvPr/>
-      </p:nvGrpSpPr>
-      <p:grpSpPr>
-        <a:xfrm>
-          <a:off x="0" y="0"/>
-          <a:ext cx="0" cy="0"/>
-          <a:chOff x="0" y="0"/>
-          <a:chExt cx="0" cy="0"/>
-        </a:xfrm>
-      </p:grpSpPr>
-      <p:sp>
-        <p:nvSpPr>
-          <p:cNvPr id="6" name="タイトル 5">
-            <a:extLst>
-              <a:ext uri="{FF2B5EF4-FFF2-40B4-BE49-F238E27FC236}">
-                <a16:creationId xmlns:a16="http://schemas.microsoft.com/office/drawing/2014/main" id="{52EFDF95-98FB-35A4-278A-593504D72D28}"/>
-              </a:ext>
-            </a:extLst>
-          </p:cNvPr>
-          <p:cNvSpPr>
-            <a:spLocks noGrp="1"/>
-          </p:cNvSpPr>
-          <p:nvPr>
-            <p:ph type="title"/>
-          </p:nvPr>
-        </p:nvSpPr>
-        <p:spPr/>
-        <p:txBody>
-          <a:bodyPr/>
-          <a:lstStyle/>
-          <a:p>
-            <a:r>
-              <a:rPr lang="ja-JP" altLang="en-US" b="1" dirty="0"/>
-              <a:t>主張の整理</a:t>
-            </a:r>
-          </a:p>
-        </p:txBody>
-      </p:sp>
-    </p:spTree>
-    <p:extLst>
-      <p:ext uri="{BB962C8B-B14F-4D97-AF65-F5344CB8AC3E}">
-        <p14:creationId xmlns:p14="http://schemas.microsoft.com/office/powerpoint/2010/main" val="2989487295"/>
-      </p:ext>
-    </p:extLst>
-  </p:cSld>
-  <p:clrMapOvr>
-    <a:masterClrMapping/>
-  </p:clrMapOvr>
-</p:sld>
-</file>
-
-<file path=ppt/slides/slide7.xml><?xml version="1.0" encoding="utf-8"?>
-<p:sld xmlns:a="http://schemas.openxmlformats.org/drawingml/2006/main" xmlns:r="http://schemas.openxmlformats.org/officeDocument/2006/relationships" xmlns:p="http://schemas.openxmlformats.org/presentationml/2006/main">
-  <p:cSld>
-    <p:spTree>
-      <p:nvGrpSpPr>
-        <p:cNvPr id="1" name=""/>
-        <p:cNvGrpSpPr/>
-        <p:nvPr/>
-      </p:nvGrpSpPr>
-      <p:grpSpPr>
-        <a:xfrm>
-          <a:off x="0" y="0"/>
-          <a:ext cx="0" cy="0"/>
-          <a:chOff x="0" y="0"/>
-          <a:chExt cx="0" cy="0"/>
-        </a:xfrm>
-      </p:grpSpPr>
-      <p:sp>
-        <p:nvSpPr>
-          <p:cNvPr id="2" name="タイトル 1">
-            <a:extLst>
-              <a:ext uri="{FF2B5EF4-FFF2-40B4-BE49-F238E27FC236}">
-                <a16:creationId xmlns:a16="http://schemas.microsoft.com/office/drawing/2014/main" id="{1F13FE07-0C9B-DDF0-4577-0A7732F2FE30}"/>
-              </a:ext>
-            </a:extLst>
-          </p:cNvPr>
-          <p:cNvSpPr>
-            <a:spLocks noGrp="1"/>
-          </p:cNvSpPr>
-          <p:nvPr>
-            <p:ph type="title"/>
-          </p:nvPr>
-        </p:nvSpPr>
-        <p:spPr/>
-        <p:txBody>
-          <a:bodyPr/>
-          <a:lstStyle/>
-          <a:p>
-            <a:r>
-              <a:rPr kumimoji="1" lang="ja-JP" altLang="en-US" dirty="0"/>
-              <a:t>査読コメントの振り分け</a:t>
-            </a:r>
-          </a:p>
-        </p:txBody>
-      </p:sp>
-      <p:sp>
-        <p:nvSpPr>
-          <p:cNvPr id="3" name="テキスト プレースホルダー 2">
-            <a:extLst>
-              <a:ext uri="{FF2B5EF4-FFF2-40B4-BE49-F238E27FC236}">
-                <a16:creationId xmlns:a16="http://schemas.microsoft.com/office/drawing/2014/main" id="{78697263-CAD3-DD1C-B675-FB0A77D4B226}"/>
-              </a:ext>
-            </a:extLst>
-          </p:cNvPr>
-          <p:cNvSpPr>
-            <a:spLocks noGrp="1"/>
-          </p:cNvSpPr>
-          <p:nvPr>
-            <p:ph type="body" sz="quarter" idx="10"/>
-          </p:nvPr>
-        </p:nvSpPr>
-        <p:spPr/>
-        <p:txBody>
-          <a:bodyPr/>
-          <a:lstStyle/>
-          <a:p>
-            <a:r>
-              <a:rPr kumimoji="1" lang="ja-JP" altLang="en-US" dirty="0"/>
-              <a:t>まず，コメントで言われている内容ごとに </a:t>
-            </a:r>
-            <a:r>
-              <a:rPr kumimoji="1" lang="en-US" altLang="ja-JP" dirty="0"/>
-              <a:t>ID </a:t>
-            </a:r>
-            <a:r>
-              <a:rPr kumimoji="1" lang="ja-JP" altLang="en-US" dirty="0"/>
-              <a:t>を振る</a:t>
-            </a:r>
-            <a:endParaRPr kumimoji="1" lang="en-US" altLang="ja-JP" dirty="0"/>
-          </a:p>
-          <a:p>
-            <a:r>
-              <a:rPr lang="en-US" altLang="ja-JP" dirty="0"/>
-              <a:t>ID </a:t>
-            </a:r>
-            <a:r>
-              <a:rPr lang="ja-JP" altLang="en-US" dirty="0"/>
-              <a:t>のフォーマット： </a:t>
-            </a:r>
-            <a:r>
-              <a:rPr kumimoji="1" lang="en-US" altLang="ja-JP" dirty="0"/>
-              <a:t>$&lt;</a:t>
-            </a:r>
-            <a:r>
-              <a:rPr kumimoji="1" lang="ja-JP" altLang="en-US" dirty="0"/>
-              <a:t>査読者</a:t>
-            </a:r>
-            <a:r>
-              <a:rPr kumimoji="1" lang="en-US" altLang="ja-JP" dirty="0"/>
-              <a:t>&gt;&lt;</a:t>
-            </a:r>
-            <a:r>
-              <a:rPr kumimoji="1" lang="ja-JP" altLang="en-US" dirty="0"/>
-              <a:t>シリアル</a:t>
-            </a:r>
-            <a:r>
-              <a:rPr kumimoji="1" lang="en-US" altLang="ja-JP" dirty="0"/>
-              <a:t>&gt;-&lt;</a:t>
-            </a:r>
-            <a:r>
-              <a:rPr kumimoji="1" lang="ja-JP" altLang="en-US" dirty="0"/>
-              <a:t>タイプ</a:t>
-            </a:r>
-            <a:r>
-              <a:rPr kumimoji="1" lang="en-US" altLang="ja-JP" dirty="0"/>
-              <a:t>&gt;</a:t>
-            </a:r>
-          </a:p>
-          <a:p>
-            <a:pPr lvl="1"/>
-            <a:r>
-              <a:rPr lang="ja-JP" altLang="en-US" dirty="0"/>
-              <a:t>先頭に </a:t>
-            </a:r>
-            <a:r>
-              <a:rPr lang="en-US" altLang="ja-JP" dirty="0"/>
-              <a:t>$ </a:t>
-            </a:r>
-            <a:r>
-              <a:rPr lang="ja-JP" altLang="en-US" dirty="0"/>
-              <a:t>をつける</a:t>
-            </a:r>
-            <a:endParaRPr lang="en-US" altLang="ja-JP" dirty="0"/>
-          </a:p>
-          <a:p>
-            <a:pPr lvl="1"/>
-            <a:r>
-              <a:rPr lang="en-US" altLang="ja-JP" dirty="0"/>
-              <a:t>&lt;</a:t>
-            </a:r>
-            <a:r>
-              <a:rPr lang="ja-JP" altLang="en-US" dirty="0"/>
-              <a:t>査読者</a:t>
-            </a:r>
-            <a:r>
-              <a:rPr lang="en-US" altLang="ja-JP" dirty="0"/>
-              <a:t>&gt; </a:t>
-            </a:r>
-            <a:r>
-              <a:rPr lang="ja-JP" altLang="en-US" dirty="0"/>
-              <a:t>は査読者 </a:t>
-            </a:r>
-            <a:r>
-              <a:rPr lang="en-US" altLang="ja-JP" dirty="0"/>
-              <a:t>A </a:t>
-            </a:r>
-            <a:r>
-              <a:rPr lang="ja-JP" altLang="en-US" dirty="0"/>
-              <a:t>や </a:t>
-            </a:r>
-            <a:r>
-              <a:rPr lang="en-US" altLang="ja-JP" dirty="0"/>
-              <a:t>B </a:t>
-            </a:r>
-            <a:r>
-              <a:rPr lang="ja-JP" altLang="en-US" dirty="0"/>
-              <a:t>などのアルファベット</a:t>
-            </a:r>
-            <a:endParaRPr lang="en-US" altLang="ja-JP" dirty="0"/>
-          </a:p>
-          <a:p>
-            <a:pPr lvl="1"/>
-            <a:r>
-              <a:rPr kumimoji="1" lang="en-US" altLang="ja-JP" dirty="0"/>
-              <a:t>&lt;</a:t>
-            </a:r>
-            <a:r>
-              <a:rPr kumimoji="1" lang="ja-JP" altLang="en-US" dirty="0"/>
-              <a:t>シリアル</a:t>
-            </a:r>
-            <a:r>
-              <a:rPr kumimoji="1" lang="en-US" altLang="ja-JP" dirty="0"/>
-              <a:t>&gt; </a:t>
-            </a:r>
-            <a:r>
-              <a:rPr kumimoji="1" lang="ja-JP" altLang="en-US" dirty="0"/>
-              <a:t>は一意な識別番号</a:t>
-            </a:r>
-            <a:endParaRPr kumimoji="1" lang="en-US" altLang="ja-JP" dirty="0"/>
-          </a:p>
-          <a:p>
-            <a:pPr lvl="2"/>
-            <a:r>
-              <a:rPr kumimoji="1" lang="ja-JP" altLang="en-US" dirty="0"/>
-              <a:t>査読者ごとには番号は被っても良い</a:t>
-            </a:r>
-            <a:endParaRPr kumimoji="1" lang="en-US" altLang="ja-JP" dirty="0"/>
-          </a:p>
-          <a:p>
-            <a:pPr lvl="3"/>
-            <a:r>
-              <a:rPr lang="en-US" altLang="ja-JP" dirty="0"/>
-              <a:t>A1 </a:t>
-            </a:r>
-            <a:r>
-              <a:rPr lang="ja-JP" altLang="en-US" dirty="0"/>
-              <a:t>と </a:t>
-            </a:r>
-            <a:r>
-              <a:rPr lang="en-US" altLang="ja-JP" dirty="0"/>
-              <a:t>B1 </a:t>
-            </a:r>
-            <a:r>
-              <a:rPr lang="ja-JP" altLang="en-US" dirty="0"/>
-              <a:t>があってもよい</a:t>
-            </a:r>
-            <a:endParaRPr kumimoji="1" lang="en-US" altLang="ja-JP" dirty="0"/>
-          </a:p>
-          <a:p>
-            <a:pPr lvl="2"/>
-            <a:r>
-              <a:rPr kumimoji="1" lang="ja-JP" altLang="en-US" dirty="0"/>
-              <a:t>査読者が同じでもタイプが異なる場合は被ってはいけない</a:t>
-            </a:r>
-            <a:endParaRPr kumimoji="1" lang="en-US" altLang="ja-JP" dirty="0"/>
-          </a:p>
-          <a:p>
-            <a:pPr lvl="3"/>
-            <a:r>
-              <a:rPr lang="en-US" altLang="ja-JP" dirty="0"/>
-              <a:t>A1-w </a:t>
-            </a:r>
-            <a:r>
-              <a:rPr lang="ja-JP" altLang="en-US" dirty="0"/>
-              <a:t>と </a:t>
-            </a:r>
-            <a:r>
-              <a:rPr lang="en-US" altLang="ja-JP" dirty="0"/>
-              <a:t>A1-c </a:t>
-            </a:r>
-            <a:r>
-              <a:rPr lang="ja-JP" altLang="en-US" dirty="0"/>
-              <a:t>が同時にあってはいけない</a:t>
-            </a:r>
-            <a:endParaRPr lang="en-US" altLang="ja-JP" dirty="0"/>
-          </a:p>
-          <a:p>
-            <a:pPr lvl="1"/>
-            <a:r>
-              <a:rPr kumimoji="1" lang="en-US" altLang="ja-JP" dirty="0"/>
-              <a:t>&lt;</a:t>
-            </a:r>
-            <a:r>
-              <a:rPr kumimoji="1" lang="ja-JP" altLang="en-US" dirty="0"/>
-              <a:t>タイプ</a:t>
-            </a:r>
-            <a:r>
-              <a:rPr lang="en-US" altLang="ja-JP" dirty="0"/>
-              <a:t>&gt; </a:t>
-            </a:r>
-            <a:r>
-              <a:rPr lang="ja-JP" altLang="en-US" dirty="0"/>
-              <a:t>は </a:t>
-            </a:r>
-            <a:r>
-              <a:rPr lang="en-US" altLang="ja-JP" dirty="0"/>
-              <a:t>week point </a:t>
-            </a:r>
-            <a:r>
-              <a:rPr lang="ja-JP" altLang="en-US" dirty="0"/>
-              <a:t>なら </a:t>
-            </a:r>
-            <a:r>
-              <a:rPr lang="en-US" altLang="ja-JP" dirty="0"/>
-              <a:t>w</a:t>
-            </a:r>
-            <a:r>
-              <a:rPr lang="ja-JP" altLang="en-US" dirty="0"/>
-              <a:t>，質問なら </a:t>
-            </a:r>
-            <a:r>
-              <a:rPr lang="en-US" altLang="ja-JP" dirty="0"/>
-              <a:t>q</a:t>
-            </a:r>
-            <a:r>
-              <a:rPr lang="ja-JP" altLang="en-US" dirty="0"/>
-              <a:t>，コメントなら </a:t>
-            </a:r>
-            <a:r>
-              <a:rPr lang="en-US" altLang="ja-JP" dirty="0"/>
-              <a:t>c</a:t>
-            </a:r>
-          </a:p>
-          <a:p>
-            <a:r>
-              <a:rPr lang="ja-JP" altLang="en-US" dirty="0"/>
-              <a:t>例：</a:t>
-            </a:r>
-            <a:endParaRPr lang="en-US" altLang="ja-JP" dirty="0"/>
-          </a:p>
-          <a:p>
-            <a:pPr lvl="1"/>
-            <a:r>
-              <a:rPr lang="en-US" altLang="ja-JP" dirty="0"/>
-              <a:t>$A1-c, $B3-w, $E7-q </a:t>
-            </a:r>
-            <a:r>
-              <a:rPr lang="ja-JP" altLang="en-US" dirty="0"/>
-              <a:t>など</a:t>
-            </a:r>
-            <a:endParaRPr lang="en-US" altLang="ja-JP" dirty="0"/>
-          </a:p>
-        </p:txBody>
-      </p:sp>
-    </p:spTree>
-    <p:extLst>
-      <p:ext uri="{BB962C8B-B14F-4D97-AF65-F5344CB8AC3E}">
-        <p14:creationId xmlns:p14="http://schemas.microsoft.com/office/powerpoint/2010/main" val="1324197351"/>
+        <p14:creationId xmlns:p14="http://schemas.microsoft.com/office/powerpoint/2010/main" val="1109717599"/>
       </p:ext>
     </p:extLst>
   </p:cSld>
@@ -9830,7 +9960,7 @@
           <p:cNvPr id="2" name="タイトル 1">
             <a:extLst>
               <a:ext uri="{FF2B5EF4-FFF2-40B4-BE49-F238E27FC236}">
-                <a16:creationId xmlns:a16="http://schemas.microsoft.com/office/drawing/2014/main" id="{3552FC58-F8EA-E936-CC7C-FBD585AE3EB1}"/>
+                <a16:creationId xmlns:a16="http://schemas.microsoft.com/office/drawing/2014/main" id="{32D0AF51-BF33-1A8C-FCC7-1A6AF974B7EA}"/>
               </a:ext>
             </a:extLst>
           </p:cNvPr>
@@ -9847,12 +9977,8 @@
           <a:lstStyle/>
           <a:p>
             <a:r>
-              <a:rPr kumimoji="1" lang="en-US" altLang="ja-JP" dirty="0"/>
-              <a:t>ID </a:t>
-            </a:r>
-            <a:r>
               <a:rPr kumimoji="1" lang="ja-JP" altLang="en-US" dirty="0"/>
-              <a:t>フォーマットがこうなってる理由</a:t>
+              <a:t>取捨選択</a:t>
             </a:r>
           </a:p>
         </p:txBody>
@@ -9862,7 +9988,7 @@
           <p:cNvPr id="3" name="テキスト プレースホルダー 2">
             <a:extLst>
               <a:ext uri="{FF2B5EF4-FFF2-40B4-BE49-F238E27FC236}">
-                <a16:creationId xmlns:a16="http://schemas.microsoft.com/office/drawing/2014/main" id="{399195B9-8ED2-6EA8-314C-DDF2412E7F4E}"/>
+                <a16:creationId xmlns:a16="http://schemas.microsoft.com/office/drawing/2014/main" id="{0A176352-ED46-261E-2C8F-EAC9C29E45C0}"/>
               </a:ext>
             </a:extLst>
           </p:cNvPr>
@@ -9879,130 +10005,33 @@
           <a:lstStyle/>
           <a:p>
             <a:r>
-              <a:rPr kumimoji="1" lang="ja-JP" altLang="en-US" sz="1800" dirty="0"/>
-              <a:t>主に識別を容易にするため：</a:t>
-            </a:r>
-            <a:endParaRPr kumimoji="1" lang="en-US" altLang="ja-JP" sz="1800" dirty="0"/>
+              <a:rPr lang="ja-JP" altLang="en-US" dirty="0"/>
+              <a:t>大抵字数が大きく限られている事が多い</a:t>
+            </a:r>
+            <a:endParaRPr lang="en-US" altLang="ja-JP" dirty="0"/>
           </a:p>
           <a:p>
             <a:pPr lvl="1"/>
             <a:r>
-              <a:rPr kumimoji="1" lang="ja-JP" altLang="en-US" sz="1800" dirty="0"/>
-              <a:t>「査読者 </a:t>
-            </a:r>
-            <a:r>
-              <a:rPr kumimoji="1" lang="en-US" altLang="ja-JP" sz="1800" dirty="0"/>
-              <a:t>A </a:t>
-            </a:r>
-            <a:r>
-              <a:rPr kumimoji="1" lang="ja-JP" altLang="en-US" sz="1800" dirty="0"/>
-              <a:t>が言ってた～に関する説明がないというやつなんだけど」よりも 「コメント </a:t>
-            </a:r>
-            <a:r>
-              <a:rPr kumimoji="1" lang="en-US" altLang="ja-JP" sz="1800" dirty="0"/>
-              <a:t>A4 </a:t>
-            </a:r>
-            <a:r>
-              <a:rPr kumimoji="1" lang="ja-JP" altLang="en-US" sz="1800" dirty="0"/>
-              <a:t>なんだけど」の方が早い</a:t>
-            </a:r>
-            <a:endParaRPr kumimoji="1" lang="en-US" altLang="ja-JP" sz="1800" dirty="0"/>
-          </a:p>
-          <a:p>
-            <a:r>
-              <a:rPr kumimoji="1" lang="ja-JP" altLang="en-US" sz="1800" dirty="0"/>
-              <a:t>タイプ部分（</a:t>
-            </a:r>
-            <a:r>
-              <a:rPr kumimoji="1" lang="en-US" altLang="ja-JP" sz="1800" dirty="0"/>
-              <a:t>$A4-w </a:t>
-            </a:r>
-            <a:r>
-              <a:rPr kumimoji="1" lang="ja-JP" altLang="en-US" sz="1800" dirty="0"/>
-              <a:t>の </a:t>
-            </a:r>
-            <a:r>
-              <a:rPr kumimoji="1" lang="en-US" altLang="ja-JP" sz="1800" dirty="0"/>
-              <a:t>–w </a:t>
-            </a:r>
-            <a:r>
-              <a:rPr kumimoji="1" lang="ja-JP" altLang="en-US" sz="1800" dirty="0"/>
-              <a:t>の部分）は無視しても識別可能な方がよい</a:t>
-            </a:r>
-            <a:endParaRPr kumimoji="1" lang="en-US" altLang="ja-JP" sz="1800" dirty="0"/>
+              <a:rPr lang="ja-JP" altLang="en-US" dirty="0"/>
+              <a:t>全部の質問にはまともの答えられない</a:t>
+            </a:r>
+            <a:endParaRPr lang="en-US" altLang="ja-JP" dirty="0"/>
           </a:p>
           <a:p>
             <a:pPr lvl="1"/>
             <a:r>
-              <a:rPr kumimoji="1" lang="ja-JP" altLang="en-US" sz="1800" dirty="0"/>
-              <a:t>査読者ごとに一意な番号をふる</a:t>
-            </a:r>
-            <a:endParaRPr kumimoji="1" lang="en-US" altLang="ja-JP" sz="1800" dirty="0"/>
-          </a:p>
-          <a:p>
-            <a:pPr lvl="1"/>
-            <a:r>
-              <a:rPr kumimoji="1" lang="en-US" altLang="ja-JP" sz="1800" dirty="0"/>
-              <a:t>A1-w </a:t>
-            </a:r>
-            <a:r>
-              <a:rPr kumimoji="1" lang="ja-JP" altLang="en-US" sz="1800" dirty="0"/>
-              <a:t>と </a:t>
-            </a:r>
-            <a:r>
-              <a:rPr kumimoji="1" lang="en-US" altLang="ja-JP" sz="1800" dirty="0"/>
-              <a:t>A1-q </a:t>
-            </a:r>
-            <a:r>
-              <a:rPr kumimoji="1" lang="ja-JP" altLang="en-US" sz="1800" dirty="0"/>
-              <a:t>が並列に存在すると，どっちかわからなくなる</a:t>
-            </a:r>
-            <a:endParaRPr kumimoji="1" lang="en-US" altLang="ja-JP" sz="1800" dirty="0"/>
-          </a:p>
-          <a:p>
-            <a:r>
-              <a:rPr lang="ja-JP" altLang="en-US" sz="1800" dirty="0"/>
-              <a:t>タイプ部分は対応を考える際の重要度を簡易に表す</a:t>
-            </a:r>
-            <a:endParaRPr lang="en-US" altLang="ja-JP" sz="1800" dirty="0"/>
-          </a:p>
-          <a:p>
-            <a:pPr lvl="1"/>
-            <a:r>
-              <a:rPr lang="ja-JP" altLang="en-US" sz="1800" dirty="0"/>
-              <a:t>ただのコメントと，弱点としてあげられている点では異なる</a:t>
-            </a:r>
-            <a:endParaRPr lang="en-US" altLang="ja-JP" sz="1800" dirty="0"/>
-          </a:p>
-          <a:p>
-            <a:r>
-              <a:rPr lang="en-US" altLang="ja-JP" sz="1800" dirty="0"/>
-              <a:t>$ </a:t>
-            </a:r>
-            <a:r>
-              <a:rPr lang="ja-JP" altLang="en-US" sz="1800" dirty="0"/>
-              <a:t>はファイル内の検索性を上げるためにある</a:t>
-            </a:r>
-            <a:endParaRPr lang="en-US" altLang="ja-JP" sz="1800" dirty="0"/>
-          </a:p>
-          <a:p>
-            <a:pPr lvl="1"/>
-            <a:r>
-              <a:rPr kumimoji="1" lang="en-US" altLang="ja-JP" sz="1800" dirty="0"/>
-              <a:t>A1 </a:t>
-            </a:r>
-            <a:r>
-              <a:rPr kumimoji="1" lang="ja-JP" altLang="en-US" sz="1800" dirty="0"/>
-              <a:t>等だと，検索した際に査読コメント内の地の文でもヒットする可能性が結構高い</a:t>
-            </a:r>
-            <a:endParaRPr kumimoji="1" lang="en-US" altLang="ja-JP" sz="1800" dirty="0"/>
+              <a:rPr lang="ja-JP" altLang="en-US" dirty="0"/>
+              <a:t>なんらかの基準でしぼらないといけない</a:t>
+            </a:r>
+            <a:endParaRPr kumimoji="1" lang="ja-JP" altLang="en-US" dirty="0"/>
           </a:p>
         </p:txBody>
       </p:sp>
     </p:spTree>
     <p:extLst>
       <p:ext uri="{BB962C8B-B14F-4D97-AF65-F5344CB8AC3E}">
-        <p14:creationId xmlns:p14="http://schemas.microsoft.com/office/powerpoint/2010/main" val="1618595750"/>
+        <p14:creationId xmlns:p14="http://schemas.microsoft.com/office/powerpoint/2010/main" val="414735286"/>
       </p:ext>
     </p:extLst>
   </p:cSld>
@@ -10039,10 +10068,10 @@
       </p:grpSpPr>
       <p:sp>
         <p:nvSpPr>
-          <p:cNvPr id="2" name="タイトル 1">
+          <p:cNvPr id="4" name="タイトル 3">
             <a:extLst>
               <a:ext uri="{FF2B5EF4-FFF2-40B4-BE49-F238E27FC236}">
-                <a16:creationId xmlns:a16="http://schemas.microsoft.com/office/drawing/2014/main" id="{B96AD0FA-E9D6-EE5C-BA81-39B202C37D09}"/>
+                <a16:creationId xmlns:a16="http://schemas.microsoft.com/office/drawing/2014/main" id="{F4D90254-02E5-5150-E679-EA950D7ABAFA}"/>
               </a:ext>
             </a:extLst>
           </p:cNvPr>
@@ -10059,22 +10088,18 @@
           <a:lstStyle/>
           <a:p>
             <a:r>
-              <a:rPr kumimoji="1" lang="en-US" altLang="ja-JP" dirty="0"/>
-              <a:t>ID </a:t>
-            </a:r>
-            <a:r>
-              <a:rPr kumimoji="1" lang="ja-JP" altLang="en-US" dirty="0"/>
-              <a:t>を振った主張にタイトルをつける</a:t>
+              <a:rPr lang="ja-JP" altLang="en-US" dirty="0"/>
+              <a:t>考え方１：ポジティブな人に引っ張って貰う場合</a:t>
             </a:r>
           </a:p>
         </p:txBody>
       </p:sp>
       <p:sp>
         <p:nvSpPr>
-          <p:cNvPr id="3" name="テキスト プレースホルダー 2">
+          <p:cNvPr id="5" name="テキスト プレースホルダー 4">
             <a:extLst>
               <a:ext uri="{FF2B5EF4-FFF2-40B4-BE49-F238E27FC236}">
-                <a16:creationId xmlns:a16="http://schemas.microsoft.com/office/drawing/2014/main" id="{C331662F-15DA-EE17-1D0F-2812348D1152}"/>
+                <a16:creationId xmlns:a16="http://schemas.microsoft.com/office/drawing/2014/main" id="{77F9C7DC-8B72-E4A4-A675-C367E5757137}"/>
               </a:ext>
             </a:extLst>
           </p:cNvPr>
@@ -10091,75 +10116,106 @@
           <a:lstStyle/>
           <a:p>
             <a:r>
-              <a:rPr kumimoji="1" lang="ja-JP" altLang="en-US" sz="1800" dirty="0"/>
-              <a:t>主張ごとにタイトルをつけ，先頭に括弧とともに </a:t>
-            </a:r>
-            <a:r>
-              <a:rPr kumimoji="1" lang="en-US" altLang="ja-JP" sz="1800" dirty="0"/>
-              <a:t>ID </a:t>
-            </a:r>
-            <a:r>
-              <a:rPr kumimoji="1" lang="ja-JP" altLang="en-US" sz="1800" dirty="0"/>
-              <a:t>をつける</a:t>
-            </a:r>
-            <a:endParaRPr kumimoji="1" lang="en-US" altLang="ja-JP" sz="1800" dirty="0"/>
-          </a:p>
-          <a:p>
-            <a:r>
-              <a:rPr kumimoji="1" lang="ja-JP" altLang="en-US" sz="1800" dirty="0"/>
-              <a:t>例：</a:t>
-            </a:r>
-            <a:endParaRPr kumimoji="1" lang="en-US" altLang="ja-JP" sz="1800" dirty="0"/>
+              <a:rPr lang="ja-JP" altLang="en-US" dirty="0"/>
+              <a:t>たとえば </a:t>
+            </a:r>
+            <a:r>
+              <a:rPr lang="en-US" altLang="ja-JP" dirty="0"/>
+              <a:t>accept 1</a:t>
+            </a:r>
+            <a:r>
+              <a:rPr lang="ja-JP" altLang="en-US" dirty="0"/>
+              <a:t>人が凄くポジティブ </a:t>
+            </a:r>
+            <a:r>
+              <a:rPr lang="en-US" altLang="ja-JP" dirty="0"/>
+              <a:t>+ </a:t>
+            </a:r>
+            <a:r>
+              <a:rPr lang="ja-JP" altLang="en-US" dirty="0"/>
+              <a:t>残り全員 </a:t>
+            </a:r>
+            <a:r>
+              <a:rPr lang="en-US" altLang="ja-JP" dirty="0"/>
+              <a:t>weak reject </a:t>
+            </a:r>
+            <a:r>
+              <a:rPr lang="ja-JP" altLang="en-US" dirty="0"/>
+              <a:t>の場合を想定</a:t>
+            </a:r>
+            <a:endParaRPr lang="en-US" altLang="ja-JP" dirty="0"/>
+          </a:p>
+          <a:p>
+            <a:r>
+              <a:rPr lang="ja-JP" altLang="en-US" dirty="0"/>
+              <a:t>ポジティブな人に引っ張ってもらう</a:t>
+            </a:r>
+            <a:endParaRPr lang="en-US" altLang="ja-JP" dirty="0"/>
           </a:p>
           <a:p>
             <a:pPr lvl="1"/>
             <a:r>
-              <a:rPr kumimoji="1" lang="en-US" altLang="ja-JP" sz="1800" dirty="0"/>
-              <a:t>($A1-q) </a:t>
-            </a:r>
-            <a:r>
-              <a:rPr kumimoji="1" lang="ja-JP" altLang="en-US" sz="1800" dirty="0"/>
-              <a:t>関数がループで繰り返される場合はうまく学習できるのか？</a:t>
-            </a:r>
-            <a:endParaRPr kumimoji="1" lang="en-US" altLang="ja-JP" sz="1800" dirty="0"/>
+              <a:rPr lang="ja-JP" altLang="en-US" dirty="0"/>
+              <a:t>ポジティブな査読者が残り査読者を説得して，引っ張り上げてくれることがある</a:t>
+            </a:r>
+            <a:endParaRPr lang="en-US" altLang="ja-JP" dirty="0"/>
           </a:p>
           <a:p>
             <a:pPr lvl="1"/>
             <a:r>
-              <a:rPr kumimoji="1" lang="en-US" altLang="ja-JP" sz="1800" dirty="0"/>
-              <a:t>($A2-q) Figure 17 </a:t>
-            </a:r>
-            <a:r>
-              <a:rPr kumimoji="1" lang="ja-JP" altLang="en-US" sz="1800" dirty="0"/>
-              <a:t>の </a:t>
-            </a:r>
-            <a:r>
-              <a:rPr kumimoji="1" lang="en-US" altLang="ja-JP" sz="1800" dirty="0"/>
-              <a:t>Distance </a:t>
-            </a:r>
-            <a:r>
-              <a:rPr kumimoji="1" lang="ja-JP" altLang="en-US" sz="1800" dirty="0"/>
-              <a:t>はどのように定義したのか？</a:t>
-            </a:r>
-            <a:endParaRPr kumimoji="1" lang="en-US" altLang="ja-JP" sz="1800" dirty="0"/>
-          </a:p>
-          <a:p>
-            <a:pPr lvl="1"/>
-            <a:r>
-              <a:rPr kumimoji="1" lang="en-US" altLang="ja-JP" sz="1800" dirty="0"/>
-              <a:t>($B11-c) Distance </a:t>
-            </a:r>
-            <a:r>
-              <a:rPr kumimoji="1" lang="ja-JP" altLang="en-US" sz="1800" dirty="0"/>
-              <a:t>の動的な変更をしたほうが良いか</a:t>
-            </a:r>
+              <a:rPr lang="ja-JP" altLang="en-US" dirty="0"/>
+              <a:t>この好意的な査読者をアシストしたい</a:t>
+            </a:r>
+            <a:endParaRPr lang="en-US" altLang="ja-JP" dirty="0"/>
+          </a:p>
+          <a:p>
+            <a:pPr lvl="2"/>
+            <a:r>
+              <a:rPr lang="ja-JP" altLang="en-US" dirty="0"/>
+              <a:t>ネガティブな人を納得させるための説得の材料を提供する</a:t>
+            </a:r>
+          </a:p>
+        </p:txBody>
+      </p:sp>
+      <p:sp>
+        <p:nvSpPr>
+          <p:cNvPr id="2" name="スライド番号プレースホルダー 1">
+            <a:extLst>
+              <a:ext uri="{FF2B5EF4-FFF2-40B4-BE49-F238E27FC236}">
+                <a16:creationId xmlns:a16="http://schemas.microsoft.com/office/drawing/2014/main" id="{31ABB5DD-A344-815C-93B3-D0854B35BF15}"/>
+              </a:ext>
+            </a:extLst>
+          </p:cNvPr>
+          <p:cNvSpPr>
+            <a:spLocks noGrp="1"/>
+          </p:cNvSpPr>
+          <p:nvPr>
+            <p:ph type="sldNum" sz="quarter" idx="4294967295"/>
+          </p:nvPr>
+        </p:nvSpPr>
+        <p:spPr>
+          <a:xfrm>
+            <a:off x="8531225" y="6308725"/>
+            <a:ext cx="612775" cy="549275"/>
+          </a:xfrm>
+        </p:spPr>
+        <p:txBody>
+          <a:bodyPr/>
+          <a:lstStyle/>
+          <a:p>
+            <a:fld id="{D2D8002D-B5B0-4BAC-B1F6-782DDCCE6D9C}" type="slidenum">
+              <a:rPr kumimoji="1" lang="ja-JP" altLang="en-US" smtClean="0"/>
+              <a:pPr/>
+              <a:t>9</a:t>
+            </a:fld>
+            <a:endParaRPr kumimoji="1" lang="ja-JP" altLang="en-US"/>
           </a:p>
         </p:txBody>
       </p:sp>
     </p:spTree>
     <p:extLst>
       <p:ext uri="{BB962C8B-B14F-4D97-AF65-F5344CB8AC3E}">
-        <p14:creationId xmlns:p14="http://schemas.microsoft.com/office/powerpoint/2010/main" val="3986084711"/>
+        <p14:creationId xmlns:p14="http://schemas.microsoft.com/office/powerpoint/2010/main" val="3849530037"/>
       </p:ext>
     </p:extLst>
   </p:cSld>

</xml_diff>

<commit_message>
rebuttal を v3 に
</commit_message>
<xml_diff>
--- a/rebuttal.pptx
+++ b/rebuttal.pptx
@@ -5,7 +5,7 @@
     <p:sldMasterId id="2147483669" r:id="rId1"/>
   </p:sldMasterIdLst>
   <p:notesMasterIdLst>
-    <p:notesMasterId r:id="rId27"/>
+    <p:notesMasterId r:id="rId28"/>
   </p:notesMasterIdLst>
   <p:sldIdLst>
     <p:sldId id="440" r:id="rId2"/>
@@ -17,22 +17,23 @@
     <p:sldId id="529" r:id="rId8"/>
     <p:sldId id="531" r:id="rId9"/>
     <p:sldId id="526" r:id="rId10"/>
-    <p:sldId id="530" r:id="rId11"/>
-    <p:sldId id="525" r:id="rId12"/>
-    <p:sldId id="521" r:id="rId13"/>
-    <p:sldId id="509" r:id="rId14"/>
-    <p:sldId id="512" r:id="rId15"/>
-    <p:sldId id="511" r:id="rId16"/>
-    <p:sldId id="513" r:id="rId17"/>
-    <p:sldId id="514" r:id="rId18"/>
-    <p:sldId id="515" r:id="rId19"/>
-    <p:sldId id="516" r:id="rId20"/>
-    <p:sldId id="522" r:id="rId21"/>
-    <p:sldId id="517" r:id="rId22"/>
-    <p:sldId id="518" r:id="rId23"/>
-    <p:sldId id="519" r:id="rId24"/>
-    <p:sldId id="520" r:id="rId25"/>
-    <p:sldId id="510" r:id="rId26"/>
+    <p:sldId id="532" r:id="rId11"/>
+    <p:sldId id="530" r:id="rId12"/>
+    <p:sldId id="525" r:id="rId13"/>
+    <p:sldId id="521" r:id="rId14"/>
+    <p:sldId id="509" r:id="rId15"/>
+    <p:sldId id="512" r:id="rId16"/>
+    <p:sldId id="511" r:id="rId17"/>
+    <p:sldId id="513" r:id="rId18"/>
+    <p:sldId id="514" r:id="rId19"/>
+    <p:sldId id="515" r:id="rId20"/>
+    <p:sldId id="516" r:id="rId21"/>
+    <p:sldId id="522" r:id="rId22"/>
+    <p:sldId id="517" r:id="rId23"/>
+    <p:sldId id="518" r:id="rId24"/>
+    <p:sldId id="519" r:id="rId25"/>
+    <p:sldId id="520" r:id="rId26"/>
+    <p:sldId id="510" r:id="rId27"/>
   </p:sldIdLst>
   <p:sldSz cx="9144000" cy="6858000" type="screen4x3"/>
   <p:notesSz cx="6858000" cy="9144000"/>
@@ -149,6 +150,7 @@
             <p14:sldId id="529"/>
             <p14:sldId id="531"/>
             <p14:sldId id="526"/>
+            <p14:sldId id="532"/>
             <p14:sldId id="530"/>
             <p14:sldId id="525"/>
           </p14:sldIdLst>
@@ -280,7 +282,7 @@
           <a:p>
             <a:fld id="{2ABE53D4-1A7B-4FFE-8A95-4265B045F058}" type="datetimeFigureOut">
               <a:rPr kumimoji="1" lang="ja-JP" altLang="en-US" smtClean="0"/>
-              <a:t>2023/8/25</a:t>
+              <a:t>2023/12/5</a:t>
             </a:fld>
             <a:endParaRPr kumimoji="1" lang="ja-JP" altLang="en-US"/>
           </a:p>
@@ -3075,7 +3077,7 @@
             </a:r>
             <a:r>
               <a:rPr lang="en-US" altLang="ja-JP" sz="2800" dirty="0"/>
-              <a:t>v2</a:t>
+              <a:t>v3</a:t>
             </a:r>
             <a:endParaRPr kumimoji="1" lang="ja-JP" altLang="en-US" sz="2800" dirty="0"/>
           </a:p>
@@ -3448,7 +3450,7 @@
           <a:p>
             <a:r>
               <a:rPr lang="ja-JP" altLang="en-US" dirty="0"/>
-              <a:t>明らかな弱点の場合，何を書いても無駄なことはある</a:t>
+              <a:t>明らかな弱点の場合，何を書いても無駄そうなことはある</a:t>
             </a:r>
             <a:endParaRPr lang="en-US" altLang="ja-JP" dirty="0"/>
           </a:p>
@@ -3464,7 +3466,7 @@
             <a:pPr lvl="1"/>
             <a:r>
               <a:rPr lang="ja-JP" altLang="en-US" dirty="0"/>
-              <a:t>なくても良い理由をくどくど書いても加点されない可能性が高い</a:t>
+              <a:t>「加点にならない質問には回答しない」という指針の人もいる</a:t>
             </a:r>
             <a:endParaRPr lang="en-US" altLang="ja-JP" dirty="0"/>
           </a:p>
@@ -3472,84 +3474,16 @@
             <a:pPr lvl="2"/>
             <a:r>
               <a:rPr lang="ja-JP" altLang="en-US" dirty="0"/>
-              <a:t>特に一般にその「～の測定」が良く行われている時とか</a:t>
+              <a:t>測定がなくても良い理由をくどくど書いても加点されない？</a:t>
             </a:r>
             <a:endParaRPr lang="en-US" altLang="ja-JP" dirty="0"/>
-          </a:p>
-          <a:p>
-            <a:r>
-              <a:rPr lang="ja-JP" altLang="en-US" dirty="0"/>
-              <a:t>「加点にならない質問には回答しない」という指針もある</a:t>
-            </a:r>
-            <a:endParaRPr lang="en-US" altLang="ja-JP" dirty="0"/>
-          </a:p>
-          <a:p>
-            <a:pPr lvl="1"/>
-            <a:r>
-              <a:rPr lang="ja-JP" altLang="en-US" dirty="0"/>
-              <a:t>とある先生はこの方針だが，わりと極端な考え方であると思う</a:t>
-            </a:r>
-            <a:endParaRPr lang="en-US" altLang="ja-JP" dirty="0"/>
-          </a:p>
-          <a:p>
-            <a:pPr lvl="1"/>
-            <a:r>
-              <a:rPr lang="ja-JP" altLang="en-US" dirty="0"/>
-              <a:t>不誠実な印象を与える可能性もある</a:t>
-            </a:r>
-            <a:endParaRPr lang="en-US" altLang="ja-JP" dirty="0"/>
-          </a:p>
-          <a:p>
-            <a:r>
-              <a:rPr lang="ja-JP" altLang="en-US" dirty="0">
-                <a:solidFill>
-                  <a:schemeClr val="accent5"/>
-                </a:solidFill>
-              </a:rPr>
-              <a:t>でも「なにを答えれば加点に繋がるか」という視点は重要</a:t>
-            </a:r>
-          </a:p>
-        </p:txBody>
-      </p:sp>
-      <p:sp>
-        <p:nvSpPr>
-          <p:cNvPr id="2" name="スライド番号プレースホルダー 1">
-            <a:extLst>
-              <a:ext uri="{FF2B5EF4-FFF2-40B4-BE49-F238E27FC236}">
-                <a16:creationId xmlns:a16="http://schemas.microsoft.com/office/drawing/2014/main" id="{31ABB5DD-A344-815C-93B3-D0854B35BF15}"/>
-              </a:ext>
-            </a:extLst>
-          </p:cNvPr>
-          <p:cNvSpPr>
-            <a:spLocks noGrp="1"/>
-          </p:cNvSpPr>
-          <p:nvPr>
-            <p:ph type="sldNum" sz="quarter" idx="4294967295"/>
-          </p:nvPr>
-        </p:nvSpPr>
-        <p:spPr>
-          <a:xfrm>
-            <a:off x="8531225" y="6308725"/>
-            <a:ext cx="612775" cy="549275"/>
-          </a:xfrm>
-        </p:spPr>
-        <p:txBody>
-          <a:bodyPr/>
-          <a:lstStyle/>
-          <a:p>
-            <a:fld id="{D2D8002D-B5B0-4BAC-B1F6-782DDCCE6D9C}" type="slidenum">
-              <a:rPr kumimoji="1" lang="ja-JP" altLang="en-US" smtClean="0"/>
-              <a:pPr/>
-              <a:t>10</a:t>
-            </a:fld>
-            <a:endParaRPr kumimoji="1" lang="ja-JP" altLang="en-US"/>
           </a:p>
         </p:txBody>
       </p:sp>
     </p:spTree>
     <p:extLst>
       <p:ext uri="{BB962C8B-B14F-4D97-AF65-F5344CB8AC3E}">
-        <p14:creationId xmlns:p14="http://schemas.microsoft.com/office/powerpoint/2010/main" val="4268246625"/>
+        <p14:creationId xmlns:p14="http://schemas.microsoft.com/office/powerpoint/2010/main" val="1051356647"/>
       </p:ext>
     </p:extLst>
   </p:cSld>
@@ -3589,7 +3523,7 @@
           <p:cNvPr id="4" name="タイトル 3">
             <a:extLst>
               <a:ext uri="{FF2B5EF4-FFF2-40B4-BE49-F238E27FC236}">
-                <a16:creationId xmlns:a16="http://schemas.microsoft.com/office/drawing/2014/main" id="{D4972FC8-631C-CF56-D504-447CB9BAAD27}"/>
+                <a16:creationId xmlns:a16="http://schemas.microsoft.com/office/drawing/2014/main" id="{F4D90254-02E5-5150-E679-EA950D7ABAFA}"/>
               </a:ext>
             </a:extLst>
           </p:cNvPr>
@@ -3607,7 +3541,7 @@
           <a:p>
             <a:r>
               <a:rPr lang="ja-JP" altLang="en-US" dirty="0"/>
-              <a:t>参考</a:t>
+              <a:t>考え方２：加点にならない事は書かない？</a:t>
             </a:r>
           </a:p>
         </p:txBody>
@@ -3617,7 +3551,7 @@
           <p:cNvPr id="5" name="テキスト プレースホルダー 4">
             <a:extLst>
               <a:ext uri="{FF2B5EF4-FFF2-40B4-BE49-F238E27FC236}">
-                <a16:creationId xmlns:a16="http://schemas.microsoft.com/office/drawing/2014/main" id="{56501602-0A9E-AC44-1DE7-A9DFF44160F4}"/>
+                <a16:creationId xmlns:a16="http://schemas.microsoft.com/office/drawing/2014/main" id="{77F9C7DC-8B72-E4A4-A675-C367E5757137}"/>
               </a:ext>
             </a:extLst>
           </p:cNvPr>
@@ -3634,119 +3568,103 @@
           <a:lstStyle/>
           <a:p>
             <a:r>
-              <a:rPr lang="en-US" altLang="ja-JP" sz="1800" dirty="0" err="1"/>
-              <a:t>Sigcomm</a:t>
-            </a:r>
-            <a:r>
-              <a:rPr lang="en-US" altLang="ja-JP" sz="1800" dirty="0"/>
-              <a:t> 2013 author response guidelines</a:t>
+              <a:rPr lang="ja-JP" altLang="en-US" b="1" dirty="0">
+                <a:solidFill>
+                  <a:schemeClr val="accent5"/>
+                </a:solidFill>
+              </a:rPr>
+              <a:t>基本的に質問や指摘については無視せず答えた方が良い</a:t>
             </a:r>
             <a:br>
-              <a:rPr lang="en-US" altLang="ja-JP" sz="1800" dirty="0"/>
+              <a:rPr lang="en-US" altLang="ja-JP" b="1" dirty="0">
+                <a:solidFill>
+                  <a:schemeClr val="accent5"/>
+                </a:solidFill>
+              </a:rPr>
             </a:br>
-            <a:r>
-              <a:rPr lang="en-US" altLang="ja-JP" sz="1800" dirty="0">
-                <a:hlinkClick r:id="rId2"/>
-              </a:rPr>
-              <a:t>http://conferences.sigcomm.org/sigcomm/2013/misc/AuthorResponseGuidelines.pdf</a:t>
+            <a:endParaRPr lang="en-US" altLang="ja-JP" b="1" dirty="0">
+              <a:solidFill>
+                <a:schemeClr val="accent5"/>
+              </a:solidFill>
+            </a:endParaRPr>
+          </a:p>
+          <a:p>
+            <a:pPr lvl="1"/>
+            <a:r>
+              <a:rPr lang="ja-JP" altLang="en-US" dirty="0"/>
+              <a:t>まず査読者側からすると，無視されると結構気分が悪い</a:t>
+            </a:r>
+            <a:endParaRPr lang="en-US" altLang="ja-JP" dirty="0"/>
+          </a:p>
+          <a:p>
+            <a:pPr lvl="2"/>
+            <a:r>
+              <a:rPr lang="ja-JP" altLang="en-US" dirty="0"/>
+              <a:t>重要な指摘をしたのに無反応だとムッとする</a:t>
             </a:r>
             <a:br>
-              <a:rPr lang="en-US" altLang="ja-JP" sz="1800" dirty="0"/>
+              <a:rPr lang="en-US" altLang="ja-JP" dirty="0"/>
             </a:br>
-            <a:endParaRPr lang="en-US" altLang="ja-JP" sz="1800" dirty="0"/>
+            <a:r>
+              <a:rPr lang="ja-JP" altLang="en-US" dirty="0"/>
+              <a:t>査読会議で「～の指摘は無視された」と言う人は結構いる</a:t>
+            </a:r>
+            <a:endParaRPr lang="en-US" altLang="ja-JP" dirty="0"/>
           </a:p>
           <a:p>
             <a:pPr lvl="1"/>
-            <a:r>
-              <a:rPr lang="ja-JP" altLang="en-US" sz="1800" dirty="0"/>
-              <a:t>リバッタルに対する指針や例が簡潔にまとまっていると思う</a:t>
-            </a:r>
-            <a:endParaRPr lang="en-US" altLang="ja-JP" sz="1800" dirty="0"/>
+            <a:endParaRPr lang="en-US" altLang="ja-JP" dirty="0"/>
           </a:p>
           <a:p>
             <a:pPr lvl="1"/>
             <a:r>
-              <a:rPr lang="ja-JP" altLang="en-US" sz="1800" dirty="0"/>
-              <a:t>引用：</a:t>
-            </a:r>
-            <a:endParaRPr lang="en-US" altLang="ja-JP" sz="1800" dirty="0"/>
+              <a:rPr lang="ja-JP" altLang="en-US" dirty="0"/>
+              <a:t>返答しなかった場合，無条件降伏になってしまう</a:t>
+            </a:r>
+            <a:endParaRPr lang="en-US" altLang="ja-JP" dirty="0"/>
           </a:p>
           <a:p>
             <a:pPr lvl="2"/>
             <a:r>
-              <a:rPr lang="ja-JP" altLang="en-US" sz="1800" dirty="0"/>
-              <a:t>著者の回答は、意見ではなく、事実に基づいたポイントに焦点を当てることが最も効果的であると思われることを強調したい。</a:t>
-            </a:r>
-            <a:endParaRPr lang="en-US" altLang="ja-JP" sz="1800" dirty="0"/>
+              <a:rPr lang="ja-JP" altLang="en-US" dirty="0"/>
+              <a:t>その項目への査読者の指摘が全面的に正しいことになる</a:t>
+            </a:r>
+            <a:endParaRPr lang="en-US" altLang="ja-JP" dirty="0"/>
           </a:p>
           <a:p>
             <a:pPr lvl="2"/>
-            <a:r>
-              <a:rPr lang="en-US" altLang="ja-JP" sz="1800" dirty="0"/>
-              <a:t>PC</a:t>
-            </a:r>
-            <a:r>
-              <a:rPr lang="ja-JP" altLang="en-US" sz="1800" dirty="0"/>
-              <a:t>は、著者が主張する新しい結果や改善点を無視することができます。</a:t>
-            </a:r>
-            <a:endParaRPr lang="en-US" altLang="ja-JP" sz="1800" dirty="0"/>
+            <a:endParaRPr lang="en-US" altLang="ja-JP" dirty="0"/>
+          </a:p>
+          <a:p>
+            <a:pPr lvl="1"/>
+            <a:r>
+              <a:rPr lang="ja-JP" altLang="en-US" dirty="0"/>
+              <a:t>なんとかしてコメントを返した方が良い</a:t>
+            </a:r>
+            <a:endParaRPr lang="en-US" altLang="ja-JP" dirty="0"/>
           </a:p>
           <a:p>
             <a:pPr lvl="2"/>
             <a:r>
-              <a:rPr lang="ja-JP" altLang="en-US" sz="1800" dirty="0"/>
-              <a:t>また、著者の回答が投稿時の誤りを修正するものであったとしても、いくつかの誤りを含む論文を受理するかどうかの最終判断は</a:t>
-            </a:r>
-            <a:r>
-              <a:rPr lang="en-US" altLang="ja-JP" sz="1800" dirty="0"/>
-              <a:t>PC</a:t>
-            </a:r>
-            <a:r>
-              <a:rPr lang="ja-JP" altLang="en-US" sz="1800" dirty="0"/>
-              <a:t>が行います。</a:t>
-            </a:r>
-          </a:p>
-        </p:txBody>
-      </p:sp>
-      <p:sp>
-        <p:nvSpPr>
-          <p:cNvPr id="2" name="スライド番号プレースホルダー 1">
-            <a:extLst>
-              <a:ext uri="{FF2B5EF4-FFF2-40B4-BE49-F238E27FC236}">
-                <a16:creationId xmlns:a16="http://schemas.microsoft.com/office/drawing/2014/main" id="{98EC1791-BDCF-0841-AB7B-70AF81F75FC0}"/>
-              </a:ext>
-            </a:extLst>
-          </p:cNvPr>
-          <p:cNvSpPr>
-            <a:spLocks noGrp="1"/>
-          </p:cNvSpPr>
-          <p:nvPr>
-            <p:ph type="sldNum" sz="quarter" idx="4294967295"/>
-          </p:nvPr>
-        </p:nvSpPr>
-        <p:spPr>
-          <a:xfrm>
-            <a:off x="8531225" y="6308725"/>
-            <a:ext cx="612775" cy="549275"/>
-          </a:xfrm>
-        </p:spPr>
-        <p:txBody>
-          <a:bodyPr/>
-          <a:lstStyle/>
-          <a:p>
-            <a:fld id="{D2D8002D-B5B0-4BAC-B1F6-782DDCCE6D9C}" type="slidenum">
-              <a:rPr kumimoji="1" lang="ja-JP" altLang="en-US" smtClean="0"/>
-              <a:pPr/>
-              <a:t>11</a:t>
-            </a:fld>
-            <a:endParaRPr kumimoji="1" lang="ja-JP" altLang="en-US" dirty="0"/>
+              <a:rPr lang="ja-JP" altLang="en-US" dirty="0"/>
+              <a:t>定性的な反論やコメントには意味があると思う</a:t>
+            </a:r>
+            <a:endParaRPr lang="en-US" altLang="ja-JP" dirty="0"/>
+          </a:p>
+          <a:p>
+            <a:pPr lvl="2"/>
+            <a:r>
+              <a:rPr lang="ja-JP" altLang="en-US" dirty="0"/>
+              <a:t>印象もいいし，その方が誠実</a:t>
+            </a:r>
+            <a:endParaRPr lang="en-US" altLang="ja-JP" dirty="0"/>
           </a:p>
         </p:txBody>
       </p:sp>
     </p:spTree>
     <p:extLst>
       <p:ext uri="{BB962C8B-B14F-4D97-AF65-F5344CB8AC3E}">
-        <p14:creationId xmlns:p14="http://schemas.microsoft.com/office/powerpoint/2010/main" val="1806432219"/>
+        <p14:creationId xmlns:p14="http://schemas.microsoft.com/office/powerpoint/2010/main" val="4268246625"/>
       </p:ext>
     </p:extLst>
   </p:cSld>
@@ -3783,6 +3701,203 @@
       </p:grpSpPr>
       <p:sp>
         <p:nvSpPr>
+          <p:cNvPr id="4" name="タイトル 3">
+            <a:extLst>
+              <a:ext uri="{FF2B5EF4-FFF2-40B4-BE49-F238E27FC236}">
+                <a16:creationId xmlns:a16="http://schemas.microsoft.com/office/drawing/2014/main" id="{D4972FC8-631C-CF56-D504-447CB9BAAD27}"/>
+              </a:ext>
+            </a:extLst>
+          </p:cNvPr>
+          <p:cNvSpPr>
+            <a:spLocks noGrp="1"/>
+          </p:cNvSpPr>
+          <p:nvPr>
+            <p:ph type="title"/>
+          </p:nvPr>
+        </p:nvSpPr>
+        <p:spPr/>
+        <p:txBody>
+          <a:bodyPr/>
+          <a:lstStyle/>
+          <a:p>
+            <a:r>
+              <a:rPr lang="ja-JP" altLang="en-US" dirty="0"/>
+              <a:t>参考</a:t>
+            </a:r>
+          </a:p>
+        </p:txBody>
+      </p:sp>
+      <p:sp>
+        <p:nvSpPr>
+          <p:cNvPr id="5" name="テキスト プレースホルダー 4">
+            <a:extLst>
+              <a:ext uri="{FF2B5EF4-FFF2-40B4-BE49-F238E27FC236}">
+                <a16:creationId xmlns:a16="http://schemas.microsoft.com/office/drawing/2014/main" id="{56501602-0A9E-AC44-1DE7-A9DFF44160F4}"/>
+              </a:ext>
+            </a:extLst>
+          </p:cNvPr>
+          <p:cNvSpPr>
+            <a:spLocks noGrp="1"/>
+          </p:cNvSpPr>
+          <p:nvPr>
+            <p:ph type="body" sz="quarter" idx="10"/>
+          </p:nvPr>
+        </p:nvSpPr>
+        <p:spPr/>
+        <p:txBody>
+          <a:bodyPr/>
+          <a:lstStyle/>
+          <a:p>
+            <a:r>
+              <a:rPr lang="en-US" altLang="ja-JP" sz="1800" dirty="0" err="1"/>
+              <a:t>Sigcomm</a:t>
+            </a:r>
+            <a:r>
+              <a:rPr lang="en-US" altLang="ja-JP" sz="1800" dirty="0"/>
+              <a:t> 2013 author response guidelines</a:t>
+            </a:r>
+            <a:br>
+              <a:rPr lang="en-US" altLang="ja-JP" sz="1800" dirty="0"/>
+            </a:br>
+            <a:r>
+              <a:rPr lang="en-US" altLang="ja-JP" sz="1800" dirty="0">
+                <a:hlinkClick r:id="rId2"/>
+              </a:rPr>
+              <a:t>http://conferences.sigcomm.org/sigcomm/2013/misc/AuthorResponseGuidelines.pdf</a:t>
+            </a:r>
+            <a:br>
+              <a:rPr lang="en-US" altLang="ja-JP" sz="1800" dirty="0"/>
+            </a:br>
+            <a:endParaRPr lang="en-US" altLang="ja-JP" sz="1800" dirty="0"/>
+          </a:p>
+          <a:p>
+            <a:pPr lvl="1"/>
+            <a:r>
+              <a:rPr lang="ja-JP" altLang="en-US" sz="1800" dirty="0"/>
+              <a:t>リバッタルに対する指針や例が簡潔にまとまっていると思う</a:t>
+            </a:r>
+            <a:endParaRPr lang="en-US" altLang="ja-JP" sz="1800" dirty="0"/>
+          </a:p>
+          <a:p>
+            <a:pPr lvl="1"/>
+            <a:r>
+              <a:rPr lang="ja-JP" altLang="en-US" sz="1800" dirty="0"/>
+              <a:t>引用：</a:t>
+            </a:r>
+            <a:endParaRPr lang="en-US" altLang="ja-JP" sz="1800" dirty="0"/>
+          </a:p>
+          <a:p>
+            <a:pPr lvl="2"/>
+            <a:r>
+              <a:rPr lang="ja-JP" altLang="en-US" sz="1800" dirty="0"/>
+              <a:t>著者の回答は、意見ではなく、事実に基づいたポイントに焦点を当てることが最も効果的であると思われることを強調したい。</a:t>
+            </a:r>
+            <a:endParaRPr lang="en-US" altLang="ja-JP" sz="1800" dirty="0"/>
+          </a:p>
+          <a:p>
+            <a:pPr lvl="2"/>
+            <a:r>
+              <a:rPr lang="en-US" altLang="ja-JP" sz="1800" dirty="0"/>
+              <a:t>PC</a:t>
+            </a:r>
+            <a:r>
+              <a:rPr lang="ja-JP" altLang="en-US" sz="1800" dirty="0"/>
+              <a:t>は、著者が主張する新しい結果や改善点を無視することができます。</a:t>
+            </a:r>
+            <a:endParaRPr lang="en-US" altLang="ja-JP" sz="1800" dirty="0"/>
+          </a:p>
+          <a:p>
+            <a:pPr lvl="2"/>
+            <a:r>
+              <a:rPr lang="ja-JP" altLang="en-US" sz="1800" dirty="0"/>
+              <a:t>また、著者の回答が投稿時の誤りを修正するものであったとしても、いくつかの誤りを含む論文を受理するかどうかの最終判断は</a:t>
+            </a:r>
+            <a:r>
+              <a:rPr lang="en-US" altLang="ja-JP" sz="1800" dirty="0"/>
+              <a:t>PC</a:t>
+            </a:r>
+            <a:r>
+              <a:rPr lang="ja-JP" altLang="en-US" sz="1800" dirty="0"/>
+              <a:t>が行います。</a:t>
+            </a:r>
+          </a:p>
+        </p:txBody>
+      </p:sp>
+      <p:sp>
+        <p:nvSpPr>
+          <p:cNvPr id="2" name="スライド番号プレースホルダー 1">
+            <a:extLst>
+              <a:ext uri="{FF2B5EF4-FFF2-40B4-BE49-F238E27FC236}">
+                <a16:creationId xmlns:a16="http://schemas.microsoft.com/office/drawing/2014/main" id="{98EC1791-BDCF-0841-AB7B-70AF81F75FC0}"/>
+              </a:ext>
+            </a:extLst>
+          </p:cNvPr>
+          <p:cNvSpPr>
+            <a:spLocks noGrp="1"/>
+          </p:cNvSpPr>
+          <p:nvPr>
+            <p:ph type="sldNum" sz="quarter" idx="4294967295"/>
+          </p:nvPr>
+        </p:nvSpPr>
+        <p:spPr>
+          <a:xfrm>
+            <a:off x="8531225" y="6308725"/>
+            <a:ext cx="612775" cy="549275"/>
+          </a:xfrm>
+        </p:spPr>
+        <p:txBody>
+          <a:bodyPr/>
+          <a:lstStyle/>
+          <a:p>
+            <a:fld id="{D2D8002D-B5B0-4BAC-B1F6-782DDCCE6D9C}" type="slidenum">
+              <a:rPr kumimoji="1" lang="ja-JP" altLang="en-US" smtClean="0"/>
+              <a:pPr/>
+              <a:t>12</a:t>
+            </a:fld>
+            <a:endParaRPr kumimoji="1" lang="ja-JP" altLang="en-US" dirty="0"/>
+          </a:p>
+        </p:txBody>
+      </p:sp>
+    </p:spTree>
+    <p:extLst>
+      <p:ext uri="{BB962C8B-B14F-4D97-AF65-F5344CB8AC3E}">
+        <p14:creationId xmlns:p14="http://schemas.microsoft.com/office/powerpoint/2010/main" val="1806432219"/>
+      </p:ext>
+    </p:extLst>
+  </p:cSld>
+  <p:clrMapOvr>
+    <a:masterClrMapping/>
+  </p:clrMapOvr>
+  <mc:AlternateContent xmlns:mc="http://schemas.openxmlformats.org/markup-compatibility/2006" xmlns:p14="http://schemas.microsoft.com/office/powerpoint/2010/main">
+    <mc:Choice Requires="p14">
+      <p:transition p14:dur="10"/>
+    </mc:Choice>
+    <mc:Fallback xmlns="">
+      <p:transition/>
+    </mc:Fallback>
+  </mc:AlternateContent>
+</p:sld>
+</file>
+
+<file path=ppt/slides/slide13.xml><?xml version="1.0" encoding="utf-8"?>
+<p:sld xmlns:a="http://schemas.openxmlformats.org/drawingml/2006/main" xmlns:r="http://schemas.openxmlformats.org/officeDocument/2006/relationships" xmlns:p="http://schemas.openxmlformats.org/presentationml/2006/main">
+  <p:cSld>
+    <p:spTree>
+      <p:nvGrpSpPr>
+        <p:cNvPr id="1" name=""/>
+        <p:cNvGrpSpPr/>
+        <p:nvPr/>
+      </p:nvGrpSpPr>
+      <p:grpSpPr>
+        <a:xfrm>
+          <a:off x="0" y="0"/>
+          <a:ext cx="0" cy="0"/>
+          <a:chOff x="0" y="0"/>
+          <a:chExt cx="0" cy="0"/>
+        </a:xfrm>
+      </p:grpSpPr>
+      <p:sp>
+        <p:nvSpPr>
           <p:cNvPr id="6" name="タイトル 5">
             <a:extLst>
               <a:ext uri="{FF2B5EF4-FFF2-40B4-BE49-F238E27FC236}">
@@ -3822,7 +3937,7 @@
 </p:sld>
 </file>
 
-<file path=ppt/slides/slide13.xml><?xml version="1.0" encoding="utf-8"?>
+<file path=ppt/slides/slide14.xml><?xml version="1.0" encoding="utf-8"?>
 <p:sld xmlns:a="http://schemas.openxmlformats.org/drawingml/2006/main" xmlns:r="http://schemas.openxmlformats.org/officeDocument/2006/relationships" xmlns:p="http://schemas.openxmlformats.org/presentationml/2006/main">
   <p:cSld>
     <p:spTree>
@@ -3955,211 +4070,6 @@
     <p:extLst>
       <p:ext uri="{BB962C8B-B14F-4D97-AF65-F5344CB8AC3E}">
         <p14:creationId xmlns:p14="http://schemas.microsoft.com/office/powerpoint/2010/main" val="546458259"/>
-      </p:ext>
-    </p:extLst>
-  </p:cSld>
-  <p:clrMapOvr>
-    <a:masterClrMapping/>
-  </p:clrMapOvr>
-  <mc:AlternateContent xmlns:mc="http://schemas.openxmlformats.org/markup-compatibility/2006" xmlns:p14="http://schemas.microsoft.com/office/powerpoint/2010/main">
-    <mc:Choice Requires="p14">
-      <p:transition p14:dur="10"/>
-    </mc:Choice>
-    <mc:Fallback xmlns="">
-      <p:transition/>
-    </mc:Fallback>
-  </mc:AlternateContent>
-</p:sld>
-</file>
-
-<file path=ppt/slides/slide14.xml><?xml version="1.0" encoding="utf-8"?>
-<p:sld xmlns:a="http://schemas.openxmlformats.org/drawingml/2006/main" xmlns:r="http://schemas.openxmlformats.org/officeDocument/2006/relationships" xmlns:p="http://schemas.openxmlformats.org/presentationml/2006/main">
-  <p:cSld>
-    <p:spTree>
-      <p:nvGrpSpPr>
-        <p:cNvPr id="1" name=""/>
-        <p:cNvGrpSpPr/>
-        <p:nvPr/>
-      </p:nvGrpSpPr>
-      <p:grpSpPr>
-        <a:xfrm>
-          <a:off x="0" y="0"/>
-          <a:ext cx="0" cy="0"/>
-          <a:chOff x="0" y="0"/>
-          <a:chExt cx="0" cy="0"/>
-        </a:xfrm>
-      </p:grpSpPr>
-      <p:sp>
-        <p:nvSpPr>
-          <p:cNvPr id="2" name="タイトル 1">
-            <a:extLst>
-              <a:ext uri="{FF2B5EF4-FFF2-40B4-BE49-F238E27FC236}">
-                <a16:creationId xmlns:a16="http://schemas.microsoft.com/office/drawing/2014/main" id="{BDB72A97-6BFD-581B-230B-BBBDBCEA34D9}"/>
-              </a:ext>
-            </a:extLst>
-          </p:cNvPr>
-          <p:cNvSpPr>
-            <a:spLocks noGrp="1"/>
-          </p:cNvSpPr>
-          <p:nvPr>
-            <p:ph type="title"/>
-          </p:nvPr>
-        </p:nvSpPr>
-        <p:spPr/>
-        <p:txBody>
-          <a:bodyPr/>
-          <a:lstStyle/>
-          <a:p>
-            <a:r>
-              <a:rPr kumimoji="1" lang="ja-JP" altLang="en-US" dirty="0"/>
-              <a:t>作業の進め方</a:t>
-            </a:r>
-          </a:p>
-        </p:txBody>
-      </p:sp>
-      <p:sp>
-        <p:nvSpPr>
-          <p:cNvPr id="3" name="テキスト プレースホルダー 2">
-            <a:extLst>
-              <a:ext uri="{FF2B5EF4-FFF2-40B4-BE49-F238E27FC236}">
-                <a16:creationId xmlns:a16="http://schemas.microsoft.com/office/drawing/2014/main" id="{B54A5567-BE4E-F223-8C55-F35B87FD7AA0}"/>
-              </a:ext>
-            </a:extLst>
-          </p:cNvPr>
-          <p:cNvSpPr>
-            <a:spLocks noGrp="1"/>
-          </p:cNvSpPr>
-          <p:nvPr>
-            <p:ph type="body" sz="quarter" idx="10"/>
-          </p:nvPr>
-        </p:nvSpPr>
-        <p:spPr/>
-        <p:txBody>
-          <a:bodyPr/>
-          <a:lstStyle/>
-          <a:p>
-            <a:r>
-              <a:rPr kumimoji="1" lang="ja-JP" altLang="en-US" sz="1800" dirty="0"/>
-              <a:t>共同編集可能な </a:t>
-            </a:r>
-            <a:r>
-              <a:rPr kumimoji="1" lang="en-US" altLang="ja-JP" sz="1800" dirty="0"/>
-              <a:t>markdown </a:t>
-            </a:r>
-            <a:r>
-              <a:rPr kumimoji="1" lang="ja-JP" altLang="en-US" sz="1800" dirty="0"/>
-              <a:t>上で進めるのがおすすめ</a:t>
-            </a:r>
-            <a:endParaRPr kumimoji="1" lang="en-US" altLang="ja-JP" sz="1800" dirty="0"/>
-          </a:p>
-          <a:p>
-            <a:pPr lvl="1"/>
-            <a:r>
-              <a:rPr kumimoji="1" lang="ja-JP" altLang="en-US" sz="1800" dirty="0"/>
-              <a:t>ここでは </a:t>
-            </a:r>
-            <a:r>
-              <a:rPr kumimoji="1" lang="en-US" altLang="ja-JP" sz="1800" dirty="0"/>
-              <a:t>overleaf </a:t>
-            </a:r>
-            <a:r>
-              <a:rPr kumimoji="1" lang="ja-JP" altLang="en-US" sz="1800" dirty="0"/>
-              <a:t>の上に </a:t>
-            </a:r>
-            <a:r>
-              <a:rPr kumimoji="1" lang="en-US" altLang="ja-JP" sz="1800" dirty="0"/>
-              <a:t>.md </a:t>
-            </a:r>
-            <a:r>
-              <a:rPr kumimoji="1" lang="ja-JP" altLang="en-US" sz="1800" dirty="0"/>
-              <a:t>ファイルを置くことを想定</a:t>
-            </a:r>
-            <a:endParaRPr kumimoji="1" lang="en-US" altLang="ja-JP" sz="1800" dirty="0"/>
-          </a:p>
-          <a:p>
-            <a:pPr lvl="2"/>
-            <a:r>
-              <a:rPr lang="en-US" altLang="ja-JP" sz="1800" dirty="0"/>
-              <a:t>overleaf </a:t>
-            </a:r>
-            <a:r>
-              <a:rPr lang="ja-JP" altLang="en-US" sz="1800" dirty="0"/>
-              <a:t>は </a:t>
-            </a:r>
-            <a:r>
-              <a:rPr lang="en-US" altLang="ja-JP" sz="1800" dirty="0"/>
-              <a:t>.md </a:t>
-            </a:r>
-            <a:r>
-              <a:rPr lang="ja-JP" altLang="en-US" sz="1800" dirty="0"/>
-              <a:t>を認識してシンタックス・ハイライトできる</a:t>
-            </a:r>
-            <a:endParaRPr kumimoji="1" lang="en-US" altLang="ja-JP" sz="1800" dirty="0"/>
-          </a:p>
-          <a:p>
-            <a:pPr lvl="1"/>
-            <a:r>
-              <a:rPr kumimoji="1" lang="ja-JP" altLang="en-US" sz="1800" dirty="0"/>
-              <a:t>他のサービスでも別によい</a:t>
-            </a:r>
-            <a:endParaRPr kumimoji="1" lang="en-US" altLang="ja-JP" sz="1800" dirty="0"/>
-          </a:p>
-          <a:p>
-            <a:pPr lvl="2"/>
-            <a:r>
-              <a:rPr kumimoji="1" lang="en-US" altLang="ja-JP" sz="1800" dirty="0"/>
-              <a:t>Google document </a:t>
-            </a:r>
-            <a:r>
-              <a:rPr kumimoji="1" lang="ja-JP" altLang="en-US" sz="1800" dirty="0"/>
-              <a:t>とか</a:t>
-            </a:r>
-            <a:endParaRPr kumimoji="1" lang="en-US" altLang="ja-JP" sz="1800" dirty="0"/>
-          </a:p>
-          <a:p>
-            <a:pPr lvl="2"/>
-            <a:r>
-              <a:rPr kumimoji="1" lang="ja-JP" altLang="en-US" sz="1800" dirty="0"/>
-              <a:t>１人で進めるならローカルの </a:t>
-            </a:r>
-            <a:r>
-              <a:rPr kumimoji="1" lang="en-US" altLang="ja-JP" sz="1800" dirty="0"/>
-              <a:t>.md </a:t>
-            </a:r>
-            <a:r>
-              <a:rPr kumimoji="1" lang="ja-JP" altLang="en-US" sz="1800" dirty="0"/>
-              <a:t>ファイルでも</a:t>
-            </a:r>
-            <a:endParaRPr kumimoji="1" lang="en-US" altLang="ja-JP" sz="1800" dirty="0"/>
-          </a:p>
-          <a:p>
-            <a:r>
-              <a:rPr lang="ja-JP" altLang="en-US" sz="1800" dirty="0"/>
-              <a:t>この作業に </a:t>
-            </a:r>
-            <a:r>
-              <a:rPr lang="en-US" altLang="ja-JP" sz="1800" dirty="0"/>
-              <a:t>git </a:t>
-            </a:r>
-            <a:r>
-              <a:rPr lang="ja-JP" altLang="en-US" sz="1800" dirty="0"/>
-              <a:t>やチケット管理システムはあまり向かない（と思う）</a:t>
-            </a:r>
-            <a:endParaRPr lang="en-US" altLang="ja-JP" sz="1800" dirty="0"/>
-          </a:p>
-          <a:p>
-            <a:pPr lvl="1"/>
-            <a:r>
-              <a:rPr kumimoji="1" lang="ja-JP" altLang="en-US" sz="1800" dirty="0"/>
-              <a:t>後のタスク・スケジューリングの項で理由を説明</a:t>
-            </a:r>
-          </a:p>
-        </p:txBody>
-      </p:sp>
-    </p:spTree>
-    <p:extLst>
-      <p:ext uri="{BB962C8B-B14F-4D97-AF65-F5344CB8AC3E}">
-        <p14:creationId xmlns:p14="http://schemas.microsoft.com/office/powerpoint/2010/main" val="145859783"/>
       </p:ext>
     </p:extLst>
   </p:cSld>
@@ -4199,7 +4109,7 @@
           <p:cNvPr id="2" name="タイトル 1">
             <a:extLst>
               <a:ext uri="{FF2B5EF4-FFF2-40B4-BE49-F238E27FC236}">
-                <a16:creationId xmlns:a16="http://schemas.microsoft.com/office/drawing/2014/main" id="{1F13FE07-0C9B-DDF0-4577-0A7732F2FE30}"/>
+                <a16:creationId xmlns:a16="http://schemas.microsoft.com/office/drawing/2014/main" id="{BDB72A97-6BFD-581B-230B-BBBDBCEA34D9}"/>
               </a:ext>
             </a:extLst>
           </p:cNvPr>
@@ -4217,7 +4127,7 @@
           <a:p>
             <a:r>
               <a:rPr kumimoji="1" lang="ja-JP" altLang="en-US" dirty="0"/>
-              <a:t>査読コメントの振り分け</a:t>
+              <a:t>作業の進め方</a:t>
             </a:r>
           </a:p>
         </p:txBody>
@@ -4227,7 +4137,7 @@
           <p:cNvPr id="3" name="テキスト プレースホルダー 2">
             <a:extLst>
               <a:ext uri="{FF2B5EF4-FFF2-40B4-BE49-F238E27FC236}">
-                <a16:creationId xmlns:a16="http://schemas.microsoft.com/office/drawing/2014/main" id="{78697263-CAD3-DD1C-B675-FB0A77D4B226}"/>
+                <a16:creationId xmlns:a16="http://schemas.microsoft.com/office/drawing/2014/main" id="{B54A5567-BE4E-F223-8C55-F35B87FD7AA0}"/>
               </a:ext>
             </a:extLst>
           </p:cNvPr>
@@ -4244,214 +4154,48 @@
           <a:lstStyle/>
           <a:p>
             <a:r>
-              <a:rPr kumimoji="1" lang="ja-JP" altLang="en-US" sz="1800" dirty="0">
-                <a:solidFill>
-                  <a:schemeClr val="accent5"/>
-                </a:solidFill>
-              </a:rPr>
-              <a:t>まず，コメントで言われている内容ごとに </a:t>
-            </a:r>
-            <a:r>
-              <a:rPr kumimoji="1" lang="en-US" altLang="ja-JP" sz="1800" dirty="0">
-                <a:solidFill>
-                  <a:schemeClr val="accent5"/>
-                </a:solidFill>
-              </a:rPr>
-              <a:t>ID </a:t>
-            </a:r>
-            <a:r>
-              <a:rPr kumimoji="1" lang="ja-JP" altLang="en-US" sz="1800" dirty="0">
-                <a:solidFill>
-                  <a:schemeClr val="accent5"/>
-                </a:solidFill>
-              </a:rPr>
-              <a:t>を振る</a:t>
-            </a:r>
-            <a:endParaRPr kumimoji="1" lang="en-US" altLang="ja-JP" sz="1800" dirty="0">
-              <a:solidFill>
-                <a:schemeClr val="accent5"/>
-              </a:solidFill>
-            </a:endParaRPr>
-          </a:p>
-          <a:p>
+              <a:rPr kumimoji="1" lang="ja-JP" altLang="en-US" sz="1800" dirty="0"/>
+              <a:t>共同編集可能な </a:t>
+            </a:r>
+            <a:r>
+              <a:rPr kumimoji="1" lang="en-US" altLang="ja-JP" sz="1800" dirty="0"/>
+              <a:t>markdown </a:t>
+            </a:r>
+            <a:r>
+              <a:rPr kumimoji="1" lang="ja-JP" altLang="en-US" sz="1800" dirty="0"/>
+              <a:t>上で進めるのがおすすめ</a:t>
+            </a:r>
+            <a:endParaRPr kumimoji="1" lang="en-US" altLang="ja-JP" sz="1800" dirty="0"/>
+          </a:p>
+          <a:p>
+            <a:pPr lvl="1"/>
+            <a:r>
+              <a:rPr kumimoji="1" lang="ja-JP" altLang="en-US" sz="1800" dirty="0"/>
+              <a:t>ここでは </a:t>
+            </a:r>
+            <a:r>
+              <a:rPr kumimoji="1" lang="en-US" altLang="ja-JP" sz="1800" dirty="0"/>
+              <a:t>overleaf </a:t>
+            </a:r>
+            <a:r>
+              <a:rPr kumimoji="1" lang="ja-JP" altLang="en-US" sz="1800" dirty="0"/>
+              <a:t>の上に </a:t>
+            </a:r>
+            <a:r>
+              <a:rPr kumimoji="1" lang="en-US" altLang="ja-JP" sz="1800" dirty="0"/>
+              <a:t>.md </a:t>
+            </a:r>
+            <a:r>
+              <a:rPr kumimoji="1" lang="ja-JP" altLang="en-US" sz="1800" dirty="0"/>
+              <a:t>ファイルを置くことを想定</a:t>
+            </a:r>
+            <a:endParaRPr kumimoji="1" lang="en-US" altLang="ja-JP" sz="1800" dirty="0"/>
+          </a:p>
+          <a:p>
+            <a:pPr lvl="2"/>
             <a:r>
               <a:rPr lang="en-US" altLang="ja-JP" sz="1800" dirty="0"/>
-              <a:t>ID </a:t>
-            </a:r>
-            <a:r>
-              <a:rPr lang="ja-JP" altLang="en-US" sz="1800" dirty="0"/>
-              <a:t>のフォーマット： </a:t>
-            </a:r>
-            <a:r>
-              <a:rPr kumimoji="1" lang="en-US" altLang="ja-JP" sz="1800" dirty="0"/>
-              <a:t>$&lt;</a:t>
-            </a:r>
-            <a:r>
-              <a:rPr kumimoji="1" lang="ja-JP" altLang="en-US" sz="1800" dirty="0"/>
-              <a:t>査読者</a:t>
-            </a:r>
-            <a:r>
-              <a:rPr kumimoji="1" lang="en-US" altLang="ja-JP" sz="1800" dirty="0"/>
-              <a:t>&gt;&lt;</a:t>
-            </a:r>
-            <a:r>
-              <a:rPr kumimoji="1" lang="ja-JP" altLang="en-US" sz="1800" dirty="0"/>
-              <a:t>シリアル</a:t>
-            </a:r>
-            <a:r>
-              <a:rPr kumimoji="1" lang="en-US" altLang="ja-JP" sz="1800" dirty="0"/>
-              <a:t>&gt;-&lt;</a:t>
-            </a:r>
-            <a:r>
-              <a:rPr kumimoji="1" lang="ja-JP" altLang="en-US" sz="1800" dirty="0"/>
-              <a:t>タイプ</a:t>
-            </a:r>
-            <a:r>
-              <a:rPr kumimoji="1" lang="en-US" altLang="ja-JP" sz="1800" dirty="0"/>
-              <a:t>&gt;</a:t>
-            </a:r>
-          </a:p>
-          <a:p>
-            <a:pPr lvl="1"/>
-            <a:r>
-              <a:rPr lang="ja-JP" altLang="en-US" sz="1800" dirty="0"/>
-              <a:t>先頭に </a:t>
-            </a:r>
-            <a:r>
-              <a:rPr lang="en-US" altLang="ja-JP" sz="1800" dirty="0"/>
-              <a:t>$ </a:t>
-            </a:r>
-            <a:r>
-              <a:rPr lang="ja-JP" altLang="en-US" sz="1800" dirty="0"/>
-              <a:t>をつける</a:t>
-            </a:r>
-            <a:endParaRPr lang="en-US" altLang="ja-JP" sz="1800" dirty="0"/>
-          </a:p>
-          <a:p>
-            <a:pPr lvl="1"/>
-            <a:r>
-              <a:rPr lang="en-US" altLang="ja-JP" sz="1800" dirty="0"/>
-              <a:t>&lt;</a:t>
-            </a:r>
-            <a:r>
-              <a:rPr lang="ja-JP" altLang="en-US" sz="1800" dirty="0"/>
-              <a:t>査読者</a:t>
-            </a:r>
-            <a:r>
-              <a:rPr lang="en-US" altLang="ja-JP" sz="1800" dirty="0"/>
-              <a:t>&gt; </a:t>
-            </a:r>
-            <a:r>
-              <a:rPr lang="ja-JP" altLang="en-US" sz="1800" dirty="0"/>
-              <a:t>は査読者 </a:t>
-            </a:r>
-            <a:r>
-              <a:rPr lang="en-US" altLang="ja-JP" sz="1800" dirty="0"/>
-              <a:t>A </a:t>
-            </a:r>
-            <a:r>
-              <a:rPr lang="ja-JP" altLang="en-US" sz="1800" dirty="0"/>
-              <a:t>や </a:t>
-            </a:r>
-            <a:r>
-              <a:rPr lang="en-US" altLang="ja-JP" sz="1800" dirty="0"/>
-              <a:t>B </a:t>
-            </a:r>
-            <a:r>
-              <a:rPr lang="ja-JP" altLang="en-US" sz="1800" dirty="0"/>
-              <a:t>などのアルファベット</a:t>
-            </a:r>
-            <a:endParaRPr lang="en-US" altLang="ja-JP" sz="1800" dirty="0"/>
-          </a:p>
-          <a:p>
-            <a:pPr lvl="1"/>
-            <a:r>
-              <a:rPr kumimoji="1" lang="en-US" altLang="ja-JP" sz="1800" dirty="0"/>
-              <a:t>&lt;</a:t>
-            </a:r>
-            <a:r>
-              <a:rPr kumimoji="1" lang="ja-JP" altLang="en-US" sz="1800" dirty="0"/>
-              <a:t>シリアル</a:t>
-            </a:r>
-            <a:r>
-              <a:rPr kumimoji="1" lang="en-US" altLang="ja-JP" sz="1800" dirty="0"/>
-              <a:t>&gt; </a:t>
-            </a:r>
-            <a:r>
-              <a:rPr kumimoji="1" lang="ja-JP" altLang="en-US" sz="1800" dirty="0"/>
-              <a:t>は一意な識別番号</a:t>
-            </a:r>
-            <a:endParaRPr kumimoji="1" lang="en-US" altLang="ja-JP" sz="1800" dirty="0"/>
-          </a:p>
-          <a:p>
-            <a:pPr lvl="2"/>
-            <a:r>
-              <a:rPr kumimoji="1" lang="ja-JP" altLang="en-US" sz="1800" dirty="0"/>
-              <a:t>査読者ごとには番号は被っても良い</a:t>
-            </a:r>
-            <a:endParaRPr kumimoji="1" lang="en-US" altLang="ja-JP" sz="1800" dirty="0"/>
-          </a:p>
-          <a:p>
-            <a:pPr lvl="3"/>
-            <a:r>
-              <a:rPr lang="en-US" altLang="ja-JP" sz="1800" dirty="0"/>
-              <a:t>A1 </a:t>
-            </a:r>
-            <a:r>
-              <a:rPr lang="ja-JP" altLang="en-US" sz="1800" dirty="0"/>
-              <a:t>と </a:t>
-            </a:r>
-            <a:r>
-              <a:rPr lang="en-US" altLang="ja-JP" sz="1800" dirty="0"/>
-              <a:t>B1 </a:t>
-            </a:r>
-            <a:r>
-              <a:rPr lang="ja-JP" altLang="en-US" sz="1800" dirty="0"/>
-              <a:t>があってもよい</a:t>
-            </a:r>
-            <a:endParaRPr kumimoji="1" lang="en-US" altLang="ja-JP" sz="1800" dirty="0"/>
-          </a:p>
-          <a:p>
-            <a:pPr lvl="2"/>
-            <a:r>
-              <a:rPr kumimoji="1" lang="ja-JP" altLang="en-US" sz="1800" dirty="0"/>
-              <a:t>査読者が同じでもタイプが異なる場合は被ってはいけない</a:t>
-            </a:r>
-            <a:endParaRPr kumimoji="1" lang="en-US" altLang="ja-JP" sz="1800" dirty="0"/>
-          </a:p>
-          <a:p>
-            <a:pPr lvl="3"/>
-            <a:r>
-              <a:rPr lang="en-US" altLang="ja-JP" sz="1800" dirty="0"/>
-              <a:t>A1-w </a:t>
-            </a:r>
-            <a:r>
-              <a:rPr lang="ja-JP" altLang="en-US" sz="1800" dirty="0"/>
-              <a:t>と </a:t>
-            </a:r>
-            <a:r>
-              <a:rPr lang="en-US" altLang="ja-JP" sz="1800" dirty="0"/>
-              <a:t>A1-c </a:t>
-            </a:r>
-            <a:r>
-              <a:rPr lang="ja-JP" altLang="en-US" sz="1800" dirty="0"/>
-              <a:t>が同時にあってはいけない</a:t>
-            </a:r>
-            <a:endParaRPr lang="en-US" altLang="ja-JP" sz="1800" dirty="0"/>
-          </a:p>
-          <a:p>
-            <a:pPr lvl="1"/>
-            <a:r>
-              <a:rPr kumimoji="1" lang="en-US" altLang="ja-JP" sz="1800" dirty="0"/>
-              <a:t>&lt;</a:t>
-            </a:r>
-            <a:r>
-              <a:rPr kumimoji="1" lang="ja-JP" altLang="en-US" sz="1800" dirty="0"/>
-              <a:t>タイプ</a:t>
-            </a:r>
-            <a:r>
-              <a:rPr lang="en-US" altLang="ja-JP" sz="1800" dirty="0"/>
-              <a:t>&gt; </a:t>
+              <a:t>overleaf </a:t>
             </a:r>
             <a:r>
               <a:rPr lang="ja-JP" altLang="en-US" sz="1800" dirty="0"/>
@@ -4459,58 +4203,78 @@
             </a:r>
             <a:r>
               <a:rPr lang="en-US" altLang="ja-JP" sz="1800" dirty="0"/>
-              <a:t>week point </a:t>
+              <a:t>.md </a:t>
             </a:r>
             <a:r>
               <a:rPr lang="ja-JP" altLang="en-US" sz="1800" dirty="0"/>
-              <a:t>なら </a:t>
+              <a:t>を認識してシンタックス・ハイライトできる</a:t>
+            </a:r>
+            <a:endParaRPr kumimoji="1" lang="en-US" altLang="ja-JP" sz="1800" dirty="0"/>
+          </a:p>
+          <a:p>
+            <a:pPr lvl="1"/>
+            <a:r>
+              <a:rPr kumimoji="1" lang="ja-JP" altLang="en-US" sz="1800" dirty="0"/>
+              <a:t>他のサービスでも別によい</a:t>
+            </a:r>
+            <a:endParaRPr kumimoji="1" lang="en-US" altLang="ja-JP" sz="1800" dirty="0"/>
+          </a:p>
+          <a:p>
+            <a:pPr lvl="2"/>
+            <a:r>
+              <a:rPr kumimoji="1" lang="en-US" altLang="ja-JP" sz="1800" dirty="0"/>
+              <a:t>Google document </a:t>
+            </a:r>
+            <a:r>
+              <a:rPr kumimoji="1" lang="ja-JP" altLang="en-US" sz="1800" dirty="0"/>
+              <a:t>とか</a:t>
+            </a:r>
+            <a:endParaRPr kumimoji="1" lang="en-US" altLang="ja-JP" sz="1800" dirty="0"/>
+          </a:p>
+          <a:p>
+            <a:pPr lvl="2"/>
+            <a:r>
+              <a:rPr kumimoji="1" lang="ja-JP" altLang="en-US" sz="1800" dirty="0"/>
+              <a:t>１人で進めるならローカルの </a:t>
+            </a:r>
+            <a:r>
+              <a:rPr kumimoji="1" lang="en-US" altLang="ja-JP" sz="1800" dirty="0"/>
+              <a:t>.md </a:t>
+            </a:r>
+            <a:r>
+              <a:rPr kumimoji="1" lang="ja-JP" altLang="en-US" sz="1800" dirty="0"/>
+              <a:t>ファイルでも</a:t>
+            </a:r>
+            <a:endParaRPr kumimoji="1" lang="en-US" altLang="ja-JP" sz="1800" dirty="0"/>
+          </a:p>
+          <a:p>
+            <a:r>
+              <a:rPr lang="ja-JP" altLang="en-US" sz="1800" dirty="0"/>
+              <a:t>この作業に </a:t>
             </a:r>
             <a:r>
               <a:rPr lang="en-US" altLang="ja-JP" sz="1800" dirty="0"/>
-              <a:t>w</a:t>
+              <a:t>git </a:t>
             </a:r>
             <a:r>
               <a:rPr lang="ja-JP" altLang="en-US" sz="1800" dirty="0"/>
-              <a:t>，質問なら </a:t>
-            </a:r>
-            <a:r>
-              <a:rPr lang="en-US" altLang="ja-JP" sz="1800" dirty="0"/>
-              <a:t>q</a:t>
-            </a:r>
-            <a:r>
-              <a:rPr lang="ja-JP" altLang="en-US" sz="1800" dirty="0"/>
-              <a:t>，コメントなら </a:t>
-            </a:r>
-            <a:r>
-              <a:rPr lang="en-US" altLang="ja-JP" sz="1800" dirty="0"/>
-              <a:t>c</a:t>
-            </a:r>
-          </a:p>
-          <a:p>
-            <a:r>
-              <a:rPr lang="ja-JP" altLang="en-US" sz="1800" dirty="0"/>
-              <a:t>例：</a:t>
+              <a:t>やチケット管理システムはあまり向かない（と思う）</a:t>
             </a:r>
             <a:endParaRPr lang="en-US" altLang="ja-JP" sz="1800" dirty="0"/>
           </a:p>
           <a:p>
             <a:pPr lvl="1"/>
             <a:r>
-              <a:rPr lang="en-US" altLang="ja-JP" sz="1800" dirty="0"/>
-              <a:t>$A1-c, $B3-w, $E7-q </a:t>
-            </a:r>
-            <a:r>
-              <a:rPr lang="ja-JP" altLang="en-US" sz="1800" dirty="0"/>
-              <a:t>など</a:t>
-            </a:r>
-            <a:endParaRPr lang="en-US" altLang="ja-JP" sz="1800" dirty="0"/>
+              <a:rPr kumimoji="1" lang="ja-JP" altLang="en-US" sz="1800" dirty="0"/>
+              <a:t>後のタスク・スケジューリングの項で理由を説明</a:t>
+            </a:r>
           </a:p>
         </p:txBody>
       </p:sp>
     </p:spTree>
     <p:extLst>
       <p:ext uri="{BB962C8B-B14F-4D97-AF65-F5344CB8AC3E}">
-        <p14:creationId xmlns:p14="http://schemas.microsoft.com/office/powerpoint/2010/main" val="1324197351"/>
+        <p14:creationId xmlns:p14="http://schemas.microsoft.com/office/powerpoint/2010/main" val="145859783"/>
       </p:ext>
     </p:extLst>
   </p:cSld>
@@ -4550,7 +4314,7 @@
           <p:cNvPr id="2" name="タイトル 1">
             <a:extLst>
               <a:ext uri="{FF2B5EF4-FFF2-40B4-BE49-F238E27FC236}">
-                <a16:creationId xmlns:a16="http://schemas.microsoft.com/office/drawing/2014/main" id="{3552FC58-F8EA-E936-CC7C-FBD585AE3EB1}"/>
+                <a16:creationId xmlns:a16="http://schemas.microsoft.com/office/drawing/2014/main" id="{1F13FE07-0C9B-DDF0-4577-0A7732F2FE30}"/>
               </a:ext>
             </a:extLst>
           </p:cNvPr>
@@ -4567,12 +4331,8 @@
           <a:lstStyle/>
           <a:p>
             <a:r>
-              <a:rPr kumimoji="1" lang="en-US" altLang="ja-JP" dirty="0"/>
-              <a:t>ID </a:t>
-            </a:r>
-            <a:r>
               <a:rPr kumimoji="1" lang="ja-JP" altLang="en-US" dirty="0"/>
-              <a:t>フォーマットがこうなってる理由</a:t>
+              <a:t>査読コメントの振り分け</a:t>
             </a:r>
           </a:p>
         </p:txBody>
@@ -4582,7 +4342,7 @@
           <p:cNvPr id="3" name="テキスト プレースホルダー 2">
             <a:extLst>
               <a:ext uri="{FF2B5EF4-FFF2-40B4-BE49-F238E27FC236}">
-                <a16:creationId xmlns:a16="http://schemas.microsoft.com/office/drawing/2014/main" id="{399195B9-8ED2-6EA8-314C-DDF2412E7F4E}"/>
+                <a16:creationId xmlns:a16="http://schemas.microsoft.com/office/drawing/2014/main" id="{78697263-CAD3-DD1C-B675-FB0A77D4B226}"/>
               </a:ext>
             </a:extLst>
           </p:cNvPr>
@@ -4599,146 +4359,273 @@
           <a:lstStyle/>
           <a:p>
             <a:r>
+              <a:rPr kumimoji="1" lang="ja-JP" altLang="en-US" sz="1800" dirty="0">
+                <a:solidFill>
+                  <a:schemeClr val="accent5"/>
+                </a:solidFill>
+              </a:rPr>
+              <a:t>まず，コメントで言われている内容ごとに </a:t>
+            </a:r>
+            <a:r>
+              <a:rPr kumimoji="1" lang="en-US" altLang="ja-JP" sz="1800" dirty="0">
+                <a:solidFill>
+                  <a:schemeClr val="accent5"/>
+                </a:solidFill>
+              </a:rPr>
+              <a:t>ID </a:t>
+            </a:r>
+            <a:r>
+              <a:rPr kumimoji="1" lang="ja-JP" altLang="en-US" sz="1800" dirty="0">
+                <a:solidFill>
+                  <a:schemeClr val="accent5"/>
+                </a:solidFill>
+              </a:rPr>
+              <a:t>を振る</a:t>
+            </a:r>
+            <a:endParaRPr kumimoji="1" lang="en-US" altLang="ja-JP" sz="1800" dirty="0">
+              <a:solidFill>
+                <a:schemeClr val="accent5"/>
+              </a:solidFill>
+            </a:endParaRPr>
+          </a:p>
+          <a:p>
+            <a:r>
+              <a:rPr lang="en-US" altLang="ja-JP" sz="1800" dirty="0"/>
+              <a:t>ID </a:t>
+            </a:r>
+            <a:r>
+              <a:rPr lang="ja-JP" altLang="en-US" sz="1800" dirty="0"/>
+              <a:t>のフォーマット： </a:t>
+            </a:r>
+            <a:r>
+              <a:rPr kumimoji="1" lang="en-US" altLang="ja-JP" sz="1800" dirty="0"/>
+              <a:t>$&lt;</a:t>
+            </a:r>
+            <a:r>
               <a:rPr kumimoji="1" lang="ja-JP" altLang="en-US" sz="1800" dirty="0"/>
-              <a:t>主に識別を容易にするため：</a:t>
+              <a:t>査読者</a:t>
+            </a:r>
+            <a:r>
+              <a:rPr kumimoji="1" lang="en-US" altLang="ja-JP" sz="1800" dirty="0"/>
+              <a:t>&gt;&lt;</a:t>
+            </a:r>
+            <a:r>
+              <a:rPr kumimoji="1" lang="ja-JP" altLang="en-US" sz="1800" dirty="0"/>
+              <a:t>シリアル</a:t>
+            </a:r>
+            <a:r>
+              <a:rPr kumimoji="1" lang="en-US" altLang="ja-JP" sz="1800" dirty="0"/>
+              <a:t>&gt;-&lt;</a:t>
+            </a:r>
+            <a:r>
+              <a:rPr kumimoji="1" lang="ja-JP" altLang="en-US" sz="1800" dirty="0"/>
+              <a:t>タイプ</a:t>
+            </a:r>
+            <a:r>
+              <a:rPr kumimoji="1" lang="en-US" altLang="ja-JP" sz="1800" dirty="0"/>
+              <a:t>&gt;</a:t>
+            </a:r>
+          </a:p>
+          <a:p>
+            <a:pPr lvl="1"/>
+            <a:r>
+              <a:rPr lang="ja-JP" altLang="en-US" sz="1800" dirty="0"/>
+              <a:t>先頭に </a:t>
+            </a:r>
+            <a:r>
+              <a:rPr lang="en-US" altLang="ja-JP" sz="1800" dirty="0"/>
+              <a:t>$ </a:t>
+            </a:r>
+            <a:r>
+              <a:rPr lang="ja-JP" altLang="en-US" sz="1800" dirty="0"/>
+              <a:t>をつける</a:t>
+            </a:r>
+            <a:endParaRPr lang="en-US" altLang="ja-JP" sz="1800" dirty="0"/>
+          </a:p>
+          <a:p>
+            <a:pPr lvl="1"/>
+            <a:r>
+              <a:rPr lang="en-US" altLang="ja-JP" sz="1800" dirty="0"/>
+              <a:t>&lt;</a:t>
+            </a:r>
+            <a:r>
+              <a:rPr lang="ja-JP" altLang="en-US" sz="1800" dirty="0"/>
+              <a:t>査読者</a:t>
+            </a:r>
+            <a:r>
+              <a:rPr lang="en-US" altLang="ja-JP" sz="1800" dirty="0"/>
+              <a:t>&gt; </a:t>
+            </a:r>
+            <a:r>
+              <a:rPr lang="ja-JP" altLang="en-US" sz="1800" dirty="0"/>
+              <a:t>は査読者 </a:t>
+            </a:r>
+            <a:r>
+              <a:rPr lang="en-US" altLang="ja-JP" sz="1800" dirty="0"/>
+              <a:t>A </a:t>
+            </a:r>
+            <a:r>
+              <a:rPr lang="ja-JP" altLang="en-US" sz="1800" dirty="0"/>
+              <a:t>や </a:t>
+            </a:r>
+            <a:r>
+              <a:rPr lang="en-US" altLang="ja-JP" sz="1800" dirty="0"/>
+              <a:t>B </a:t>
+            </a:r>
+            <a:r>
+              <a:rPr lang="ja-JP" altLang="en-US" sz="1800" dirty="0"/>
+              <a:t>などのアルファベット</a:t>
+            </a:r>
+            <a:endParaRPr lang="en-US" altLang="ja-JP" sz="1800" dirty="0"/>
+          </a:p>
+          <a:p>
+            <a:pPr lvl="1"/>
+            <a:r>
+              <a:rPr kumimoji="1" lang="en-US" altLang="ja-JP" sz="1800" dirty="0"/>
+              <a:t>&lt;</a:t>
+            </a:r>
+            <a:r>
+              <a:rPr kumimoji="1" lang="ja-JP" altLang="en-US" sz="1800" dirty="0"/>
+              <a:t>シリアル</a:t>
+            </a:r>
+            <a:r>
+              <a:rPr kumimoji="1" lang="en-US" altLang="ja-JP" sz="1800" dirty="0"/>
+              <a:t>&gt; </a:t>
+            </a:r>
+            <a:r>
+              <a:rPr kumimoji="1" lang="ja-JP" altLang="en-US" sz="1800" dirty="0"/>
+              <a:t>は一意な識別番号</a:t>
             </a:r>
             <a:endParaRPr kumimoji="1" lang="en-US" altLang="ja-JP" sz="1800" dirty="0"/>
           </a:p>
           <a:p>
+            <a:pPr lvl="2"/>
+            <a:r>
+              <a:rPr kumimoji="1" lang="ja-JP" altLang="en-US" sz="1800" dirty="0"/>
+              <a:t>査読者ごとには番号は被っても良い</a:t>
+            </a:r>
+            <a:endParaRPr kumimoji="1" lang="en-US" altLang="ja-JP" sz="1800" dirty="0"/>
+          </a:p>
+          <a:p>
+            <a:pPr lvl="3"/>
+            <a:r>
+              <a:rPr lang="en-US" altLang="ja-JP" sz="1800" dirty="0"/>
+              <a:t>A1 </a:t>
+            </a:r>
+            <a:r>
+              <a:rPr lang="ja-JP" altLang="en-US" sz="1800" dirty="0"/>
+              <a:t>と </a:t>
+            </a:r>
+            <a:r>
+              <a:rPr lang="en-US" altLang="ja-JP" sz="1800" dirty="0"/>
+              <a:t>B1 </a:t>
+            </a:r>
+            <a:r>
+              <a:rPr lang="ja-JP" altLang="en-US" sz="1800" dirty="0"/>
+              <a:t>があってもよい</a:t>
+            </a:r>
+            <a:endParaRPr kumimoji="1" lang="en-US" altLang="ja-JP" sz="1800" dirty="0"/>
+          </a:p>
+          <a:p>
+            <a:pPr lvl="2"/>
+            <a:r>
+              <a:rPr kumimoji="1" lang="ja-JP" altLang="en-US" sz="1800" dirty="0"/>
+              <a:t>査読者が同じでもタイプが異なる場合は被ってはいけない</a:t>
+            </a:r>
+            <a:endParaRPr kumimoji="1" lang="en-US" altLang="ja-JP" sz="1800" dirty="0"/>
+          </a:p>
+          <a:p>
+            <a:pPr lvl="3"/>
+            <a:r>
+              <a:rPr lang="en-US" altLang="ja-JP" sz="1800" dirty="0"/>
+              <a:t>A1-w </a:t>
+            </a:r>
+            <a:r>
+              <a:rPr lang="ja-JP" altLang="en-US" sz="1800" dirty="0"/>
+              <a:t>と </a:t>
+            </a:r>
+            <a:r>
+              <a:rPr lang="en-US" altLang="ja-JP" sz="1800" dirty="0"/>
+              <a:t>A1-c </a:t>
+            </a:r>
+            <a:r>
+              <a:rPr lang="ja-JP" altLang="en-US" sz="1800" dirty="0"/>
+              <a:t>が同時にあってはいけない</a:t>
+            </a:r>
+            <a:endParaRPr lang="en-US" altLang="ja-JP" sz="1800" dirty="0"/>
+          </a:p>
+          <a:p>
             <a:pPr lvl="1"/>
             <a:r>
+              <a:rPr kumimoji="1" lang="en-US" altLang="ja-JP" sz="1800" dirty="0"/>
+              <a:t>&lt;</a:t>
+            </a:r>
+            <a:r>
               <a:rPr kumimoji="1" lang="ja-JP" altLang="en-US" sz="1800" dirty="0"/>
-              <a:t>議論するとき「査読者 </a:t>
-            </a:r>
-            <a:r>
-              <a:rPr kumimoji="1" lang="en-US" altLang="ja-JP" sz="1800" dirty="0"/>
-              <a:t>A </a:t>
-            </a:r>
-            <a:r>
-              <a:rPr kumimoji="1" lang="ja-JP" altLang="en-US" sz="1800" dirty="0"/>
-              <a:t>が言ってた～に関する説明がないというやつなんだけど」よりも 「コメント </a:t>
-            </a:r>
-            <a:r>
-              <a:rPr kumimoji="1" lang="en-US" altLang="ja-JP" sz="1800" dirty="0"/>
-              <a:t>A4 </a:t>
-            </a:r>
-            <a:r>
-              <a:rPr kumimoji="1" lang="ja-JP" altLang="en-US" sz="1800" dirty="0"/>
-              <a:t>なんだけど」の方が早い</a:t>
-            </a:r>
-            <a:endParaRPr kumimoji="1" lang="en-US" altLang="ja-JP" sz="1800" dirty="0"/>
-          </a:p>
-          <a:p>
-            <a:r>
-              <a:rPr kumimoji="1" lang="ja-JP" altLang="en-US" sz="1800" dirty="0"/>
-              <a:t>タイプ部分（</a:t>
-            </a:r>
-            <a:r>
-              <a:rPr kumimoji="1" lang="en-US" altLang="ja-JP" sz="1800" dirty="0"/>
-              <a:t>$A4-w </a:t>
-            </a:r>
-            <a:r>
-              <a:rPr kumimoji="1" lang="ja-JP" altLang="en-US" sz="1800" dirty="0"/>
-              <a:t>の </a:t>
-            </a:r>
-            <a:r>
-              <a:rPr kumimoji="1" lang="en-US" altLang="ja-JP" sz="1800" dirty="0"/>
-              <a:t>–w </a:t>
-            </a:r>
-            <a:r>
-              <a:rPr kumimoji="1" lang="ja-JP" altLang="en-US" sz="1800" dirty="0"/>
-              <a:t>の部分）は無視しても識別可能な方がよい</a:t>
-            </a:r>
-            <a:endParaRPr kumimoji="1" lang="en-US" altLang="ja-JP" sz="1800" dirty="0"/>
-          </a:p>
-          <a:p>
-            <a:pPr lvl="1"/>
-            <a:r>
-              <a:rPr kumimoji="1" lang="ja-JP" altLang="en-US" sz="1800" dirty="0"/>
-              <a:t>査読者ごとに一意な番号をふる</a:t>
-            </a:r>
-            <a:endParaRPr kumimoji="1" lang="en-US" altLang="ja-JP" sz="1800" dirty="0"/>
-          </a:p>
-          <a:p>
-            <a:pPr lvl="1"/>
-            <a:r>
-              <a:rPr kumimoji="1" lang="en-US" altLang="ja-JP" sz="1800" dirty="0"/>
-              <a:t>A1-w </a:t>
-            </a:r>
-            <a:r>
-              <a:rPr kumimoji="1" lang="ja-JP" altLang="en-US" sz="1800" dirty="0"/>
-              <a:t>と </a:t>
-            </a:r>
-            <a:r>
-              <a:rPr kumimoji="1" lang="en-US" altLang="ja-JP" sz="1800" dirty="0"/>
-              <a:t>A1-q </a:t>
-            </a:r>
-            <a:r>
-              <a:rPr kumimoji="1" lang="ja-JP" altLang="en-US" sz="1800" dirty="0"/>
-              <a:t>が並列に存在すると，どっちかわからなくなる</a:t>
-            </a:r>
-            <a:endParaRPr kumimoji="1" lang="en-US" altLang="ja-JP" sz="1800" dirty="0"/>
-          </a:p>
-          <a:p>
+              <a:t>タイプ</a:t>
+            </a:r>
+            <a:r>
+              <a:rPr lang="en-US" altLang="ja-JP" sz="1800" dirty="0"/>
+              <a:t>&gt; </a:t>
+            </a:r>
             <a:r>
               <a:rPr lang="ja-JP" altLang="en-US" sz="1800" dirty="0"/>
-              <a:t>タイプ部分は対応を考える際の重要度を簡易に表す</a:t>
-            </a:r>
-            <a:endParaRPr lang="en-US" altLang="ja-JP" sz="1800" dirty="0"/>
-          </a:p>
-          <a:p>
-            <a:pPr lvl="1"/>
+              <a:t>は </a:t>
+            </a:r>
+            <a:r>
+              <a:rPr lang="en-US" altLang="ja-JP" sz="1800" dirty="0"/>
+              <a:t>week point </a:t>
+            </a:r>
             <a:r>
               <a:rPr lang="ja-JP" altLang="en-US" sz="1800" dirty="0"/>
-              <a:t>ただのコメント（</a:t>
+              <a:t>なら </a:t>
+            </a:r>
+            <a:r>
+              <a:rPr lang="en-US" altLang="ja-JP" sz="1800" dirty="0"/>
+              <a:t>w</a:t>
+            </a:r>
+            <a:r>
+              <a:rPr lang="ja-JP" altLang="en-US" sz="1800" dirty="0"/>
+              <a:t>，質問なら </a:t>
+            </a:r>
+            <a:r>
+              <a:rPr lang="en-US" altLang="ja-JP" sz="1800" dirty="0"/>
+              <a:t>q</a:t>
+            </a:r>
+            <a:r>
+              <a:rPr lang="ja-JP" altLang="en-US" sz="1800" dirty="0"/>
+              <a:t>，コメントなら </a:t>
             </a:r>
             <a:r>
               <a:rPr lang="en-US" altLang="ja-JP" sz="1800" dirty="0"/>
               <a:t>c</a:t>
             </a:r>
+          </a:p>
+          <a:p>
             <a:r>
               <a:rPr lang="ja-JP" altLang="en-US" sz="1800" dirty="0"/>
-              <a:t>）と，弱点としてあげられている点（</a:t>
-            </a:r>
+              <a:t>例：</a:t>
+            </a:r>
+            <a:endParaRPr lang="en-US" altLang="ja-JP" sz="1800" dirty="0"/>
+          </a:p>
+          <a:p>
+            <a:pPr lvl="1"/>
             <a:r>
               <a:rPr lang="en-US" altLang="ja-JP" sz="1800" dirty="0"/>
-              <a:t>w</a:t>
+              <a:t>$A1-c, $B3-w, $E7-q </a:t>
             </a:r>
             <a:r>
               <a:rPr lang="ja-JP" altLang="en-US" sz="1800" dirty="0"/>
-              <a:t>）では異なる</a:t>
+              <a:t>など</a:t>
             </a:r>
             <a:endParaRPr lang="en-US" altLang="ja-JP" sz="1800" dirty="0"/>
-          </a:p>
-          <a:p>
-            <a:r>
-              <a:rPr lang="en-US" altLang="ja-JP" sz="1800" dirty="0"/>
-              <a:t>$ </a:t>
-            </a:r>
-            <a:r>
-              <a:rPr lang="ja-JP" altLang="en-US" sz="1800" dirty="0"/>
-              <a:t>はファイル内の検索性を上げるためにある</a:t>
-            </a:r>
-            <a:endParaRPr lang="en-US" altLang="ja-JP" sz="1800" dirty="0"/>
-          </a:p>
-          <a:p>
-            <a:pPr lvl="1"/>
-            <a:r>
-              <a:rPr kumimoji="1" lang="en-US" altLang="ja-JP" sz="1800" dirty="0"/>
-              <a:t>A1 </a:t>
-            </a:r>
-            <a:r>
-              <a:rPr kumimoji="1" lang="ja-JP" altLang="en-US" sz="1800" dirty="0"/>
-              <a:t>等だと，検索した際に査読コメント内の地の文でもヒットする可能性が結構高い</a:t>
-            </a:r>
-            <a:endParaRPr kumimoji="1" lang="en-US" altLang="ja-JP" sz="1800" dirty="0"/>
           </a:p>
         </p:txBody>
       </p:sp>
     </p:spTree>
     <p:extLst>
       <p:ext uri="{BB962C8B-B14F-4D97-AF65-F5344CB8AC3E}">
-        <p14:creationId xmlns:p14="http://schemas.microsoft.com/office/powerpoint/2010/main" val="1618595750"/>
+        <p14:creationId xmlns:p14="http://schemas.microsoft.com/office/powerpoint/2010/main" val="1324197351"/>
       </p:ext>
     </p:extLst>
   </p:cSld>
@@ -4778,6 +4665,234 @@
           <p:cNvPr id="2" name="タイトル 1">
             <a:extLst>
               <a:ext uri="{FF2B5EF4-FFF2-40B4-BE49-F238E27FC236}">
+                <a16:creationId xmlns:a16="http://schemas.microsoft.com/office/drawing/2014/main" id="{3552FC58-F8EA-E936-CC7C-FBD585AE3EB1}"/>
+              </a:ext>
+            </a:extLst>
+          </p:cNvPr>
+          <p:cNvSpPr>
+            <a:spLocks noGrp="1"/>
+          </p:cNvSpPr>
+          <p:nvPr>
+            <p:ph type="title"/>
+          </p:nvPr>
+        </p:nvSpPr>
+        <p:spPr/>
+        <p:txBody>
+          <a:bodyPr/>
+          <a:lstStyle/>
+          <a:p>
+            <a:r>
+              <a:rPr kumimoji="1" lang="en-US" altLang="ja-JP" dirty="0"/>
+              <a:t>ID </a:t>
+            </a:r>
+            <a:r>
+              <a:rPr kumimoji="1" lang="ja-JP" altLang="en-US" dirty="0"/>
+              <a:t>フォーマットがこうなってる理由</a:t>
+            </a:r>
+          </a:p>
+        </p:txBody>
+      </p:sp>
+      <p:sp>
+        <p:nvSpPr>
+          <p:cNvPr id="3" name="テキスト プレースホルダー 2">
+            <a:extLst>
+              <a:ext uri="{FF2B5EF4-FFF2-40B4-BE49-F238E27FC236}">
+                <a16:creationId xmlns:a16="http://schemas.microsoft.com/office/drawing/2014/main" id="{399195B9-8ED2-6EA8-314C-DDF2412E7F4E}"/>
+              </a:ext>
+            </a:extLst>
+          </p:cNvPr>
+          <p:cNvSpPr>
+            <a:spLocks noGrp="1"/>
+          </p:cNvSpPr>
+          <p:nvPr>
+            <p:ph type="body" sz="quarter" idx="10"/>
+          </p:nvPr>
+        </p:nvSpPr>
+        <p:spPr/>
+        <p:txBody>
+          <a:bodyPr/>
+          <a:lstStyle/>
+          <a:p>
+            <a:r>
+              <a:rPr kumimoji="1" lang="ja-JP" altLang="en-US" sz="1800" dirty="0"/>
+              <a:t>主に識別を容易にするため：</a:t>
+            </a:r>
+            <a:endParaRPr kumimoji="1" lang="en-US" altLang="ja-JP" sz="1800" dirty="0"/>
+          </a:p>
+          <a:p>
+            <a:pPr lvl="1"/>
+            <a:r>
+              <a:rPr kumimoji="1" lang="ja-JP" altLang="en-US" sz="1800" dirty="0"/>
+              <a:t>議論するとき「査読者 </a:t>
+            </a:r>
+            <a:r>
+              <a:rPr kumimoji="1" lang="en-US" altLang="ja-JP" sz="1800" dirty="0"/>
+              <a:t>A </a:t>
+            </a:r>
+            <a:r>
+              <a:rPr kumimoji="1" lang="ja-JP" altLang="en-US" sz="1800" dirty="0"/>
+              <a:t>が言ってた～に関する説明がないというやつなんだけど」よりも 「コメント </a:t>
+            </a:r>
+            <a:r>
+              <a:rPr kumimoji="1" lang="en-US" altLang="ja-JP" sz="1800" dirty="0"/>
+              <a:t>A4 </a:t>
+            </a:r>
+            <a:r>
+              <a:rPr kumimoji="1" lang="ja-JP" altLang="en-US" sz="1800" dirty="0"/>
+              <a:t>なんだけど」の方が早い</a:t>
+            </a:r>
+            <a:endParaRPr kumimoji="1" lang="en-US" altLang="ja-JP" sz="1800" dirty="0"/>
+          </a:p>
+          <a:p>
+            <a:r>
+              <a:rPr kumimoji="1" lang="ja-JP" altLang="en-US" sz="1800" dirty="0"/>
+              <a:t>タイプ部分（</a:t>
+            </a:r>
+            <a:r>
+              <a:rPr kumimoji="1" lang="en-US" altLang="ja-JP" sz="1800" dirty="0"/>
+              <a:t>$A4-w </a:t>
+            </a:r>
+            <a:r>
+              <a:rPr kumimoji="1" lang="ja-JP" altLang="en-US" sz="1800" dirty="0"/>
+              <a:t>の </a:t>
+            </a:r>
+            <a:r>
+              <a:rPr kumimoji="1" lang="en-US" altLang="ja-JP" sz="1800" dirty="0"/>
+              <a:t>–w </a:t>
+            </a:r>
+            <a:r>
+              <a:rPr kumimoji="1" lang="ja-JP" altLang="en-US" sz="1800" dirty="0"/>
+              <a:t>の部分）は無視しても識別可能な方がよい</a:t>
+            </a:r>
+            <a:endParaRPr kumimoji="1" lang="en-US" altLang="ja-JP" sz="1800" dirty="0"/>
+          </a:p>
+          <a:p>
+            <a:pPr lvl="1"/>
+            <a:r>
+              <a:rPr kumimoji="1" lang="ja-JP" altLang="en-US" sz="1800" dirty="0"/>
+              <a:t>査読者ごとに一意な番号をふる</a:t>
+            </a:r>
+            <a:endParaRPr kumimoji="1" lang="en-US" altLang="ja-JP" sz="1800" dirty="0"/>
+          </a:p>
+          <a:p>
+            <a:pPr lvl="1"/>
+            <a:r>
+              <a:rPr kumimoji="1" lang="en-US" altLang="ja-JP" sz="1800" dirty="0"/>
+              <a:t>A1-w </a:t>
+            </a:r>
+            <a:r>
+              <a:rPr kumimoji="1" lang="ja-JP" altLang="en-US" sz="1800" dirty="0"/>
+              <a:t>と </a:t>
+            </a:r>
+            <a:r>
+              <a:rPr kumimoji="1" lang="en-US" altLang="ja-JP" sz="1800" dirty="0"/>
+              <a:t>A1-q </a:t>
+            </a:r>
+            <a:r>
+              <a:rPr kumimoji="1" lang="ja-JP" altLang="en-US" sz="1800" dirty="0"/>
+              <a:t>が並列に存在すると，どっちかわからなくなる</a:t>
+            </a:r>
+            <a:endParaRPr kumimoji="1" lang="en-US" altLang="ja-JP" sz="1800" dirty="0"/>
+          </a:p>
+          <a:p>
+            <a:r>
+              <a:rPr lang="ja-JP" altLang="en-US" sz="1800" dirty="0"/>
+              <a:t>タイプ部分は対応を考える際の重要度を簡易に表す</a:t>
+            </a:r>
+            <a:endParaRPr lang="en-US" altLang="ja-JP" sz="1800" dirty="0"/>
+          </a:p>
+          <a:p>
+            <a:pPr lvl="1"/>
+            <a:r>
+              <a:rPr lang="ja-JP" altLang="en-US" sz="1800" dirty="0"/>
+              <a:t>ただのコメント（</a:t>
+            </a:r>
+            <a:r>
+              <a:rPr lang="en-US" altLang="ja-JP" sz="1800" dirty="0"/>
+              <a:t>c</a:t>
+            </a:r>
+            <a:r>
+              <a:rPr lang="ja-JP" altLang="en-US" sz="1800" dirty="0"/>
+              <a:t>）と，弱点としてあげられている点（</a:t>
+            </a:r>
+            <a:r>
+              <a:rPr lang="en-US" altLang="ja-JP" sz="1800" dirty="0"/>
+              <a:t>w</a:t>
+            </a:r>
+            <a:r>
+              <a:rPr lang="ja-JP" altLang="en-US" sz="1800" dirty="0"/>
+              <a:t>）では異なる</a:t>
+            </a:r>
+            <a:endParaRPr lang="en-US" altLang="ja-JP" sz="1800" dirty="0"/>
+          </a:p>
+          <a:p>
+            <a:r>
+              <a:rPr lang="en-US" altLang="ja-JP" sz="1800" dirty="0"/>
+              <a:t>$ </a:t>
+            </a:r>
+            <a:r>
+              <a:rPr lang="ja-JP" altLang="en-US" sz="1800" dirty="0"/>
+              <a:t>はファイル内の検索性を上げるためにある</a:t>
+            </a:r>
+            <a:endParaRPr lang="en-US" altLang="ja-JP" sz="1800" dirty="0"/>
+          </a:p>
+          <a:p>
+            <a:pPr lvl="1"/>
+            <a:r>
+              <a:rPr kumimoji="1" lang="en-US" altLang="ja-JP" sz="1800" dirty="0"/>
+              <a:t>A1 </a:t>
+            </a:r>
+            <a:r>
+              <a:rPr kumimoji="1" lang="ja-JP" altLang="en-US" sz="1800" dirty="0"/>
+              <a:t>等だと，検索した際に査読コメント内の地の文でもヒットする可能性が結構高い</a:t>
+            </a:r>
+            <a:endParaRPr kumimoji="1" lang="en-US" altLang="ja-JP" sz="1800" dirty="0"/>
+          </a:p>
+        </p:txBody>
+      </p:sp>
+    </p:spTree>
+    <p:extLst>
+      <p:ext uri="{BB962C8B-B14F-4D97-AF65-F5344CB8AC3E}">
+        <p14:creationId xmlns:p14="http://schemas.microsoft.com/office/powerpoint/2010/main" val="1618595750"/>
+      </p:ext>
+    </p:extLst>
+  </p:cSld>
+  <p:clrMapOvr>
+    <a:masterClrMapping/>
+  </p:clrMapOvr>
+  <mc:AlternateContent xmlns:mc="http://schemas.openxmlformats.org/markup-compatibility/2006" xmlns:p14="http://schemas.microsoft.com/office/powerpoint/2010/main">
+    <mc:Choice Requires="p14">
+      <p:transition p14:dur="10"/>
+    </mc:Choice>
+    <mc:Fallback xmlns="">
+      <p:transition/>
+    </mc:Fallback>
+  </mc:AlternateContent>
+</p:sld>
+</file>
+
+<file path=ppt/slides/slide18.xml><?xml version="1.0" encoding="utf-8"?>
+<p:sld xmlns:a="http://schemas.openxmlformats.org/drawingml/2006/main" xmlns:r="http://schemas.openxmlformats.org/officeDocument/2006/relationships" xmlns:p="http://schemas.openxmlformats.org/presentationml/2006/main">
+  <p:cSld>
+    <p:spTree>
+      <p:nvGrpSpPr>
+        <p:cNvPr id="1" name=""/>
+        <p:cNvGrpSpPr/>
+        <p:nvPr/>
+      </p:nvGrpSpPr>
+      <p:grpSpPr>
+        <a:xfrm>
+          <a:off x="0" y="0"/>
+          <a:ext cx="0" cy="0"/>
+          <a:chOff x="0" y="0"/>
+          <a:chExt cx="0" cy="0"/>
+        </a:xfrm>
+      </p:grpSpPr>
+      <p:sp>
+        <p:nvSpPr>
+          <p:cNvPr id="2" name="タイトル 1">
+            <a:extLst>
+              <a:ext uri="{FF2B5EF4-FFF2-40B4-BE49-F238E27FC236}">
                 <a16:creationId xmlns:a16="http://schemas.microsoft.com/office/drawing/2014/main" id="{B96AD0FA-E9D6-EE5C-BA81-39B202C37D09}"/>
               </a:ext>
             </a:extLst>
@@ -4913,7 +5028,7 @@
 </p:sld>
 </file>
 
-<file path=ppt/slides/slide18.xml><?xml version="1.0" encoding="utf-8"?>
+<file path=ppt/slides/slide19.xml><?xml version="1.0" encoding="utf-8"?>
 <p:sld xmlns:a="http://schemas.openxmlformats.org/drawingml/2006/main" xmlns:r="http://schemas.openxmlformats.org/officeDocument/2006/relationships" xmlns:p="http://schemas.openxmlformats.org/presentationml/2006/main">
   <p:cSld>
     <p:spTree>
@@ -5412,7 +5527,156 @@
 </p:sld>
 </file>
 
-<file path=ppt/slides/slide19.xml><?xml version="1.0" encoding="utf-8"?>
+<file path=ppt/slides/slide2.xml><?xml version="1.0" encoding="utf-8"?>
+<p:sld xmlns:a="http://schemas.openxmlformats.org/drawingml/2006/main" xmlns:r="http://schemas.openxmlformats.org/officeDocument/2006/relationships" xmlns:p="http://schemas.openxmlformats.org/presentationml/2006/main">
+  <p:cSld>
+    <p:spTree>
+      <p:nvGrpSpPr>
+        <p:cNvPr id="1" name=""/>
+        <p:cNvGrpSpPr/>
+        <p:nvPr/>
+      </p:nvGrpSpPr>
+      <p:grpSpPr>
+        <a:xfrm>
+          <a:off x="0" y="0"/>
+          <a:ext cx="0" cy="0"/>
+          <a:chOff x="0" y="0"/>
+          <a:chExt cx="0" cy="0"/>
+        </a:xfrm>
+      </p:grpSpPr>
+      <p:sp>
+        <p:nvSpPr>
+          <p:cNvPr id="2" name="タイトル 1">
+            <a:extLst>
+              <a:ext uri="{FF2B5EF4-FFF2-40B4-BE49-F238E27FC236}">
+                <a16:creationId xmlns:a16="http://schemas.microsoft.com/office/drawing/2014/main" id="{9D61C188-5860-DCBE-4F54-3F8C103E2DAC}"/>
+              </a:ext>
+            </a:extLst>
+          </p:cNvPr>
+          <p:cNvSpPr>
+            <a:spLocks noGrp="1"/>
+          </p:cNvSpPr>
+          <p:nvPr>
+            <p:ph type="title"/>
+          </p:nvPr>
+        </p:nvSpPr>
+        <p:spPr/>
+        <p:txBody>
+          <a:bodyPr/>
+          <a:lstStyle/>
+          <a:p>
+            <a:r>
+              <a:rPr kumimoji="1" lang="ja-JP" altLang="en-US" dirty="0"/>
+              <a:t>はじめに</a:t>
+            </a:r>
+          </a:p>
+        </p:txBody>
+      </p:sp>
+      <p:sp>
+        <p:nvSpPr>
+          <p:cNvPr id="3" name="テキスト プレースホルダー 2">
+            <a:extLst>
+              <a:ext uri="{FF2B5EF4-FFF2-40B4-BE49-F238E27FC236}">
+                <a16:creationId xmlns:a16="http://schemas.microsoft.com/office/drawing/2014/main" id="{16406EAA-6DD5-1103-E09E-A8675115D0B4}"/>
+              </a:ext>
+            </a:extLst>
+          </p:cNvPr>
+          <p:cNvSpPr>
+            <a:spLocks noGrp="1"/>
+          </p:cNvSpPr>
+          <p:nvPr>
+            <p:ph type="body" sz="quarter" idx="10"/>
+          </p:nvPr>
+        </p:nvSpPr>
+        <p:spPr/>
+        <p:txBody>
+          <a:bodyPr/>
+          <a:lstStyle/>
+          <a:p>
+            <a:r>
+              <a:rPr lang="ja-JP" altLang="en-US" dirty="0"/>
+              <a:t>この文章では，査読に対する返答の進め方を解説する</a:t>
+            </a:r>
+            <a:endParaRPr lang="en-US" altLang="ja-JP" dirty="0"/>
+          </a:p>
+          <a:p>
+            <a:pPr lvl="1"/>
+            <a:r>
+              <a:rPr kumimoji="1" lang="ja-JP" altLang="en-US" dirty="0"/>
+              <a:t>「</a:t>
+            </a:r>
+            <a:r>
+              <a:rPr kumimoji="1" lang="en-US" altLang="ja-JP" dirty="0"/>
+              <a:t>rebuttal</a:t>
+            </a:r>
+            <a:r>
+              <a:rPr kumimoji="1" lang="ja-JP" altLang="en-US" dirty="0"/>
+              <a:t>」「</a:t>
+            </a:r>
+            <a:r>
+              <a:rPr kumimoji="1" lang="en-US" altLang="ja-JP" dirty="0"/>
+              <a:t>author response</a:t>
+            </a:r>
+            <a:r>
+              <a:rPr kumimoji="1" lang="ja-JP" altLang="en-US" dirty="0"/>
+              <a:t>」と言われるもの</a:t>
+            </a:r>
+            <a:endParaRPr kumimoji="1" lang="en-US" altLang="ja-JP" dirty="0"/>
+          </a:p>
+          <a:p>
+            <a:pPr lvl="1"/>
+            <a:r>
+              <a:rPr kumimoji="1" lang="ja-JP" altLang="en-US" dirty="0"/>
+              <a:t>論文誌の条件付き採録でも，基本的に同様のやり方で良いと思う</a:t>
+            </a:r>
+            <a:endParaRPr kumimoji="1" lang="en-US" altLang="ja-JP" dirty="0"/>
+          </a:p>
+          <a:p>
+            <a:r>
+              <a:rPr kumimoji="1" lang="ja-JP" altLang="en-US" dirty="0"/>
+              <a:t>備考：</a:t>
+            </a:r>
+            <a:endParaRPr kumimoji="1" lang="en-US" altLang="ja-JP" dirty="0"/>
+          </a:p>
+          <a:p>
+            <a:pPr lvl="1"/>
+            <a:r>
+              <a:rPr kumimoji="1" lang="ja-JP" altLang="en-US" dirty="0"/>
+              <a:t>この解説はコンピュータ・システム系分野の事情にかなり依存している可能性はある</a:t>
+            </a:r>
+            <a:endParaRPr kumimoji="1" lang="en-US" altLang="ja-JP" dirty="0"/>
+          </a:p>
+          <a:p>
+            <a:r>
+              <a:rPr kumimoji="1" lang="ja-JP" altLang="en-US" dirty="0"/>
+              <a:t>まず背景と指針について説明した後，作業の仕方を説明</a:t>
+            </a:r>
+            <a:endParaRPr kumimoji="1" lang="en-US" altLang="ja-JP" dirty="0"/>
+          </a:p>
+        </p:txBody>
+      </p:sp>
+    </p:spTree>
+    <p:extLst>
+      <p:ext uri="{BB962C8B-B14F-4D97-AF65-F5344CB8AC3E}">
+        <p14:creationId xmlns:p14="http://schemas.microsoft.com/office/powerpoint/2010/main" val="3860254781"/>
+      </p:ext>
+    </p:extLst>
+  </p:cSld>
+  <p:clrMapOvr>
+    <a:masterClrMapping/>
+  </p:clrMapOvr>
+  <mc:AlternateContent xmlns:mc="http://schemas.openxmlformats.org/markup-compatibility/2006" xmlns:p14="http://schemas.microsoft.com/office/powerpoint/2010/main">
+    <mc:Choice Requires="p14">
+      <p:transition p14:dur="10"/>
+    </mc:Choice>
+    <mc:Fallback xmlns="">
+      <p:transition/>
+    </mc:Fallback>
+  </mc:AlternateContent>
+</p:sld>
+</file>
+
+<file path=ppt/slides/slide20.xml><?xml version="1.0" encoding="utf-8"?>
 <p:sld xmlns:a="http://schemas.openxmlformats.org/drawingml/2006/main" xmlns:r="http://schemas.openxmlformats.org/officeDocument/2006/relationships" xmlns:p="http://schemas.openxmlformats.org/presentationml/2006/main">
   <p:cSld>
     <p:spTree>
@@ -6046,156 +6310,7 @@
 </p:sld>
 </file>
 
-<file path=ppt/slides/slide2.xml><?xml version="1.0" encoding="utf-8"?>
-<p:sld xmlns:a="http://schemas.openxmlformats.org/drawingml/2006/main" xmlns:r="http://schemas.openxmlformats.org/officeDocument/2006/relationships" xmlns:p="http://schemas.openxmlformats.org/presentationml/2006/main">
-  <p:cSld>
-    <p:spTree>
-      <p:nvGrpSpPr>
-        <p:cNvPr id="1" name=""/>
-        <p:cNvGrpSpPr/>
-        <p:nvPr/>
-      </p:nvGrpSpPr>
-      <p:grpSpPr>
-        <a:xfrm>
-          <a:off x="0" y="0"/>
-          <a:ext cx="0" cy="0"/>
-          <a:chOff x="0" y="0"/>
-          <a:chExt cx="0" cy="0"/>
-        </a:xfrm>
-      </p:grpSpPr>
-      <p:sp>
-        <p:nvSpPr>
-          <p:cNvPr id="2" name="タイトル 1">
-            <a:extLst>
-              <a:ext uri="{FF2B5EF4-FFF2-40B4-BE49-F238E27FC236}">
-                <a16:creationId xmlns:a16="http://schemas.microsoft.com/office/drawing/2014/main" id="{9D61C188-5860-DCBE-4F54-3F8C103E2DAC}"/>
-              </a:ext>
-            </a:extLst>
-          </p:cNvPr>
-          <p:cNvSpPr>
-            <a:spLocks noGrp="1"/>
-          </p:cNvSpPr>
-          <p:nvPr>
-            <p:ph type="title"/>
-          </p:nvPr>
-        </p:nvSpPr>
-        <p:spPr/>
-        <p:txBody>
-          <a:bodyPr/>
-          <a:lstStyle/>
-          <a:p>
-            <a:r>
-              <a:rPr kumimoji="1" lang="ja-JP" altLang="en-US" dirty="0"/>
-              <a:t>はじめに</a:t>
-            </a:r>
-          </a:p>
-        </p:txBody>
-      </p:sp>
-      <p:sp>
-        <p:nvSpPr>
-          <p:cNvPr id="3" name="テキスト プレースホルダー 2">
-            <a:extLst>
-              <a:ext uri="{FF2B5EF4-FFF2-40B4-BE49-F238E27FC236}">
-                <a16:creationId xmlns:a16="http://schemas.microsoft.com/office/drawing/2014/main" id="{16406EAA-6DD5-1103-E09E-A8675115D0B4}"/>
-              </a:ext>
-            </a:extLst>
-          </p:cNvPr>
-          <p:cNvSpPr>
-            <a:spLocks noGrp="1"/>
-          </p:cNvSpPr>
-          <p:nvPr>
-            <p:ph type="body" sz="quarter" idx="10"/>
-          </p:nvPr>
-        </p:nvSpPr>
-        <p:spPr/>
-        <p:txBody>
-          <a:bodyPr/>
-          <a:lstStyle/>
-          <a:p>
-            <a:r>
-              <a:rPr lang="ja-JP" altLang="en-US" dirty="0"/>
-              <a:t>この文章では，査読に対する返答の進め方を解説する</a:t>
-            </a:r>
-            <a:endParaRPr lang="en-US" altLang="ja-JP" dirty="0"/>
-          </a:p>
-          <a:p>
-            <a:pPr lvl="1"/>
-            <a:r>
-              <a:rPr kumimoji="1" lang="ja-JP" altLang="en-US" dirty="0"/>
-              <a:t>「</a:t>
-            </a:r>
-            <a:r>
-              <a:rPr kumimoji="1" lang="en-US" altLang="ja-JP" dirty="0"/>
-              <a:t>rebuttal</a:t>
-            </a:r>
-            <a:r>
-              <a:rPr kumimoji="1" lang="ja-JP" altLang="en-US" dirty="0"/>
-              <a:t>」「</a:t>
-            </a:r>
-            <a:r>
-              <a:rPr kumimoji="1" lang="en-US" altLang="ja-JP" dirty="0"/>
-              <a:t>author response</a:t>
-            </a:r>
-            <a:r>
-              <a:rPr kumimoji="1" lang="ja-JP" altLang="en-US" dirty="0"/>
-              <a:t>」と言われるもの</a:t>
-            </a:r>
-            <a:endParaRPr kumimoji="1" lang="en-US" altLang="ja-JP" dirty="0"/>
-          </a:p>
-          <a:p>
-            <a:pPr lvl="1"/>
-            <a:r>
-              <a:rPr kumimoji="1" lang="ja-JP" altLang="en-US" dirty="0"/>
-              <a:t>論文誌の条件付き採録でも，基本的に同様のやり方で良いと思う</a:t>
-            </a:r>
-            <a:endParaRPr kumimoji="1" lang="en-US" altLang="ja-JP" dirty="0"/>
-          </a:p>
-          <a:p>
-            <a:r>
-              <a:rPr kumimoji="1" lang="ja-JP" altLang="en-US" dirty="0"/>
-              <a:t>備考：</a:t>
-            </a:r>
-            <a:endParaRPr kumimoji="1" lang="en-US" altLang="ja-JP" dirty="0"/>
-          </a:p>
-          <a:p>
-            <a:pPr lvl="1"/>
-            <a:r>
-              <a:rPr kumimoji="1" lang="ja-JP" altLang="en-US" dirty="0"/>
-              <a:t>この解説はコンピュータ・システム系分野の事情にかなり依存している可能性はある</a:t>
-            </a:r>
-            <a:endParaRPr kumimoji="1" lang="en-US" altLang="ja-JP" dirty="0"/>
-          </a:p>
-          <a:p>
-            <a:r>
-              <a:rPr kumimoji="1" lang="ja-JP" altLang="en-US" dirty="0"/>
-              <a:t>まず背景と指針について説明した後，作業の仕方を説明</a:t>
-            </a:r>
-            <a:endParaRPr kumimoji="1" lang="en-US" altLang="ja-JP" dirty="0"/>
-          </a:p>
-        </p:txBody>
-      </p:sp>
-    </p:spTree>
-    <p:extLst>
-      <p:ext uri="{BB962C8B-B14F-4D97-AF65-F5344CB8AC3E}">
-        <p14:creationId xmlns:p14="http://schemas.microsoft.com/office/powerpoint/2010/main" val="3860254781"/>
-      </p:ext>
-    </p:extLst>
-  </p:cSld>
-  <p:clrMapOvr>
-    <a:masterClrMapping/>
-  </p:clrMapOvr>
-  <mc:AlternateContent xmlns:mc="http://schemas.openxmlformats.org/markup-compatibility/2006" xmlns:p14="http://schemas.microsoft.com/office/powerpoint/2010/main">
-    <mc:Choice Requires="p14">
-      <p:transition p14:dur="10"/>
-    </mc:Choice>
-    <mc:Fallback xmlns="">
-      <p:transition/>
-    </mc:Fallback>
-  </mc:AlternateContent>
-</p:sld>
-</file>
-
-<file path=ppt/slides/slide20.xml><?xml version="1.0" encoding="utf-8"?>
+<file path=ppt/slides/slide21.xml><?xml version="1.0" encoding="utf-8"?>
 <p:sld xmlns:a="http://schemas.openxmlformats.org/drawingml/2006/main" xmlns:r="http://schemas.openxmlformats.org/officeDocument/2006/relationships" xmlns:p="http://schemas.openxmlformats.org/presentationml/2006/main">
   <p:cSld>
     <p:spTree>
@@ -6250,124 +6365,6 @@
   <p:clrMapOvr>
     <a:masterClrMapping/>
   </p:clrMapOvr>
-</p:sld>
-</file>
-
-<file path=ppt/slides/slide21.xml><?xml version="1.0" encoding="utf-8"?>
-<p:sld xmlns:a="http://schemas.openxmlformats.org/drawingml/2006/main" xmlns:r="http://schemas.openxmlformats.org/officeDocument/2006/relationships" xmlns:p="http://schemas.openxmlformats.org/presentationml/2006/main">
-  <p:cSld>
-    <p:spTree>
-      <p:nvGrpSpPr>
-        <p:cNvPr id="1" name=""/>
-        <p:cNvGrpSpPr/>
-        <p:nvPr/>
-      </p:nvGrpSpPr>
-      <p:grpSpPr>
-        <a:xfrm>
-          <a:off x="0" y="0"/>
-          <a:ext cx="0" cy="0"/>
-          <a:chOff x="0" y="0"/>
-          <a:chExt cx="0" cy="0"/>
-        </a:xfrm>
-      </p:grpSpPr>
-      <p:sp>
-        <p:nvSpPr>
-          <p:cNvPr id="2" name="タイトル 1">
-            <a:extLst>
-              <a:ext uri="{FF2B5EF4-FFF2-40B4-BE49-F238E27FC236}">
-                <a16:creationId xmlns:a16="http://schemas.microsoft.com/office/drawing/2014/main" id="{1B4963E6-2ABD-F2C2-2F80-CF040B3F9273}"/>
-              </a:ext>
-            </a:extLst>
-          </p:cNvPr>
-          <p:cNvSpPr>
-            <a:spLocks noGrp="1"/>
-          </p:cNvSpPr>
-          <p:nvPr>
-            <p:ph type="title"/>
-          </p:nvPr>
-        </p:nvSpPr>
-        <p:spPr/>
-        <p:txBody>
-          <a:bodyPr/>
-          <a:lstStyle/>
-          <a:p>
-            <a:r>
-              <a:rPr kumimoji="1" lang="ja-JP" altLang="en-US" dirty="0"/>
-              <a:t>タスク管理</a:t>
-            </a:r>
-          </a:p>
-        </p:txBody>
-      </p:sp>
-      <p:sp>
-        <p:nvSpPr>
-          <p:cNvPr id="3" name="テキスト プレースホルダー 2">
-            <a:extLst>
-              <a:ext uri="{FF2B5EF4-FFF2-40B4-BE49-F238E27FC236}">
-                <a16:creationId xmlns:a16="http://schemas.microsoft.com/office/drawing/2014/main" id="{7E954E60-590C-8193-669B-931770B94F1C}"/>
-              </a:ext>
-            </a:extLst>
-          </p:cNvPr>
-          <p:cNvSpPr>
-            <a:spLocks noGrp="1"/>
-          </p:cNvSpPr>
-          <p:nvPr>
-            <p:ph type="body" sz="quarter" idx="10"/>
-          </p:nvPr>
-        </p:nvSpPr>
-        <p:spPr/>
-        <p:txBody>
-          <a:bodyPr/>
-          <a:lstStyle/>
-          <a:p>
-            <a:r>
-              <a:rPr kumimoji="1" lang="ja-JP" altLang="en-US" dirty="0"/>
-              <a:t>なんらかの方法でタスク管理をした方がよい</a:t>
-            </a:r>
-            <a:endParaRPr kumimoji="1" lang="en-US" altLang="ja-JP" dirty="0"/>
-          </a:p>
-          <a:p>
-            <a:pPr lvl="1"/>
-            <a:r>
-              <a:rPr kumimoji="1" lang="ja-JP" altLang="en-US" dirty="0"/>
-              <a:t>やるべき事が多岐にわたる</a:t>
-            </a:r>
-            <a:endParaRPr kumimoji="1" lang="en-US" altLang="ja-JP" dirty="0"/>
-          </a:p>
-          <a:p>
-            <a:pPr lvl="1"/>
-            <a:r>
-              <a:rPr kumimoji="1" lang="ja-JP" altLang="en-US" dirty="0"/>
-              <a:t>なにが終わってなにが終わっていないかわからなくなる</a:t>
-            </a:r>
-            <a:endParaRPr kumimoji="1" lang="en-US" altLang="ja-JP" dirty="0"/>
-          </a:p>
-          <a:p>
-            <a:endParaRPr kumimoji="1" lang="ja-JP" altLang="en-US" dirty="0">
-              <a:solidFill>
-                <a:schemeClr val="accent5"/>
-              </a:solidFill>
-            </a:endParaRPr>
-          </a:p>
-        </p:txBody>
-      </p:sp>
-    </p:spTree>
-    <p:extLst>
-      <p:ext uri="{BB962C8B-B14F-4D97-AF65-F5344CB8AC3E}">
-        <p14:creationId xmlns:p14="http://schemas.microsoft.com/office/powerpoint/2010/main" val="3639384854"/>
-      </p:ext>
-    </p:extLst>
-  </p:cSld>
-  <p:clrMapOvr>
-    <a:masterClrMapping/>
-  </p:clrMapOvr>
-  <mc:AlternateContent xmlns:mc="http://schemas.openxmlformats.org/markup-compatibility/2006" xmlns:p14="http://schemas.microsoft.com/office/powerpoint/2010/main">
-    <mc:Choice Requires="p14">
-      <p:transition p14:dur="10"/>
-    </mc:Choice>
-    <mc:Fallback xmlns="">
-      <p:transition/>
-    </mc:Fallback>
-  </mc:AlternateContent>
 </p:sld>
 </file>
 
@@ -6411,6 +6408,124 @@
           <a:p>
             <a:r>
               <a:rPr kumimoji="1" lang="ja-JP" altLang="en-US" dirty="0"/>
+              <a:t>タスク管理</a:t>
+            </a:r>
+          </a:p>
+        </p:txBody>
+      </p:sp>
+      <p:sp>
+        <p:nvSpPr>
+          <p:cNvPr id="3" name="テキスト プレースホルダー 2">
+            <a:extLst>
+              <a:ext uri="{FF2B5EF4-FFF2-40B4-BE49-F238E27FC236}">
+                <a16:creationId xmlns:a16="http://schemas.microsoft.com/office/drawing/2014/main" id="{7E954E60-590C-8193-669B-931770B94F1C}"/>
+              </a:ext>
+            </a:extLst>
+          </p:cNvPr>
+          <p:cNvSpPr>
+            <a:spLocks noGrp="1"/>
+          </p:cNvSpPr>
+          <p:nvPr>
+            <p:ph type="body" sz="quarter" idx="10"/>
+          </p:nvPr>
+        </p:nvSpPr>
+        <p:spPr/>
+        <p:txBody>
+          <a:bodyPr/>
+          <a:lstStyle/>
+          <a:p>
+            <a:r>
+              <a:rPr kumimoji="1" lang="ja-JP" altLang="en-US" dirty="0"/>
+              <a:t>なんらかの方法でタスク管理をした方がよい</a:t>
+            </a:r>
+            <a:endParaRPr kumimoji="1" lang="en-US" altLang="ja-JP" dirty="0"/>
+          </a:p>
+          <a:p>
+            <a:pPr lvl="1"/>
+            <a:r>
+              <a:rPr kumimoji="1" lang="ja-JP" altLang="en-US" dirty="0"/>
+              <a:t>やるべき事が多岐にわたる</a:t>
+            </a:r>
+            <a:endParaRPr kumimoji="1" lang="en-US" altLang="ja-JP" dirty="0"/>
+          </a:p>
+          <a:p>
+            <a:pPr lvl="1"/>
+            <a:r>
+              <a:rPr kumimoji="1" lang="ja-JP" altLang="en-US" dirty="0"/>
+              <a:t>なにが終わってなにが終わっていないかわからなくなる</a:t>
+            </a:r>
+            <a:endParaRPr kumimoji="1" lang="en-US" altLang="ja-JP" dirty="0"/>
+          </a:p>
+          <a:p>
+            <a:endParaRPr kumimoji="1" lang="ja-JP" altLang="en-US" dirty="0">
+              <a:solidFill>
+                <a:schemeClr val="accent5"/>
+              </a:solidFill>
+            </a:endParaRPr>
+          </a:p>
+        </p:txBody>
+      </p:sp>
+    </p:spTree>
+    <p:extLst>
+      <p:ext uri="{BB962C8B-B14F-4D97-AF65-F5344CB8AC3E}">
+        <p14:creationId xmlns:p14="http://schemas.microsoft.com/office/powerpoint/2010/main" val="3639384854"/>
+      </p:ext>
+    </p:extLst>
+  </p:cSld>
+  <p:clrMapOvr>
+    <a:masterClrMapping/>
+  </p:clrMapOvr>
+  <mc:AlternateContent xmlns:mc="http://schemas.openxmlformats.org/markup-compatibility/2006" xmlns:p14="http://schemas.microsoft.com/office/powerpoint/2010/main">
+    <mc:Choice Requires="p14">
+      <p:transition p14:dur="10"/>
+    </mc:Choice>
+    <mc:Fallback xmlns="">
+      <p:transition/>
+    </mc:Fallback>
+  </mc:AlternateContent>
+</p:sld>
+</file>
+
+<file path=ppt/slides/slide23.xml><?xml version="1.0" encoding="utf-8"?>
+<p:sld xmlns:a="http://schemas.openxmlformats.org/drawingml/2006/main" xmlns:r="http://schemas.openxmlformats.org/officeDocument/2006/relationships" xmlns:p="http://schemas.openxmlformats.org/presentationml/2006/main">
+  <p:cSld>
+    <p:spTree>
+      <p:nvGrpSpPr>
+        <p:cNvPr id="1" name=""/>
+        <p:cNvGrpSpPr/>
+        <p:nvPr/>
+      </p:nvGrpSpPr>
+      <p:grpSpPr>
+        <a:xfrm>
+          <a:off x="0" y="0"/>
+          <a:ext cx="0" cy="0"/>
+          <a:chOff x="0" y="0"/>
+          <a:chExt cx="0" cy="0"/>
+        </a:xfrm>
+      </p:grpSpPr>
+      <p:sp>
+        <p:nvSpPr>
+          <p:cNvPr id="2" name="タイトル 1">
+            <a:extLst>
+              <a:ext uri="{FF2B5EF4-FFF2-40B4-BE49-F238E27FC236}">
+                <a16:creationId xmlns:a16="http://schemas.microsoft.com/office/drawing/2014/main" id="{1B4963E6-2ABD-F2C2-2F80-CF040B3F9273}"/>
+              </a:ext>
+            </a:extLst>
+          </p:cNvPr>
+          <p:cNvSpPr>
+            <a:spLocks noGrp="1"/>
+          </p:cNvSpPr>
+          <p:nvPr>
+            <p:ph type="title"/>
+          </p:nvPr>
+        </p:nvSpPr>
+        <p:spPr/>
+        <p:txBody>
+          <a:bodyPr/>
+          <a:lstStyle/>
+          <a:p>
+            <a:r>
+              <a:rPr kumimoji="1" lang="ja-JP" altLang="en-US" dirty="0"/>
               <a:t>テキストによる軽量なタスク管理</a:t>
             </a:r>
           </a:p>
@@ -6568,7 +6683,7 @@
 </p:sld>
 </file>
 
-<file path=ppt/slides/slide23.xml><?xml version="1.0" encoding="utf-8"?>
+<file path=ppt/slides/slide24.xml><?xml version="1.0" encoding="utf-8"?>
 <p:sld xmlns:a="http://schemas.openxmlformats.org/drawingml/2006/main" xmlns:r="http://schemas.openxmlformats.org/officeDocument/2006/relationships" xmlns:p="http://schemas.openxmlformats.org/presentationml/2006/main">
   <p:cSld>
     <p:spTree>
@@ -7289,7 +7404,7 @@
 </p:sld>
 </file>
 
-<file path=ppt/slides/slide24.xml><?xml version="1.0" encoding="utf-8"?>
+<file path=ppt/slides/slide25.xml><?xml version="1.0" encoding="utf-8"?>
 <p:sld xmlns:a="http://schemas.openxmlformats.org/drawingml/2006/main" xmlns:r="http://schemas.openxmlformats.org/officeDocument/2006/relationships" xmlns:p="http://schemas.openxmlformats.org/presentationml/2006/main">
   <p:cSld>
     <p:spTree>
@@ -8048,7 +8163,7 @@
 </p:sld>
 </file>
 
-<file path=ppt/slides/slide25.xml><?xml version="1.0" encoding="utf-8"?>
+<file path=ppt/slides/slide26.xml><?xml version="1.0" encoding="utf-8"?>
 <p:sld xmlns:a="http://schemas.openxmlformats.org/drawingml/2006/main" xmlns:r="http://schemas.openxmlformats.org/officeDocument/2006/relationships" xmlns:p="http://schemas.openxmlformats.org/presentationml/2006/main">
   <p:cSld>
     <p:spTree>

</xml_diff>